<commit_message>
presentation lecture 5 improved
</commit_message>
<xml_diff>
--- a/Lecture5/Lecture5.pptx
+++ b/Lecture5/Lecture5.pptx
@@ -16,8 +16,21 @@
     <p:sldId id="319" r:id="rId10"/>
     <p:sldId id="320" r:id="rId11"/>
     <p:sldId id="321" r:id="rId12"/>
-    <p:sldId id="291" r:id="rId13"/>
-    <p:sldId id="292" r:id="rId14"/>
+    <p:sldId id="322" r:id="rId13"/>
+    <p:sldId id="323" r:id="rId14"/>
+    <p:sldId id="324" r:id="rId15"/>
+    <p:sldId id="325" r:id="rId16"/>
+    <p:sldId id="326" r:id="rId17"/>
+    <p:sldId id="327" r:id="rId18"/>
+    <p:sldId id="328" r:id="rId19"/>
+    <p:sldId id="329" r:id="rId20"/>
+    <p:sldId id="330" r:id="rId21"/>
+    <p:sldId id="331" r:id="rId22"/>
+    <p:sldId id="332" r:id="rId23"/>
+    <p:sldId id="333" r:id="rId24"/>
+    <p:sldId id="334" r:id="rId25"/>
+    <p:sldId id="291" r:id="rId26"/>
+    <p:sldId id="292" r:id="rId27"/>
   </p:sldIdLst>
   <p:sldSz cx="9144000" cy="6858000" type="screen4x3"/>
   <p:notesSz cx="6858000" cy="9144000"/>
@@ -3842,15 +3855,6 @@
               </a:rPr>
               <a:t>Прилики и разлики</a:t>
             </a:r>
-            <a:endParaRPr lang="bg-BG" dirty="0" smtClean="0">
-              <a:ln w="18415" cmpd="sng">
-                <a:noFill/>
-                <a:prstDash val="solid"/>
-              </a:ln>
-              <a:solidFill>
-                <a:srgbClr val="FFFFFF"/>
-              </a:solidFill>
-            </a:endParaRPr>
           </a:p>
         </p:txBody>
       </p:sp>
@@ -4163,18 +4167,18 @@
       </p:grpSpPr>
       <p:sp>
         <p:nvSpPr>
-          <p:cNvPr id="106498" name="Rectangle 2"/>
+          <p:cNvPr id="2198" name="Rectangle 150"/>
           <p:cNvSpPr>
             <a:spLocks noGrp="1" noChangeArrowheads="1"/>
           </p:cNvSpPr>
           <p:nvPr>
-            <p:ph type="title"/>
+            <p:ph type="ctrTitle"/>
           </p:nvPr>
         </p:nvSpPr>
         <p:spPr>
           <a:xfrm>
-            <a:off x="395288" y="188913"/>
-            <a:ext cx="8229600" cy="981075"/>
+            <a:off x="1979712" y="1196752"/>
+            <a:ext cx="6984776" cy="2375322"/>
           </a:xfrm>
         </p:spPr>
         <p:txBody>
@@ -4182,14 +4186,14 @@
           <a:lstStyle/>
           <a:p>
             <a:r>
-              <a:rPr lang="bg-BG" altLang="bg-BG" dirty="0" smtClean="0">
+              <a:rPr lang="bg-BG" altLang="bg-BG" sz="5400" b="1" dirty="0" smtClean="0">
                 <a:solidFill>
                   <a:schemeClr val="bg1"/>
                 </a:solidFill>
               </a:rPr>
-              <a:t>Въпроси?</a:t>
-            </a:r>
-            <a:endParaRPr lang="bg-BG" altLang="bg-BG" dirty="0">
+              <a:t>Методи</a:t>
+            </a:r>
+            <a:endParaRPr lang="es-ES" altLang="bg-BG" sz="5400" b="1" dirty="0">
               <a:solidFill>
                 <a:schemeClr val="bg1"/>
               </a:solidFill>
@@ -4199,81 +4203,209 @@
       </p:sp>
       <p:sp>
         <p:nvSpPr>
-          <p:cNvPr id="2" name="Правоъгълник 1"/>
-          <p:cNvSpPr/>
+          <p:cNvPr id="2209" name="Rectangle 161"/>
+          <p:cNvSpPr>
+            <a:spLocks noChangeArrowheads="1"/>
+          </p:cNvSpPr>
           <p:nvPr/>
         </p:nvSpPr>
-        <p:spPr>
+        <p:spPr bwMode="auto">
           <a:xfrm>
-            <a:off x="3558639" y="1700808"/>
-            <a:ext cx="2432077" cy="4508927"/>
+            <a:off x="2592288" y="4076700"/>
+            <a:ext cx="6732240" cy="1152525"/>
           </a:xfrm>
           <a:prstGeom prst="rect">
             <a:avLst/>
           </a:prstGeom>
           <a:noFill/>
+          <a:ln>
+            <a:noFill/>
+          </a:ln>
+          <a:effectLst/>
+          <a:extLst>
+            <a:ext uri="{909E8E84-426E-40DD-AFC4-6F175D3DCCD1}">
+              <a14:hiddenFill xmlns:a14="http://schemas.microsoft.com/office/drawing/2010/main">
+                <a:solidFill>
+                  <a:schemeClr val="accent1"/>
+                </a:solidFill>
+              </a14:hiddenFill>
+            </a:ext>
+            <a:ext uri="{91240B29-F687-4F45-9708-019B960494DF}">
+              <a14:hiddenLine xmlns:a14="http://schemas.microsoft.com/office/drawing/2010/main" w="9525">
+                <a:solidFill>
+                  <a:schemeClr val="tx1"/>
+                </a:solidFill>
+                <a:miter lim="800000"/>
+                <a:headEnd/>
+                <a:tailEnd/>
+              </a14:hiddenLine>
+            </a:ext>
+            <a:ext uri="{AF507438-7753-43E0-B8FC-AC1667EBCBE1}">
+              <a14:hiddenEffects xmlns:a14="http://schemas.microsoft.com/office/drawing/2010/main">
+                <a:effectLst>
+                  <a:outerShdw dist="35921" dir="2700000" algn="ctr" rotWithShape="0">
+                    <a:schemeClr val="bg2"/>
+                  </a:outerShdw>
+                </a:effectLst>
+              </a14:hiddenEffects>
+            </a:ext>
+          </a:extLst>
         </p:spPr>
         <p:txBody>
-          <a:bodyPr wrap="none" lIns="91440" tIns="45720" rIns="91440" bIns="45720">
-            <a:spAutoFit/>
-          </a:bodyPr>
-          <a:lstStyle/>
-          <a:p>
-            <a:pPr algn="ctr"/>
-            <a:r>
-              <a:rPr lang="bg-BG" sz="28700" b="1" cap="none" spc="0" dirty="0" smtClean="0">
-                <a:ln w="900" cmpd="sng">
-                  <a:solidFill>
-                    <a:schemeClr val="accent1">
-                      <a:satMod val="190000"/>
-                      <a:alpha val="55000"/>
-                    </a:schemeClr>
-                  </a:solidFill>
-                  <a:prstDash val="solid"/>
-                </a:ln>
-                <a:solidFill>
-                  <a:schemeClr val="accent1">
-                    <a:satMod val="200000"/>
-                    <a:tint val="3000"/>
-                  </a:schemeClr>
-                </a:solidFill>
-                <a:effectLst>
-                  <a:innerShdw blurRad="101600" dist="76200" dir="5400000">
-                    <a:schemeClr val="accent1">
-                      <a:satMod val="190000"/>
-                      <a:tint val="100000"/>
-                      <a:alpha val="74000"/>
-                    </a:schemeClr>
-                  </a:innerShdw>
-                </a:effectLst>
-              </a:rPr>
-              <a:t>?</a:t>
-            </a:r>
-            <a:endParaRPr lang="bg-BG" sz="6000" b="1" cap="none" spc="0" dirty="0">
-              <a:ln w="900" cmpd="sng">
-                <a:solidFill>
-                  <a:schemeClr val="accent1">
-                    <a:satMod val="190000"/>
-                    <a:alpha val="55000"/>
-                  </a:schemeClr>
-                </a:solidFill>
-                <a:prstDash val="solid"/>
-              </a:ln>
+          <a:bodyPr anchor="ctr"/>
+          <a:lstStyle>
+            <a:lvl1pPr algn="ctr">
+              <a:defRPr sz="4400">
+                <a:solidFill>
+                  <a:schemeClr val="tx2"/>
+                </a:solidFill>
+                <a:latin typeface="Arial" charset="0"/>
+                <a:cs typeface="Arial" charset="0"/>
+              </a:defRPr>
+            </a:lvl1pPr>
+            <a:lvl2pPr algn="ctr">
+              <a:defRPr sz="4400">
+                <a:solidFill>
+                  <a:schemeClr val="tx2"/>
+                </a:solidFill>
+                <a:latin typeface="Arial" charset="0"/>
+                <a:cs typeface="Arial" charset="0"/>
+              </a:defRPr>
+            </a:lvl2pPr>
+            <a:lvl3pPr algn="ctr">
+              <a:defRPr sz="4400">
+                <a:solidFill>
+                  <a:schemeClr val="tx2"/>
+                </a:solidFill>
+                <a:latin typeface="Arial" charset="0"/>
+                <a:cs typeface="Arial" charset="0"/>
+              </a:defRPr>
+            </a:lvl3pPr>
+            <a:lvl4pPr algn="ctr">
+              <a:defRPr sz="4400">
+                <a:solidFill>
+                  <a:schemeClr val="tx2"/>
+                </a:solidFill>
+                <a:latin typeface="Arial" charset="0"/>
+                <a:cs typeface="Arial" charset="0"/>
+              </a:defRPr>
+            </a:lvl4pPr>
+            <a:lvl5pPr algn="ctr">
+              <a:defRPr sz="4400">
+                <a:solidFill>
+                  <a:schemeClr val="tx2"/>
+                </a:solidFill>
+                <a:latin typeface="Arial" charset="0"/>
+                <a:cs typeface="Arial" charset="0"/>
+              </a:defRPr>
+            </a:lvl5pPr>
+            <a:lvl6pPr marL="457200" algn="ctr" fontAlgn="base">
+              <a:spcBef>
+                <a:spcPct val="0"/>
+              </a:spcBef>
+              <a:spcAft>
+                <a:spcPct val="0"/>
+              </a:spcAft>
+              <a:defRPr sz="4400">
+                <a:solidFill>
+                  <a:schemeClr val="tx2"/>
+                </a:solidFill>
+                <a:latin typeface="Arial" charset="0"/>
+                <a:cs typeface="Arial" charset="0"/>
+              </a:defRPr>
+            </a:lvl6pPr>
+            <a:lvl7pPr marL="914400" algn="ctr" fontAlgn="base">
+              <a:spcBef>
+                <a:spcPct val="0"/>
+              </a:spcBef>
+              <a:spcAft>
+                <a:spcPct val="0"/>
+              </a:spcAft>
+              <a:defRPr sz="4400">
+                <a:solidFill>
+                  <a:schemeClr val="tx2"/>
+                </a:solidFill>
+                <a:latin typeface="Arial" charset="0"/>
+                <a:cs typeface="Arial" charset="0"/>
+              </a:defRPr>
+            </a:lvl7pPr>
+            <a:lvl8pPr marL="1371600" algn="ctr" fontAlgn="base">
+              <a:spcBef>
+                <a:spcPct val="0"/>
+              </a:spcBef>
+              <a:spcAft>
+                <a:spcPct val="0"/>
+              </a:spcAft>
+              <a:defRPr sz="4400">
+                <a:solidFill>
+                  <a:schemeClr val="tx2"/>
+                </a:solidFill>
+                <a:latin typeface="Arial" charset="0"/>
+                <a:cs typeface="Arial" charset="0"/>
+              </a:defRPr>
+            </a:lvl8pPr>
+            <a:lvl9pPr marL="1828800" algn="ctr" fontAlgn="base">
+              <a:spcBef>
+                <a:spcPct val="0"/>
+              </a:spcBef>
+              <a:spcAft>
+                <a:spcPct val="0"/>
+              </a:spcAft>
+              <a:defRPr sz="4400">
+                <a:solidFill>
+                  <a:schemeClr val="tx2"/>
+                </a:solidFill>
+                <a:latin typeface="Arial" charset="0"/>
+                <a:cs typeface="Arial" charset="0"/>
+              </a:defRPr>
+            </a:lvl9pPr>
+          </a:lstStyle>
+          <a:p>
+            <a:pPr algn="l"/>
+            <a:r>
+              <a:rPr lang="bg-BG" altLang="bg-BG" sz="2800" b="1" dirty="0" smtClean="0">
+                <a:solidFill>
+                  <a:schemeClr val="bg1"/>
+                </a:solidFill>
+              </a:rPr>
+              <a:t>Гошо – </a:t>
+            </a:r>
+            <a:r>
+              <a:rPr lang="en-GB" altLang="bg-BG" sz="2800" b="1" dirty="0" smtClean="0">
+                <a:solidFill>
+                  <a:schemeClr val="bg1"/>
+                </a:solidFill>
+              </a:rPr>
+              <a:t>themikuma@gmail.com </a:t>
+            </a:r>
+            <a:endParaRPr lang="bg-BG" altLang="bg-BG" sz="2800" b="1" dirty="0" smtClean="0">
               <a:solidFill>
-                <a:schemeClr val="accent1">
-                  <a:satMod val="200000"/>
-                  <a:tint val="3000"/>
-                </a:schemeClr>
+                <a:schemeClr val="bg1"/>
               </a:solidFill>
-              <a:effectLst>
-                <a:innerShdw blurRad="101600" dist="76200" dir="5400000">
-                  <a:schemeClr val="accent1">
-                    <a:satMod val="190000"/>
-                    <a:tint val="100000"/>
-                    <a:alpha val="74000"/>
-                  </a:schemeClr>
-                </a:innerShdw>
-              </a:effectLst>
+            </a:endParaRPr>
+          </a:p>
+          <a:p>
+            <a:pPr algn="l"/>
+            <a:r>
+              <a:rPr lang="bg-BG" altLang="bg-BG" sz="2800" b="1" dirty="0" smtClean="0">
+                <a:solidFill>
+                  <a:schemeClr val="bg1"/>
+                </a:solidFill>
+              </a:rPr>
+              <a:t>Слави – </a:t>
+            </a:r>
+            <a:r>
+              <a:rPr lang="en-US" altLang="bg-BG" sz="2800" b="1" dirty="0" smtClean="0">
+                <a:solidFill>
+                  <a:schemeClr val="bg1"/>
+                </a:solidFill>
+              </a:rPr>
+              <a:t>georgiev.slavi.94@gmail.com</a:t>
+            </a:r>
+            <a:endParaRPr lang="es-ES" altLang="bg-BG" sz="2800" b="1" dirty="0">
+              <a:solidFill>
+                <a:schemeClr val="bg1"/>
+              </a:solidFill>
             </a:endParaRPr>
           </a:p>
         </p:txBody>
@@ -4281,7 +4413,7 @@
     </p:spTree>
     <p:extLst>
       <p:ext uri="{BB962C8B-B14F-4D97-AF65-F5344CB8AC3E}">
-        <p14:creationId xmlns:p14="http://schemas.microsoft.com/office/powerpoint/2010/main" val="1054652420"/>
+        <p14:creationId xmlns:p14="http://schemas.microsoft.com/office/powerpoint/2010/main" val="3278958953"/>
       </p:ext>
     </p:extLst>
   </p:cSld>
@@ -4317,143 +4449,1384 @@
       </p:grpSpPr>
       <p:sp>
         <p:nvSpPr>
-          <p:cNvPr id="2" name="Правоъгълник 1"/>
-          <p:cNvSpPr/>
-          <p:nvPr/>
+          <p:cNvPr id="2" name="Title 1"/>
+          <p:cNvSpPr>
+            <a:spLocks noGrp="1"/>
+          </p:cNvSpPr>
+          <p:nvPr>
+            <p:ph type="title"/>
+          </p:nvPr>
+        </p:nvSpPr>
+        <p:spPr/>
+        <p:txBody>
+          <a:bodyPr/>
+          <a:lstStyle/>
+          <a:p>
+            <a:r>
+              <a:rPr lang="bg-BG" altLang="bg-BG" dirty="0" smtClean="0">
+                <a:solidFill>
+                  <a:schemeClr val="bg1"/>
+                </a:solidFill>
+              </a:rPr>
+              <a:t>Какво е метод</a:t>
+            </a:r>
+            <a:endParaRPr lang="en-US" dirty="0">
+              <a:ln w="18415" cmpd="sng">
+                <a:solidFill>
+                  <a:srgbClr val="FFFFFF"/>
+                </a:solidFill>
+                <a:prstDash val="solid"/>
+              </a:ln>
+              <a:solidFill>
+                <a:srgbClr val="FFFFFF"/>
+              </a:solidFill>
+            </a:endParaRPr>
+          </a:p>
+        </p:txBody>
+      </p:sp>
+      <p:sp>
+        <p:nvSpPr>
+          <p:cNvPr id="3" name="Content Placeholder 2"/>
+          <p:cNvSpPr>
+            <a:spLocks noGrp="1"/>
+          </p:cNvSpPr>
+          <p:nvPr>
+            <p:ph idx="1"/>
+          </p:nvPr>
         </p:nvSpPr>
         <p:spPr>
           <a:xfrm>
-            <a:off x="2377033" y="2564904"/>
-            <a:ext cx="5867375" cy="1938992"/>
+            <a:off x="971600" y="1556792"/>
+            <a:ext cx="7848872" cy="4525963"/>
+          </a:xfrm>
+        </p:spPr>
+        <p:txBody>
+          <a:bodyPr/>
+          <a:lstStyle/>
+          <a:p>
+            <a:pPr marL="1444625"/>
+            <a:r>
+              <a:rPr lang="bg-BG" b="1" dirty="0" smtClean="0">
+                <a:ln w="18415" cmpd="sng">
+                  <a:noFill/>
+                  <a:prstDash val="solid"/>
+                </a:ln>
+                <a:solidFill>
+                  <a:srgbClr val="FFFFFF"/>
+                </a:solidFill>
+              </a:rPr>
+              <a:t>Методът</a:t>
+            </a:r>
+            <a:r>
+              <a:rPr lang="bg-BG" dirty="0" smtClean="0">
+                <a:ln w="18415" cmpd="sng">
+                  <a:noFill/>
+                  <a:prstDash val="solid"/>
+                </a:ln>
+                <a:solidFill>
+                  <a:srgbClr val="FFFFFF"/>
+                </a:solidFill>
+              </a:rPr>
+              <a:t> е съставна част на програмата (подпрограма), която решава дадена </a:t>
+            </a:r>
+            <a:r>
+              <a:rPr lang="bg-BG" i="1" dirty="0" smtClean="0">
+                <a:ln w="18415" cmpd="sng">
+                  <a:noFill/>
+                  <a:prstDash val="solid"/>
+                </a:ln>
+                <a:solidFill>
+                  <a:srgbClr val="FFFFFF"/>
+                </a:solidFill>
+              </a:rPr>
+              <a:t>специфична</a:t>
+            </a:r>
+            <a:r>
+              <a:rPr lang="bg-BG" dirty="0" smtClean="0">
+                <a:ln w="18415" cmpd="sng">
+                  <a:noFill/>
+                  <a:prstDash val="solid"/>
+                </a:ln>
+                <a:solidFill>
+                  <a:srgbClr val="FFFFFF"/>
+                </a:solidFill>
+              </a:rPr>
+              <a:t> задача</a:t>
+            </a:r>
+          </a:p>
+          <a:p>
+            <a:pPr marL="1444625"/>
+            <a:r>
+              <a:rPr lang="bg-BG" b="1" dirty="0" smtClean="0">
+                <a:ln w="18415" cmpd="sng">
+                  <a:noFill/>
+                  <a:prstDash val="solid"/>
+                </a:ln>
+                <a:solidFill>
+                  <a:srgbClr val="FFFFFF"/>
+                </a:solidFill>
+              </a:rPr>
+              <a:t>Методът</a:t>
+            </a:r>
+            <a:r>
+              <a:rPr lang="bg-BG" dirty="0" smtClean="0">
+                <a:ln w="18415" cmpd="sng">
+                  <a:noFill/>
+                  <a:prstDash val="solid"/>
+                </a:ln>
+                <a:solidFill>
+                  <a:srgbClr val="FFFFFF"/>
+                </a:solidFill>
+              </a:rPr>
+              <a:t> може да приема параметри и да връща стойност</a:t>
+            </a:r>
+          </a:p>
+        </p:txBody>
+      </p:sp>
+    </p:spTree>
+    <p:extLst>
+      <p:ext uri="{BB962C8B-B14F-4D97-AF65-F5344CB8AC3E}">
+        <p14:creationId xmlns:p14="http://schemas.microsoft.com/office/powerpoint/2010/main" val="1834536983"/>
+      </p:ext>
+    </p:extLst>
+  </p:cSld>
+  <p:clrMapOvr>
+    <a:masterClrMapping/>
+  </p:clrMapOvr>
+  <p:timing>
+    <p:tnLst>
+      <p:par>
+        <p:cTn id="1" dur="indefinite" restart="never" nodeType="tmRoot"/>
+      </p:par>
+    </p:tnLst>
+  </p:timing>
+</p:sld>
+</file>
+
+<file path=ppt/slides/slide14.xml><?xml version="1.0" encoding="utf-8"?>
+<p:sld xmlns:a="http://schemas.openxmlformats.org/drawingml/2006/main" xmlns:r="http://schemas.openxmlformats.org/officeDocument/2006/relationships" xmlns:p="http://schemas.openxmlformats.org/presentationml/2006/main">
+  <p:cSld>
+    <p:spTree>
+      <p:nvGrpSpPr>
+        <p:cNvPr id="1" name=""/>
+        <p:cNvGrpSpPr/>
+        <p:nvPr/>
+      </p:nvGrpSpPr>
+      <p:grpSpPr>
+        <a:xfrm>
+          <a:off x="0" y="0"/>
+          <a:ext cx="0" cy="0"/>
+          <a:chOff x="0" y="0"/>
+          <a:chExt cx="0" cy="0"/>
+        </a:xfrm>
+      </p:grpSpPr>
+      <p:sp>
+        <p:nvSpPr>
+          <p:cNvPr id="2" name="Title 1"/>
+          <p:cNvSpPr>
+            <a:spLocks noGrp="1"/>
+          </p:cNvSpPr>
+          <p:nvPr>
+            <p:ph type="title"/>
+          </p:nvPr>
+        </p:nvSpPr>
+        <p:spPr>
+          <a:xfrm>
+            <a:off x="457200" y="274638"/>
+            <a:ext cx="8229600" cy="1498178"/>
+          </a:xfrm>
+        </p:spPr>
+        <p:txBody>
+          <a:bodyPr/>
+          <a:lstStyle/>
+          <a:p>
+            <a:r>
+              <a:rPr lang="bg-BG" altLang="bg-BG" dirty="0" smtClean="0">
+                <a:solidFill>
+                  <a:schemeClr val="bg1"/>
+                </a:solidFill>
+              </a:rPr>
+              <a:t>Защо да използваме методи?</a:t>
+            </a:r>
+            <a:endParaRPr lang="en-US" dirty="0">
+              <a:ln w="18415" cmpd="sng">
+                <a:solidFill>
+                  <a:srgbClr val="FFFFFF"/>
+                </a:solidFill>
+                <a:prstDash val="solid"/>
+              </a:ln>
+              <a:solidFill>
+                <a:srgbClr val="FFFFFF"/>
+              </a:solidFill>
+            </a:endParaRPr>
+          </a:p>
+        </p:txBody>
+      </p:sp>
+      <p:sp>
+        <p:nvSpPr>
+          <p:cNvPr id="3" name="Content Placeholder 2"/>
+          <p:cNvSpPr>
+            <a:spLocks noGrp="1"/>
+          </p:cNvSpPr>
+          <p:nvPr>
+            <p:ph idx="1"/>
+          </p:nvPr>
+        </p:nvSpPr>
+        <p:spPr>
+          <a:xfrm>
+            <a:off x="971600" y="1988840"/>
+            <a:ext cx="7992888" cy="4320480"/>
+          </a:xfrm>
+        </p:spPr>
+        <p:txBody>
+          <a:bodyPr/>
+          <a:lstStyle/>
+          <a:p>
+            <a:pPr marL="1444625"/>
+            <a:r>
+              <a:rPr lang="bg-BG" dirty="0" smtClean="0">
+                <a:ln w="18415" cmpd="sng">
+                  <a:noFill/>
+                  <a:prstDash val="solid"/>
+                </a:ln>
+                <a:solidFill>
+                  <a:srgbClr val="FFFFFF"/>
+                </a:solidFill>
+              </a:rPr>
+              <a:t>По-добро структуриране на кода</a:t>
+            </a:r>
+          </a:p>
+          <a:p>
+            <a:pPr marL="1444625"/>
+            <a:r>
+              <a:rPr lang="bg-BG" dirty="0" smtClean="0">
+                <a:ln w="18415" cmpd="sng">
+                  <a:noFill/>
+                  <a:prstDash val="solid"/>
+                </a:ln>
+                <a:solidFill>
+                  <a:srgbClr val="FFFFFF"/>
+                </a:solidFill>
+              </a:rPr>
+              <a:t>по-добра </a:t>
+            </a:r>
+            <a:r>
+              <a:rPr lang="bg-BG" dirty="0" err="1" smtClean="0">
+                <a:ln w="18415" cmpd="sng">
+                  <a:noFill/>
+                  <a:prstDash val="solid"/>
+                </a:ln>
+                <a:solidFill>
+                  <a:srgbClr val="FFFFFF"/>
+                </a:solidFill>
+              </a:rPr>
+              <a:t>четимост</a:t>
+            </a:r>
+            <a:endParaRPr lang="bg-BG" dirty="0" smtClean="0">
+              <a:ln w="18415" cmpd="sng">
+                <a:noFill/>
+                <a:prstDash val="solid"/>
+              </a:ln>
+              <a:solidFill>
+                <a:srgbClr val="FFFFFF"/>
+              </a:solidFill>
+            </a:endParaRPr>
+          </a:p>
+          <a:p>
+            <a:pPr marL="1444625"/>
+            <a:r>
+              <a:rPr lang="bg-BG" dirty="0" smtClean="0">
+                <a:ln w="18415" cmpd="sng">
+                  <a:noFill/>
+                  <a:prstDash val="solid"/>
+                </a:ln>
+                <a:solidFill>
+                  <a:srgbClr val="FFFFFF"/>
+                </a:solidFill>
+              </a:rPr>
+              <a:t>избягване на повторенията на код</a:t>
+            </a:r>
+          </a:p>
+          <a:p>
+            <a:pPr marL="1444625"/>
+            <a:r>
+              <a:rPr lang="bg-BG" dirty="0" smtClean="0">
+                <a:ln w="18415" cmpd="sng">
+                  <a:noFill/>
+                  <a:prstDash val="solid"/>
+                </a:ln>
+                <a:solidFill>
+                  <a:srgbClr val="FFFFFF"/>
+                </a:solidFill>
+              </a:rPr>
+              <a:t>улеснена поддръжка</a:t>
+            </a:r>
+          </a:p>
+          <a:p>
+            <a:pPr marL="1444625"/>
+            <a:r>
+              <a:rPr lang="bg-BG" dirty="0" err="1" smtClean="0">
+                <a:ln w="18415" cmpd="sng">
+                  <a:noFill/>
+                  <a:prstDash val="solid"/>
+                </a:ln>
+                <a:solidFill>
+                  <a:srgbClr val="FFFFFF"/>
+                </a:solidFill>
+              </a:rPr>
+              <a:t>преизползване</a:t>
+            </a:r>
+            <a:r>
+              <a:rPr lang="bg-BG" dirty="0" smtClean="0">
+                <a:ln w="18415" cmpd="sng">
+                  <a:noFill/>
+                  <a:prstDash val="solid"/>
+                </a:ln>
+                <a:solidFill>
+                  <a:srgbClr val="FFFFFF"/>
+                </a:solidFill>
+              </a:rPr>
+              <a:t> на кода</a:t>
+            </a:r>
+          </a:p>
+        </p:txBody>
+      </p:sp>
+    </p:spTree>
+    <p:extLst>
+      <p:ext uri="{BB962C8B-B14F-4D97-AF65-F5344CB8AC3E}">
+        <p14:creationId xmlns:p14="http://schemas.microsoft.com/office/powerpoint/2010/main" val="1417449748"/>
+      </p:ext>
+    </p:extLst>
+  </p:cSld>
+  <p:clrMapOvr>
+    <a:masterClrMapping/>
+  </p:clrMapOvr>
+  <p:timing>
+    <p:tnLst>
+      <p:par>
+        <p:cTn id="1" dur="indefinite" restart="never" nodeType="tmRoot"/>
+      </p:par>
+    </p:tnLst>
+  </p:timing>
+</p:sld>
+</file>
+
+<file path=ppt/slides/slide15.xml><?xml version="1.0" encoding="utf-8"?>
+<p:sld xmlns:a="http://schemas.openxmlformats.org/drawingml/2006/main" xmlns:r="http://schemas.openxmlformats.org/officeDocument/2006/relationships" xmlns:p="http://schemas.openxmlformats.org/presentationml/2006/main">
+  <p:cSld>
+    <p:spTree>
+      <p:nvGrpSpPr>
+        <p:cNvPr id="1" name=""/>
+        <p:cNvGrpSpPr/>
+        <p:nvPr/>
+      </p:nvGrpSpPr>
+      <p:grpSpPr>
+        <a:xfrm>
+          <a:off x="0" y="0"/>
+          <a:ext cx="0" cy="0"/>
+          <a:chOff x="0" y="0"/>
+          <a:chExt cx="0" cy="0"/>
+        </a:xfrm>
+      </p:grpSpPr>
+      <p:sp>
+        <p:nvSpPr>
+          <p:cNvPr id="106498" name="Rectangle 2"/>
+          <p:cNvSpPr>
+            <a:spLocks noGrp="1" noChangeArrowheads="1"/>
+          </p:cNvSpPr>
+          <p:nvPr>
+            <p:ph type="title"/>
+          </p:nvPr>
+        </p:nvSpPr>
+        <p:spPr>
+          <a:xfrm>
+            <a:off x="395536" y="188640"/>
+            <a:ext cx="8229600" cy="981075"/>
+          </a:xfrm>
+        </p:spPr>
+        <p:txBody>
+          <a:bodyPr/>
+          <a:lstStyle/>
+          <a:p>
+            <a:r>
+              <a:rPr lang="bg-BG" altLang="bg-BG" dirty="0" smtClean="0">
+                <a:solidFill>
+                  <a:schemeClr val="bg1"/>
+                </a:solidFill>
+              </a:rPr>
+              <a:t>Деклариране на метод</a:t>
+            </a:r>
+            <a:endParaRPr lang="bg-BG" altLang="bg-BG" dirty="0">
+              <a:solidFill>
+                <a:schemeClr val="bg1"/>
+              </a:solidFill>
+            </a:endParaRPr>
+          </a:p>
+        </p:txBody>
+      </p:sp>
+      <p:sp>
+        <p:nvSpPr>
+          <p:cNvPr id="6" name="Text Placeholder 3"/>
+          <p:cNvSpPr txBox="1">
+            <a:spLocks/>
+          </p:cNvSpPr>
+          <p:nvPr/>
+        </p:nvSpPr>
+        <p:spPr>
+          <a:xfrm>
+            <a:off x="2123728" y="1556792"/>
+            <a:ext cx="5904656" cy="2554545"/>
+          </a:xfrm>
+          <a:prstGeom prst="rect">
+            <a:avLst/>
+          </a:prstGeom>
+          <a:solidFill>
+            <a:srgbClr val="1F497D">
+              <a:lumMod val="60000"/>
+              <a:lumOff val="40000"/>
+              <a:alpha val="15000"/>
+            </a:srgbClr>
+          </a:solidFill>
+          <a:ln w="12700">
+            <a:noFill/>
+          </a:ln>
+        </p:spPr>
+        <p:txBody>
+          <a:bodyPr wrap="square">
+            <a:spAutoFit/>
+          </a:bodyPr>
+          <a:lstStyle>
+            <a:lvl1pPr marL="0" indent="0" algn="l" defTabSz="685800" rtl="0" eaLnBrk="1" latinLnBrk="0" hangingPunct="1">
+              <a:spcBef>
+                <a:spcPts val="0"/>
+              </a:spcBef>
+              <a:buFont typeface="Arial" pitchFamily="34" charset="0"/>
+              <a:buNone/>
+              <a:defRPr lang="en-US" sz="2400" kern="1200" smtClean="0">
+                <a:solidFill>
+                  <a:schemeClr val="bg2">
+                    <a:lumMod val="40000"/>
+                    <a:lumOff val="60000"/>
+                  </a:schemeClr>
+                </a:solidFill>
+                <a:latin typeface="Consolas" pitchFamily="49" charset="0"/>
+                <a:ea typeface="+mn-ea"/>
+                <a:cs typeface="Consolas" pitchFamily="49" charset="0"/>
+              </a:defRPr>
+            </a:lvl1pPr>
+            <a:lvl2pPr marL="557213" indent="-214313" algn="l" defTabSz="685800" rtl="0" eaLnBrk="1" latinLnBrk="0" hangingPunct="1">
+              <a:spcBef>
+                <a:spcPct val="20000"/>
+              </a:spcBef>
+              <a:buFont typeface="Arial" pitchFamily="34" charset="0"/>
+              <a:buChar char="–"/>
+              <a:defRPr sz="2100" kern="1200">
+                <a:solidFill>
+                  <a:schemeClr val="tx1"/>
+                </a:solidFill>
+                <a:latin typeface="+mn-lt"/>
+                <a:ea typeface="+mn-ea"/>
+                <a:cs typeface="+mn-cs"/>
+              </a:defRPr>
+            </a:lvl2pPr>
+            <a:lvl3pPr marL="857250" indent="-171450" algn="l" defTabSz="685800" rtl="0" eaLnBrk="1" latinLnBrk="0" hangingPunct="1">
+              <a:spcBef>
+                <a:spcPct val="20000"/>
+              </a:spcBef>
+              <a:buFont typeface="Arial" pitchFamily="34" charset="0"/>
+              <a:buChar char="•"/>
+              <a:defRPr sz="1800" kern="1200">
+                <a:solidFill>
+                  <a:schemeClr val="tx1"/>
+                </a:solidFill>
+                <a:latin typeface="+mn-lt"/>
+                <a:ea typeface="+mn-ea"/>
+                <a:cs typeface="+mn-cs"/>
+              </a:defRPr>
+            </a:lvl3pPr>
+            <a:lvl4pPr marL="1200150" indent="-171450" algn="l" defTabSz="685800" rtl="0" eaLnBrk="1" latinLnBrk="0" hangingPunct="1">
+              <a:spcBef>
+                <a:spcPct val="20000"/>
+              </a:spcBef>
+              <a:buFont typeface="Arial" pitchFamily="34" charset="0"/>
+              <a:buChar char="–"/>
+              <a:defRPr sz="1500" kern="1200">
+                <a:solidFill>
+                  <a:schemeClr val="tx1"/>
+                </a:solidFill>
+                <a:latin typeface="+mn-lt"/>
+                <a:ea typeface="+mn-ea"/>
+                <a:cs typeface="+mn-cs"/>
+              </a:defRPr>
+            </a:lvl4pPr>
+            <a:lvl5pPr marL="1543050" indent="-171450" algn="l" defTabSz="685800" rtl="0" eaLnBrk="1" latinLnBrk="0" hangingPunct="1">
+              <a:spcBef>
+                <a:spcPct val="20000"/>
+              </a:spcBef>
+              <a:buFont typeface="Arial" pitchFamily="34" charset="0"/>
+              <a:buChar char="»"/>
+              <a:defRPr sz="1500" kern="1200">
+                <a:solidFill>
+                  <a:schemeClr val="tx1"/>
+                </a:solidFill>
+                <a:latin typeface="+mn-lt"/>
+                <a:ea typeface="+mn-ea"/>
+                <a:cs typeface="+mn-cs"/>
+              </a:defRPr>
+            </a:lvl5pPr>
+            <a:lvl6pPr marL="1885950" indent="-171450" algn="l" defTabSz="685800" rtl="0" eaLnBrk="1" latinLnBrk="0" hangingPunct="1">
+              <a:spcBef>
+                <a:spcPct val="20000"/>
+              </a:spcBef>
+              <a:buFont typeface="Arial" pitchFamily="34" charset="0"/>
+              <a:buChar char="•"/>
+              <a:defRPr sz="1500" kern="1200">
+                <a:solidFill>
+                  <a:schemeClr val="tx1"/>
+                </a:solidFill>
+                <a:latin typeface="+mn-lt"/>
+                <a:ea typeface="+mn-ea"/>
+                <a:cs typeface="+mn-cs"/>
+              </a:defRPr>
+            </a:lvl6pPr>
+            <a:lvl7pPr marL="2228850" indent="-171450" algn="l" defTabSz="685800" rtl="0" eaLnBrk="1" latinLnBrk="0" hangingPunct="1">
+              <a:spcBef>
+                <a:spcPct val="20000"/>
+              </a:spcBef>
+              <a:buFont typeface="Arial" pitchFamily="34" charset="0"/>
+              <a:buChar char="•"/>
+              <a:defRPr sz="1500" kern="1200">
+                <a:solidFill>
+                  <a:schemeClr val="tx1"/>
+                </a:solidFill>
+                <a:latin typeface="+mn-lt"/>
+                <a:ea typeface="+mn-ea"/>
+                <a:cs typeface="+mn-cs"/>
+              </a:defRPr>
+            </a:lvl7pPr>
+            <a:lvl8pPr marL="2571750" indent="-171450" algn="l" defTabSz="685800" rtl="0" eaLnBrk="1" latinLnBrk="0" hangingPunct="1">
+              <a:spcBef>
+                <a:spcPct val="20000"/>
+              </a:spcBef>
+              <a:buFont typeface="Arial" pitchFamily="34" charset="0"/>
+              <a:buChar char="•"/>
+              <a:defRPr sz="1500" kern="1200">
+                <a:solidFill>
+                  <a:schemeClr val="tx1"/>
+                </a:solidFill>
+                <a:latin typeface="+mn-lt"/>
+                <a:ea typeface="+mn-ea"/>
+                <a:cs typeface="+mn-cs"/>
+              </a:defRPr>
+            </a:lvl8pPr>
+            <a:lvl9pPr marL="2914650" indent="-171450" algn="l" defTabSz="685800" rtl="0" eaLnBrk="1" latinLnBrk="0" hangingPunct="1">
+              <a:spcBef>
+                <a:spcPct val="20000"/>
+              </a:spcBef>
+              <a:buFont typeface="Arial" pitchFamily="34" charset="0"/>
+              <a:buChar char="•"/>
+              <a:defRPr sz="1500" kern="1200">
+                <a:solidFill>
+                  <a:schemeClr val="tx1"/>
+                </a:solidFill>
+                <a:latin typeface="+mn-lt"/>
+                <a:ea typeface="+mn-ea"/>
+                <a:cs typeface="+mn-cs"/>
+              </a:defRPr>
+            </a:lvl9pPr>
+          </a:lstStyle>
+          <a:p>
+            <a:pPr marR="0" lvl="0" algn="l" defTabSz="685800" rtl="0" eaLnBrk="1" fontAlgn="auto" latinLnBrk="0" hangingPunct="1">
+              <a:lnSpc>
+                <a:spcPct val="100000"/>
+              </a:lnSpc>
+              <a:spcBef>
+                <a:spcPts val="0"/>
+              </a:spcBef>
+              <a:spcAft>
+                <a:spcPts val="0"/>
+              </a:spcAft>
+              <a:buClrTx/>
+              <a:buSzTx/>
+              <a:tabLst/>
+              <a:defRPr/>
+            </a:pPr>
+            <a:r>
+              <a:rPr lang="en-US" sz="3200" i="1" dirty="0" smtClean="0">
+                <a:solidFill>
+                  <a:srgbClr val="11A7C5"/>
+                </a:solidFill>
+              </a:rPr>
+              <a:t>[</a:t>
+            </a:r>
+            <a:r>
+              <a:rPr lang="en-US" sz="3200" i="1" dirty="0" err="1" smtClean="0">
+                <a:solidFill>
+                  <a:srgbClr val="11A7C5"/>
+                </a:solidFill>
+              </a:rPr>
+              <a:t>public|private|protected|</a:t>
+            </a:r>
+            <a:r>
+              <a:rPr lang="en-US" sz="3200" i="1" dirty="0" err="1" smtClean="0">
+                <a:solidFill>
+                  <a:srgbClr val="11A7C5"/>
+                </a:solidFill>
+              </a:rPr>
+              <a:t>internal</a:t>
+            </a:r>
+            <a:r>
+              <a:rPr lang="en-US" sz="3200" i="1" dirty="0" smtClean="0">
+                <a:solidFill>
+                  <a:srgbClr val="11A7C5"/>
+                </a:solidFill>
+              </a:rPr>
+              <a:t>] </a:t>
+            </a:r>
+            <a:r>
+              <a:rPr lang="en-US" sz="3200" i="1" dirty="0" smtClean="0">
+                <a:solidFill>
+                  <a:srgbClr val="11A7C5"/>
+                </a:solidFill>
+              </a:rPr>
+              <a:t>[static] </a:t>
+            </a:r>
+            <a:r>
+              <a:rPr lang="en-US" sz="3200" i="1" dirty="0" smtClean="0">
+                <a:solidFill>
+                  <a:srgbClr val="11A7C5"/>
+                </a:solidFill>
+              </a:rPr>
+              <a:t>[…] &lt;</a:t>
+            </a:r>
+            <a:r>
+              <a:rPr lang="bg-BG" sz="3200" i="1" dirty="0" smtClean="0">
+                <a:solidFill>
+                  <a:srgbClr val="11A7C5"/>
+                </a:solidFill>
+              </a:rPr>
+              <a:t>връщан тип</a:t>
+            </a:r>
+            <a:r>
+              <a:rPr lang="en-US" sz="3200" i="1" dirty="0" smtClean="0">
+                <a:solidFill>
+                  <a:srgbClr val="11A7C5"/>
+                </a:solidFill>
+              </a:rPr>
+              <a:t>&gt;</a:t>
+            </a:r>
+            <a:r>
+              <a:rPr lang="bg-BG" sz="3200" i="1" dirty="0" smtClean="0">
+                <a:solidFill>
+                  <a:srgbClr val="11A7C5"/>
+                </a:solidFill>
+              </a:rPr>
+              <a:t> </a:t>
+            </a:r>
+            <a:r>
+              <a:rPr lang="en-US" sz="3200" i="1" dirty="0" smtClean="0">
+                <a:solidFill>
+                  <a:srgbClr val="11A7C5"/>
+                </a:solidFill>
+              </a:rPr>
+              <a:t>&lt;</a:t>
+            </a:r>
+            <a:r>
+              <a:rPr lang="bg-BG" sz="3200" i="1" dirty="0" smtClean="0">
+                <a:solidFill>
+                  <a:srgbClr val="11A7C5"/>
+                </a:solidFill>
+              </a:rPr>
+              <a:t>име на метода</a:t>
+            </a:r>
+            <a:r>
+              <a:rPr lang="en-US" sz="3200" i="1" dirty="0" smtClean="0">
+                <a:solidFill>
+                  <a:srgbClr val="11A7C5"/>
+                </a:solidFill>
+              </a:rPr>
+              <a:t>&gt;</a:t>
+            </a:r>
+            <a:r>
+              <a:rPr lang="bg-BG" sz="3200" i="1" dirty="0" smtClean="0">
+                <a:solidFill>
+                  <a:srgbClr val="11A7C5"/>
+                </a:solidFill>
+              </a:rPr>
+              <a:t> </a:t>
+            </a:r>
+            <a:r>
+              <a:rPr lang="en-US" sz="3200" i="1" dirty="0" smtClean="0">
+                <a:solidFill>
+                  <a:srgbClr val="11A7C5"/>
+                </a:solidFill>
+              </a:rPr>
+              <a:t>([</a:t>
+            </a:r>
+            <a:r>
+              <a:rPr lang="bg-BG" sz="3200" i="1" dirty="0" smtClean="0">
+                <a:solidFill>
+                  <a:srgbClr val="11A7C5"/>
+                </a:solidFill>
+              </a:rPr>
+              <a:t>списък с параметри</a:t>
+            </a:r>
+            <a:r>
+              <a:rPr lang="en-US" sz="3200" i="1" dirty="0" smtClean="0">
+                <a:solidFill>
+                  <a:srgbClr val="11A7C5"/>
+                </a:solidFill>
+              </a:rPr>
+              <a:t>])</a:t>
+            </a:r>
+            <a:endParaRPr lang="en-US" sz="3200" b="1" i="1" dirty="0">
+              <a:solidFill>
+                <a:srgbClr val="11A7C5"/>
+              </a:solidFill>
+            </a:endParaRPr>
+          </a:p>
+        </p:txBody>
+      </p:sp>
+      <p:sp>
+        <p:nvSpPr>
+          <p:cNvPr id="7" name="Rectangle 3"/>
+          <p:cNvSpPr txBox="1">
+            <a:spLocks noChangeArrowheads="1"/>
+          </p:cNvSpPr>
+          <p:nvPr/>
+        </p:nvSpPr>
+        <p:spPr bwMode="auto">
+          <a:xfrm>
+            <a:off x="2123728" y="4365104"/>
+            <a:ext cx="6768752" cy="648072"/>
           </a:xfrm>
           <a:prstGeom prst="rect">
             <a:avLst/>
           </a:prstGeom>
           <a:noFill/>
+          <a:ln>
+            <a:noFill/>
+          </a:ln>
+          <a:effectLst/>
+          <a:extLst>
+            <a:ext uri="{909E8E84-426E-40DD-AFC4-6F175D3DCCD1}">
+              <a14:hiddenFill xmlns:a14="http://schemas.microsoft.com/office/drawing/2010/main">
+                <a:solidFill>
+                  <a:schemeClr val="accent1"/>
+                </a:solidFill>
+              </a14:hiddenFill>
+            </a:ext>
+            <a:ext uri="{91240B29-F687-4F45-9708-019B960494DF}">
+              <a14:hiddenLine xmlns:a14="http://schemas.microsoft.com/office/drawing/2010/main" w="9525">
+                <a:solidFill>
+                  <a:schemeClr val="tx1"/>
+                </a:solidFill>
+                <a:miter lim="800000"/>
+                <a:headEnd/>
+                <a:tailEnd/>
+              </a14:hiddenLine>
+            </a:ext>
+            <a:ext uri="{AF507438-7753-43E0-B8FC-AC1667EBCBE1}">
+              <a14:hiddenEffects xmlns:a14="http://schemas.microsoft.com/office/drawing/2010/main">
+                <a:effectLst>
+                  <a:outerShdw dist="35921" dir="2700000" algn="ctr" rotWithShape="0">
+                    <a:schemeClr val="bg2"/>
+                  </a:outerShdw>
+                </a:effectLst>
+              </a14:hiddenEffects>
+            </a:ext>
+          </a:extLst>
         </p:spPr>
         <p:txBody>
-          <a:bodyPr wrap="none" lIns="91440" tIns="45720" rIns="91440" bIns="45720">
+          <a:bodyPr vert="horz" wrap="square" lIns="91440" tIns="45720" rIns="91440" bIns="45720" numCol="1" anchor="t" anchorCtr="0" compatLnSpc="1">
+            <a:prstTxWarp prst="textNoShape">
+              <a:avLst/>
+            </a:prstTxWarp>
+          </a:bodyPr>
+          <a:lstStyle>
+            <a:lvl1pPr marL="342900" indent="-342900" algn="l" rtl="0" fontAlgn="base">
+              <a:spcBef>
+                <a:spcPct val="20000"/>
+              </a:spcBef>
+              <a:spcAft>
+                <a:spcPct val="0"/>
+              </a:spcAft>
+              <a:buChar char="•"/>
+              <a:defRPr sz="3200">
+                <a:solidFill>
+                  <a:schemeClr val="tx1"/>
+                </a:solidFill>
+                <a:latin typeface="+mn-lt"/>
+                <a:ea typeface="+mn-ea"/>
+                <a:cs typeface="+mn-cs"/>
+              </a:defRPr>
+            </a:lvl1pPr>
+            <a:lvl2pPr marL="742950" indent="-285750" algn="l" rtl="0" fontAlgn="base">
+              <a:spcBef>
+                <a:spcPct val="20000"/>
+              </a:spcBef>
+              <a:spcAft>
+                <a:spcPct val="0"/>
+              </a:spcAft>
+              <a:buChar char="–"/>
+              <a:defRPr sz="2800">
+                <a:solidFill>
+                  <a:schemeClr val="tx1"/>
+                </a:solidFill>
+                <a:latin typeface="+mn-lt"/>
+                <a:cs typeface="+mn-cs"/>
+              </a:defRPr>
+            </a:lvl2pPr>
+            <a:lvl3pPr marL="1143000" indent="-228600" algn="l" rtl="0" fontAlgn="base">
+              <a:spcBef>
+                <a:spcPct val="20000"/>
+              </a:spcBef>
+              <a:spcAft>
+                <a:spcPct val="0"/>
+              </a:spcAft>
+              <a:buChar char="•"/>
+              <a:defRPr sz="2400">
+                <a:solidFill>
+                  <a:schemeClr val="tx1"/>
+                </a:solidFill>
+                <a:latin typeface="+mn-lt"/>
+                <a:cs typeface="+mn-cs"/>
+              </a:defRPr>
+            </a:lvl3pPr>
+            <a:lvl4pPr marL="1600200" indent="-228600" algn="l" rtl="0" fontAlgn="base">
+              <a:spcBef>
+                <a:spcPct val="20000"/>
+              </a:spcBef>
+              <a:spcAft>
+                <a:spcPct val="0"/>
+              </a:spcAft>
+              <a:buChar char="–"/>
+              <a:defRPr sz="2000">
+                <a:solidFill>
+                  <a:schemeClr val="tx1"/>
+                </a:solidFill>
+                <a:latin typeface="+mn-lt"/>
+                <a:cs typeface="+mn-cs"/>
+              </a:defRPr>
+            </a:lvl4pPr>
+            <a:lvl5pPr marL="2057400" indent="-228600" algn="l" rtl="0" fontAlgn="base">
+              <a:spcBef>
+                <a:spcPct val="20000"/>
+              </a:spcBef>
+              <a:spcAft>
+                <a:spcPct val="0"/>
+              </a:spcAft>
+              <a:buChar char="»"/>
+              <a:defRPr sz="2000">
+                <a:solidFill>
+                  <a:schemeClr val="tx1"/>
+                </a:solidFill>
+                <a:latin typeface="+mn-lt"/>
+                <a:cs typeface="+mn-cs"/>
+              </a:defRPr>
+            </a:lvl5pPr>
+            <a:lvl6pPr marL="2514600" indent="-228600" algn="l" rtl="0" fontAlgn="base">
+              <a:spcBef>
+                <a:spcPct val="20000"/>
+              </a:spcBef>
+              <a:spcAft>
+                <a:spcPct val="0"/>
+              </a:spcAft>
+              <a:buChar char="»"/>
+              <a:defRPr sz="2000">
+                <a:solidFill>
+                  <a:schemeClr val="tx1"/>
+                </a:solidFill>
+                <a:latin typeface="+mn-lt"/>
+                <a:cs typeface="+mn-cs"/>
+              </a:defRPr>
+            </a:lvl6pPr>
+            <a:lvl7pPr marL="2971800" indent="-228600" algn="l" rtl="0" fontAlgn="base">
+              <a:spcBef>
+                <a:spcPct val="20000"/>
+              </a:spcBef>
+              <a:spcAft>
+                <a:spcPct val="0"/>
+              </a:spcAft>
+              <a:buChar char="»"/>
+              <a:defRPr sz="2000">
+                <a:solidFill>
+                  <a:schemeClr val="tx1"/>
+                </a:solidFill>
+                <a:latin typeface="+mn-lt"/>
+                <a:cs typeface="+mn-cs"/>
+              </a:defRPr>
+            </a:lvl7pPr>
+            <a:lvl8pPr marL="3429000" indent="-228600" algn="l" rtl="0" fontAlgn="base">
+              <a:spcBef>
+                <a:spcPct val="20000"/>
+              </a:spcBef>
+              <a:spcAft>
+                <a:spcPct val="0"/>
+              </a:spcAft>
+              <a:buChar char="»"/>
+              <a:defRPr sz="2000">
+                <a:solidFill>
+                  <a:schemeClr val="tx1"/>
+                </a:solidFill>
+                <a:latin typeface="+mn-lt"/>
+                <a:cs typeface="+mn-cs"/>
+              </a:defRPr>
+            </a:lvl8pPr>
+            <a:lvl9pPr marL="3886200" indent="-228600" algn="l" rtl="0" fontAlgn="base">
+              <a:spcBef>
+                <a:spcPct val="20000"/>
+              </a:spcBef>
+              <a:spcAft>
+                <a:spcPct val="0"/>
+              </a:spcAft>
+              <a:buChar char="»"/>
+              <a:defRPr sz="2000">
+                <a:solidFill>
+                  <a:schemeClr val="tx1"/>
+                </a:solidFill>
+                <a:latin typeface="+mn-lt"/>
+                <a:cs typeface="+mn-cs"/>
+              </a:defRPr>
+            </a:lvl9pPr>
+          </a:lstStyle>
+          <a:p>
+            <a:pPr marL="0" indent="0">
+              <a:buNone/>
+            </a:pPr>
+            <a:r>
+              <a:rPr lang="bg-BG" altLang="bg-BG" kern="0" dirty="0" smtClean="0">
+                <a:solidFill>
+                  <a:schemeClr val="bg1"/>
+                </a:solidFill>
+              </a:rPr>
+              <a:t>Например:</a:t>
+            </a:r>
+            <a:endParaRPr lang="bg-BG" altLang="bg-BG" kern="0" dirty="0">
+              <a:solidFill>
+                <a:schemeClr val="bg1"/>
+              </a:solidFill>
+            </a:endParaRPr>
+          </a:p>
+        </p:txBody>
+      </p:sp>
+      <p:sp>
+        <p:nvSpPr>
+          <p:cNvPr id="8" name="Text Placeholder 3"/>
+          <p:cNvSpPr txBox="1">
+            <a:spLocks/>
+          </p:cNvSpPr>
+          <p:nvPr/>
+        </p:nvSpPr>
+        <p:spPr>
+          <a:xfrm>
+            <a:off x="2123728" y="5232102"/>
+            <a:ext cx="5904656" cy="1077218"/>
+          </a:xfrm>
+          <a:prstGeom prst="rect">
+            <a:avLst/>
+          </a:prstGeom>
+          <a:solidFill>
+            <a:srgbClr val="1F497D">
+              <a:lumMod val="60000"/>
+              <a:lumOff val="40000"/>
+              <a:alpha val="15000"/>
+            </a:srgbClr>
+          </a:solidFill>
+          <a:ln w="12700">
+            <a:noFill/>
+          </a:ln>
+        </p:spPr>
+        <p:txBody>
+          <a:bodyPr wrap="square">
             <a:spAutoFit/>
           </a:bodyPr>
+          <a:lstStyle>
+            <a:lvl1pPr marL="0" indent="0" algn="l" defTabSz="685800" rtl="0" eaLnBrk="1" latinLnBrk="0" hangingPunct="1">
+              <a:spcBef>
+                <a:spcPts val="0"/>
+              </a:spcBef>
+              <a:buFont typeface="Arial" pitchFamily="34" charset="0"/>
+              <a:buNone/>
+              <a:defRPr lang="en-US" sz="2400" kern="1200" smtClean="0">
+                <a:solidFill>
+                  <a:schemeClr val="bg2">
+                    <a:lumMod val="40000"/>
+                    <a:lumOff val="60000"/>
+                  </a:schemeClr>
+                </a:solidFill>
+                <a:latin typeface="Consolas" pitchFamily="49" charset="0"/>
+                <a:ea typeface="+mn-ea"/>
+                <a:cs typeface="Consolas" pitchFamily="49" charset="0"/>
+              </a:defRPr>
+            </a:lvl1pPr>
+            <a:lvl2pPr marL="557213" indent="-214313" algn="l" defTabSz="685800" rtl="0" eaLnBrk="1" latinLnBrk="0" hangingPunct="1">
+              <a:spcBef>
+                <a:spcPct val="20000"/>
+              </a:spcBef>
+              <a:buFont typeface="Arial" pitchFamily="34" charset="0"/>
+              <a:buChar char="–"/>
+              <a:defRPr sz="2100" kern="1200">
+                <a:solidFill>
+                  <a:schemeClr val="tx1"/>
+                </a:solidFill>
+                <a:latin typeface="+mn-lt"/>
+                <a:ea typeface="+mn-ea"/>
+                <a:cs typeface="+mn-cs"/>
+              </a:defRPr>
+            </a:lvl2pPr>
+            <a:lvl3pPr marL="857250" indent="-171450" algn="l" defTabSz="685800" rtl="0" eaLnBrk="1" latinLnBrk="0" hangingPunct="1">
+              <a:spcBef>
+                <a:spcPct val="20000"/>
+              </a:spcBef>
+              <a:buFont typeface="Arial" pitchFamily="34" charset="0"/>
+              <a:buChar char="•"/>
+              <a:defRPr sz="1800" kern="1200">
+                <a:solidFill>
+                  <a:schemeClr val="tx1"/>
+                </a:solidFill>
+                <a:latin typeface="+mn-lt"/>
+                <a:ea typeface="+mn-ea"/>
+                <a:cs typeface="+mn-cs"/>
+              </a:defRPr>
+            </a:lvl3pPr>
+            <a:lvl4pPr marL="1200150" indent="-171450" algn="l" defTabSz="685800" rtl="0" eaLnBrk="1" latinLnBrk="0" hangingPunct="1">
+              <a:spcBef>
+                <a:spcPct val="20000"/>
+              </a:spcBef>
+              <a:buFont typeface="Arial" pitchFamily="34" charset="0"/>
+              <a:buChar char="–"/>
+              <a:defRPr sz="1500" kern="1200">
+                <a:solidFill>
+                  <a:schemeClr val="tx1"/>
+                </a:solidFill>
+                <a:latin typeface="+mn-lt"/>
+                <a:ea typeface="+mn-ea"/>
+                <a:cs typeface="+mn-cs"/>
+              </a:defRPr>
+            </a:lvl4pPr>
+            <a:lvl5pPr marL="1543050" indent="-171450" algn="l" defTabSz="685800" rtl="0" eaLnBrk="1" latinLnBrk="0" hangingPunct="1">
+              <a:spcBef>
+                <a:spcPct val="20000"/>
+              </a:spcBef>
+              <a:buFont typeface="Arial" pitchFamily="34" charset="0"/>
+              <a:buChar char="»"/>
+              <a:defRPr sz="1500" kern="1200">
+                <a:solidFill>
+                  <a:schemeClr val="tx1"/>
+                </a:solidFill>
+                <a:latin typeface="+mn-lt"/>
+                <a:ea typeface="+mn-ea"/>
+                <a:cs typeface="+mn-cs"/>
+              </a:defRPr>
+            </a:lvl5pPr>
+            <a:lvl6pPr marL="1885950" indent="-171450" algn="l" defTabSz="685800" rtl="0" eaLnBrk="1" latinLnBrk="0" hangingPunct="1">
+              <a:spcBef>
+                <a:spcPct val="20000"/>
+              </a:spcBef>
+              <a:buFont typeface="Arial" pitchFamily="34" charset="0"/>
+              <a:buChar char="•"/>
+              <a:defRPr sz="1500" kern="1200">
+                <a:solidFill>
+                  <a:schemeClr val="tx1"/>
+                </a:solidFill>
+                <a:latin typeface="+mn-lt"/>
+                <a:ea typeface="+mn-ea"/>
+                <a:cs typeface="+mn-cs"/>
+              </a:defRPr>
+            </a:lvl6pPr>
+            <a:lvl7pPr marL="2228850" indent="-171450" algn="l" defTabSz="685800" rtl="0" eaLnBrk="1" latinLnBrk="0" hangingPunct="1">
+              <a:spcBef>
+                <a:spcPct val="20000"/>
+              </a:spcBef>
+              <a:buFont typeface="Arial" pitchFamily="34" charset="0"/>
+              <a:buChar char="•"/>
+              <a:defRPr sz="1500" kern="1200">
+                <a:solidFill>
+                  <a:schemeClr val="tx1"/>
+                </a:solidFill>
+                <a:latin typeface="+mn-lt"/>
+                <a:ea typeface="+mn-ea"/>
+                <a:cs typeface="+mn-cs"/>
+              </a:defRPr>
+            </a:lvl7pPr>
+            <a:lvl8pPr marL="2571750" indent="-171450" algn="l" defTabSz="685800" rtl="0" eaLnBrk="1" latinLnBrk="0" hangingPunct="1">
+              <a:spcBef>
+                <a:spcPct val="20000"/>
+              </a:spcBef>
+              <a:buFont typeface="Arial" pitchFamily="34" charset="0"/>
+              <a:buChar char="•"/>
+              <a:defRPr sz="1500" kern="1200">
+                <a:solidFill>
+                  <a:schemeClr val="tx1"/>
+                </a:solidFill>
+                <a:latin typeface="+mn-lt"/>
+                <a:ea typeface="+mn-ea"/>
+                <a:cs typeface="+mn-cs"/>
+              </a:defRPr>
+            </a:lvl8pPr>
+            <a:lvl9pPr marL="2914650" indent="-171450" algn="l" defTabSz="685800" rtl="0" eaLnBrk="1" latinLnBrk="0" hangingPunct="1">
+              <a:spcBef>
+                <a:spcPct val="20000"/>
+              </a:spcBef>
+              <a:buFont typeface="Arial" pitchFamily="34" charset="0"/>
+              <a:buChar char="•"/>
+              <a:defRPr sz="1500" kern="1200">
+                <a:solidFill>
+                  <a:schemeClr val="tx1"/>
+                </a:solidFill>
+                <a:latin typeface="+mn-lt"/>
+                <a:ea typeface="+mn-ea"/>
+                <a:cs typeface="+mn-cs"/>
+              </a:defRPr>
+            </a:lvl9pPr>
+          </a:lstStyle>
+          <a:p>
+            <a:pPr marR="0" lvl="0" algn="l" defTabSz="685800" rtl="0" eaLnBrk="1" fontAlgn="auto" latinLnBrk="0" hangingPunct="1">
+              <a:lnSpc>
+                <a:spcPct val="100000"/>
+              </a:lnSpc>
+              <a:spcBef>
+                <a:spcPts val="0"/>
+              </a:spcBef>
+              <a:spcAft>
+                <a:spcPts val="0"/>
+              </a:spcAft>
+              <a:buClrTx/>
+              <a:buSzTx/>
+              <a:tabLst/>
+              <a:defRPr/>
+            </a:pPr>
+            <a:r>
+              <a:rPr lang="en-US" sz="3200" b="1" i="1" dirty="0" smtClean="0">
+                <a:solidFill>
+                  <a:srgbClr val="11A7C5"/>
+                </a:solidFill>
+              </a:rPr>
+              <a:t>public static void Main (string[] </a:t>
+            </a:r>
+            <a:r>
+              <a:rPr lang="en-US" sz="3200" b="1" i="1" dirty="0" err="1" smtClean="0">
+                <a:solidFill>
+                  <a:srgbClr val="11A7C5"/>
+                </a:solidFill>
+              </a:rPr>
+              <a:t>args</a:t>
+            </a:r>
+            <a:r>
+              <a:rPr lang="en-US" sz="3200" b="1" i="1" dirty="0" smtClean="0">
+                <a:solidFill>
+                  <a:srgbClr val="11A7C5"/>
+                </a:solidFill>
+              </a:rPr>
+              <a:t>)</a:t>
+            </a:r>
+            <a:endParaRPr lang="en-US" sz="3200" b="1" i="1" dirty="0">
+              <a:solidFill>
+                <a:srgbClr val="11A7C5"/>
+              </a:solidFill>
+            </a:endParaRPr>
+          </a:p>
+        </p:txBody>
+      </p:sp>
+    </p:spTree>
+    <p:extLst>
+      <p:ext uri="{BB962C8B-B14F-4D97-AF65-F5344CB8AC3E}">
+        <p14:creationId xmlns:p14="http://schemas.microsoft.com/office/powerpoint/2010/main" val="3687054277"/>
+      </p:ext>
+    </p:extLst>
+  </p:cSld>
+  <p:clrMapOvr>
+    <a:masterClrMapping/>
+  </p:clrMapOvr>
+  <p:timing>
+    <p:tnLst>
+      <p:par>
+        <p:cTn id="1" dur="indefinite" restart="never" nodeType="tmRoot"/>
+      </p:par>
+    </p:tnLst>
+  </p:timing>
+</p:sld>
+</file>
+
+<file path=ppt/slides/slide16.xml><?xml version="1.0" encoding="utf-8"?>
+<p:sld xmlns:a="http://schemas.openxmlformats.org/drawingml/2006/main" xmlns:r="http://schemas.openxmlformats.org/officeDocument/2006/relationships" xmlns:p="http://schemas.openxmlformats.org/presentationml/2006/main">
+  <p:cSld>
+    <p:spTree>
+      <p:nvGrpSpPr>
+        <p:cNvPr id="1" name=""/>
+        <p:cNvGrpSpPr/>
+        <p:nvPr/>
+      </p:nvGrpSpPr>
+      <p:grpSpPr>
+        <a:xfrm>
+          <a:off x="0" y="0"/>
+          <a:ext cx="0" cy="0"/>
+          <a:chOff x="0" y="0"/>
+          <a:chExt cx="0" cy="0"/>
+        </a:xfrm>
+      </p:grpSpPr>
+      <p:sp>
+        <p:nvSpPr>
+          <p:cNvPr id="2" name="Title 1"/>
+          <p:cNvSpPr>
+            <a:spLocks noGrp="1"/>
+          </p:cNvSpPr>
+          <p:nvPr>
+            <p:ph type="title"/>
+          </p:nvPr>
+        </p:nvSpPr>
+        <p:spPr>
+          <a:xfrm>
+            <a:off x="457200" y="274638"/>
+            <a:ext cx="8229600" cy="1498178"/>
+          </a:xfrm>
+        </p:spPr>
+        <p:txBody>
+          <a:bodyPr/>
           <a:lstStyle/>
           <a:p>
-            <a:pPr algn="ctr"/>
-            <a:r>
-              <a:rPr lang="bg-BG" sz="6000" b="1" dirty="0" smtClean="0">
-                <a:ln w="900" cmpd="sng">
-                  <a:solidFill>
-                    <a:schemeClr val="accent1">
-                      <a:satMod val="190000"/>
-                      <a:alpha val="55000"/>
-                    </a:schemeClr>
-                  </a:solidFill>
-                  <a:prstDash val="solid"/>
-                </a:ln>
-                <a:solidFill>
-                  <a:schemeClr val="accent1">
-                    <a:satMod val="200000"/>
-                    <a:tint val="3000"/>
-                  </a:schemeClr>
-                </a:solidFill>
-                <a:effectLst>
-                  <a:innerShdw blurRad="101600" dist="76200" dir="5400000">
-                    <a:schemeClr val="accent1">
-                      <a:satMod val="190000"/>
-                      <a:tint val="100000"/>
-                      <a:alpha val="74000"/>
-                    </a:schemeClr>
-                  </a:innerShdw>
-                </a:effectLst>
-              </a:rPr>
-              <a:t>Благодарим за</a:t>
-            </a:r>
-          </a:p>
-          <a:p>
-            <a:pPr algn="ctr"/>
-            <a:r>
-              <a:rPr lang="bg-BG" sz="6000" b="1" dirty="0" smtClean="0">
-                <a:ln w="900" cmpd="sng">
-                  <a:solidFill>
-                    <a:schemeClr val="accent1">
-                      <a:satMod val="190000"/>
-                      <a:alpha val="55000"/>
-                    </a:schemeClr>
-                  </a:solidFill>
-                  <a:prstDash val="solid"/>
-                </a:ln>
-                <a:solidFill>
-                  <a:schemeClr val="accent1">
-                    <a:satMod val="200000"/>
-                    <a:tint val="3000"/>
-                  </a:schemeClr>
-                </a:solidFill>
-                <a:effectLst>
-                  <a:innerShdw blurRad="101600" dist="76200" dir="5400000">
-                    <a:schemeClr val="accent1">
-                      <a:satMod val="190000"/>
-                      <a:tint val="100000"/>
-                      <a:alpha val="74000"/>
-                    </a:schemeClr>
-                  </a:innerShdw>
-                </a:effectLst>
-              </a:rPr>
-              <a:t>вниманието </a:t>
-            </a:r>
-            <a:r>
-              <a:rPr lang="bg-BG" sz="6000" b="1" dirty="0" smtClean="0">
-                <a:ln w="900" cmpd="sng">
-                  <a:solidFill>
-                    <a:schemeClr val="accent1">
-                      <a:satMod val="190000"/>
-                      <a:alpha val="55000"/>
-                    </a:schemeClr>
-                  </a:solidFill>
-                  <a:prstDash val="solid"/>
-                </a:ln>
-                <a:solidFill>
-                  <a:schemeClr val="accent1">
-                    <a:satMod val="200000"/>
-                    <a:tint val="3000"/>
-                  </a:schemeClr>
-                </a:solidFill>
-                <a:effectLst>
-                  <a:innerShdw blurRad="101600" dist="76200" dir="5400000">
-                    <a:schemeClr val="accent1">
-                      <a:satMod val="190000"/>
-                      <a:tint val="100000"/>
-                      <a:alpha val="74000"/>
-                    </a:schemeClr>
-                  </a:innerShdw>
-                </a:effectLst>
-                <a:sym typeface="Wingdings"/>
-              </a:rPr>
-              <a:t></a:t>
-            </a:r>
-            <a:endParaRPr lang="bg-BG" sz="6000" b="1" dirty="0" smtClean="0">
-              <a:ln w="900" cmpd="sng">
-                <a:solidFill>
-                  <a:schemeClr val="accent1">
-                    <a:satMod val="190000"/>
-                    <a:alpha val="55000"/>
-                  </a:schemeClr>
+            <a:r>
+              <a:rPr lang="bg-BG" dirty="0" smtClean="0">
+                <a:solidFill>
+                  <a:schemeClr val="bg1"/>
+                </a:solidFill>
+              </a:rPr>
+              <a:t>Именуване на метод</a:t>
+            </a:r>
+            <a:endParaRPr lang="en-US" dirty="0">
+              <a:ln w="18415" cmpd="sng">
+                <a:solidFill>
+                  <a:srgbClr val="FFFFFF"/>
                 </a:solidFill>
                 <a:prstDash val="solid"/>
               </a:ln>
               <a:solidFill>
-                <a:schemeClr val="accent1">
-                  <a:satMod val="200000"/>
-                  <a:tint val="3000"/>
-                </a:schemeClr>
+                <a:srgbClr val="FFFFFF"/>
               </a:solidFill>
-              <a:effectLst>
-                <a:innerShdw blurRad="101600" dist="76200" dir="5400000">
-                  <a:schemeClr val="accent1">
-                    <a:satMod val="190000"/>
-                    <a:tint val="100000"/>
-                    <a:alpha val="74000"/>
-                  </a:schemeClr>
-                </a:innerShdw>
-              </a:effectLst>
+            </a:endParaRPr>
+          </a:p>
+        </p:txBody>
+      </p:sp>
+      <p:sp>
+        <p:nvSpPr>
+          <p:cNvPr id="3" name="Content Placeholder 2"/>
+          <p:cNvSpPr>
+            <a:spLocks noGrp="1"/>
+          </p:cNvSpPr>
+          <p:nvPr>
+            <p:ph idx="1"/>
+          </p:nvPr>
+        </p:nvSpPr>
+        <p:spPr>
+          <a:xfrm>
+            <a:off x="971600" y="1988840"/>
+            <a:ext cx="7992888" cy="4320480"/>
+          </a:xfrm>
+        </p:spPr>
+        <p:txBody>
+          <a:bodyPr/>
+          <a:lstStyle/>
+          <a:p>
+            <a:pPr marL="1444625"/>
+            <a:r>
+              <a:rPr lang="bg-BG" dirty="0" smtClean="0">
+                <a:ln w="18415" cmpd="sng">
+                  <a:noFill/>
+                  <a:prstDash val="solid"/>
+                </a:ln>
+                <a:solidFill>
+                  <a:srgbClr val="FFFFFF"/>
+                </a:solidFill>
+              </a:rPr>
+              <a:t>Прилага се </a:t>
+            </a:r>
+            <a:r>
+              <a:rPr lang="en-US" dirty="0" err="1" smtClean="0">
+                <a:ln w="18415" cmpd="sng">
+                  <a:noFill/>
+                  <a:prstDash val="solid"/>
+                </a:ln>
+                <a:solidFill>
+                  <a:srgbClr val="FFFFFF"/>
+                </a:solidFill>
+              </a:rPr>
+              <a:t>PascalCase</a:t>
+            </a:r>
+            <a:r>
+              <a:rPr lang="bg-BG" dirty="0" smtClean="0">
+                <a:ln w="18415" cmpd="sng">
+                  <a:noFill/>
+                  <a:prstDash val="solid"/>
+                </a:ln>
+                <a:solidFill>
+                  <a:srgbClr val="FFFFFF"/>
+                </a:solidFill>
+              </a:rPr>
+              <a:t>, т. е. всяка проста дума от името е с главна буква</a:t>
+            </a:r>
+          </a:p>
+          <a:p>
+            <a:pPr marL="1444625"/>
+            <a:r>
+              <a:rPr lang="bg-BG" dirty="0" smtClean="0">
+                <a:ln w="18415" cmpd="sng">
+                  <a:noFill/>
+                  <a:prstDash val="solid"/>
+                </a:ln>
+                <a:solidFill>
+                  <a:srgbClr val="FFFFFF"/>
+                </a:solidFill>
+              </a:rPr>
+              <a:t>Името се състои от глагол или глагол и съществително име</a:t>
+            </a:r>
+          </a:p>
+          <a:p>
+            <a:pPr marL="1444625"/>
+            <a:r>
+              <a:rPr lang="bg-BG" b="1" dirty="0" smtClean="0">
+                <a:ln w="18415" cmpd="sng">
+                  <a:noFill/>
+                  <a:prstDash val="solid"/>
+                </a:ln>
+                <a:solidFill>
+                  <a:srgbClr val="FFFFFF"/>
+                </a:solidFill>
+              </a:rPr>
+              <a:t>Името на метода трябва да бъде </a:t>
+            </a:r>
+            <a:r>
+              <a:rPr lang="bg-BG" b="1" u="sng" dirty="0" smtClean="0">
+                <a:ln w="18415" cmpd="sng">
+                  <a:noFill/>
+                  <a:prstDash val="solid"/>
+                </a:ln>
+                <a:solidFill>
+                  <a:srgbClr val="FFFFFF"/>
+                </a:solidFill>
+              </a:rPr>
+              <a:t>описателно</a:t>
+            </a:r>
+            <a:r>
+              <a:rPr lang="bg-BG" b="1" dirty="0" smtClean="0">
+                <a:ln w="18415" cmpd="sng">
+                  <a:noFill/>
+                  <a:prstDash val="solid"/>
+                </a:ln>
+                <a:solidFill>
+                  <a:srgbClr val="FFFFFF"/>
+                </a:solidFill>
+              </a:rPr>
+              <a:t> – да става ясно за какво служи метода</a:t>
+            </a:r>
+            <a:endParaRPr lang="bg-BG" b="1" dirty="0" smtClean="0">
+              <a:ln w="18415" cmpd="sng">
+                <a:noFill/>
+                <a:prstDash val="solid"/>
+              </a:ln>
+              <a:solidFill>
+                <a:srgbClr val="FFFFFF"/>
+              </a:solidFill>
             </a:endParaRPr>
           </a:p>
         </p:txBody>
@@ -4461,7 +5834,1414 @@
     </p:spTree>
     <p:extLst>
       <p:ext uri="{BB962C8B-B14F-4D97-AF65-F5344CB8AC3E}">
-        <p14:creationId xmlns:p14="http://schemas.microsoft.com/office/powerpoint/2010/main" val="1991681588"/>
+        <p14:creationId xmlns:p14="http://schemas.microsoft.com/office/powerpoint/2010/main" val="1009535554"/>
+      </p:ext>
+    </p:extLst>
+  </p:cSld>
+  <p:clrMapOvr>
+    <a:masterClrMapping/>
+  </p:clrMapOvr>
+  <p:timing>
+    <p:tnLst>
+      <p:par>
+        <p:cTn id="1" dur="indefinite" restart="never" nodeType="tmRoot"/>
+      </p:par>
+    </p:tnLst>
+  </p:timing>
+</p:sld>
+</file>
+
+<file path=ppt/slides/slide17.xml><?xml version="1.0" encoding="utf-8"?>
+<p:sld xmlns:a="http://schemas.openxmlformats.org/drawingml/2006/main" xmlns:r="http://schemas.openxmlformats.org/officeDocument/2006/relationships" xmlns:p="http://schemas.openxmlformats.org/presentationml/2006/main">
+  <p:cSld>
+    <p:spTree>
+      <p:nvGrpSpPr>
+        <p:cNvPr id="1" name=""/>
+        <p:cNvGrpSpPr/>
+        <p:nvPr/>
+      </p:nvGrpSpPr>
+      <p:grpSpPr>
+        <a:xfrm>
+          <a:off x="0" y="0"/>
+          <a:ext cx="0" cy="0"/>
+          <a:chOff x="0" y="0"/>
+          <a:chExt cx="0" cy="0"/>
+        </a:xfrm>
+      </p:grpSpPr>
+      <p:sp>
+        <p:nvSpPr>
+          <p:cNvPr id="106498" name="Rectangle 2"/>
+          <p:cNvSpPr>
+            <a:spLocks noGrp="1" noChangeArrowheads="1"/>
+          </p:cNvSpPr>
+          <p:nvPr>
+            <p:ph type="title"/>
+          </p:nvPr>
+        </p:nvSpPr>
+        <p:spPr>
+          <a:xfrm>
+            <a:off x="395536" y="188640"/>
+            <a:ext cx="8229600" cy="981075"/>
+          </a:xfrm>
+        </p:spPr>
+        <p:txBody>
+          <a:bodyPr/>
+          <a:lstStyle/>
+          <a:p>
+            <a:r>
+              <a:rPr lang="bg-BG" altLang="bg-BG" dirty="0" smtClean="0">
+                <a:solidFill>
+                  <a:schemeClr val="bg1"/>
+                </a:solidFill>
+              </a:rPr>
+              <a:t>Входни данни</a:t>
+            </a:r>
+            <a:endParaRPr lang="bg-BG" altLang="bg-BG" dirty="0">
+              <a:solidFill>
+                <a:schemeClr val="bg1"/>
+              </a:solidFill>
+            </a:endParaRPr>
+          </a:p>
+        </p:txBody>
+      </p:sp>
+      <p:sp>
+        <p:nvSpPr>
+          <p:cNvPr id="6" name="Text Placeholder 3"/>
+          <p:cNvSpPr txBox="1">
+            <a:spLocks/>
+          </p:cNvSpPr>
+          <p:nvPr/>
+        </p:nvSpPr>
+        <p:spPr>
+          <a:xfrm>
+            <a:off x="2123728" y="1556792"/>
+            <a:ext cx="5904656" cy="2062103"/>
+          </a:xfrm>
+          <a:prstGeom prst="rect">
+            <a:avLst/>
+          </a:prstGeom>
+          <a:solidFill>
+            <a:srgbClr val="1F497D">
+              <a:lumMod val="60000"/>
+              <a:lumOff val="40000"/>
+              <a:alpha val="15000"/>
+            </a:srgbClr>
+          </a:solidFill>
+          <a:ln w="12700">
+            <a:noFill/>
+          </a:ln>
+        </p:spPr>
+        <p:txBody>
+          <a:bodyPr wrap="square">
+            <a:spAutoFit/>
+          </a:bodyPr>
+          <a:lstStyle>
+            <a:lvl1pPr marL="0" indent="0" algn="l" defTabSz="685800" rtl="0" eaLnBrk="1" latinLnBrk="0" hangingPunct="1">
+              <a:spcBef>
+                <a:spcPts val="0"/>
+              </a:spcBef>
+              <a:buFont typeface="Arial" pitchFamily="34" charset="0"/>
+              <a:buNone/>
+              <a:defRPr lang="en-US" sz="2400" kern="1200" smtClean="0">
+                <a:solidFill>
+                  <a:schemeClr val="bg2">
+                    <a:lumMod val="40000"/>
+                    <a:lumOff val="60000"/>
+                  </a:schemeClr>
+                </a:solidFill>
+                <a:latin typeface="Consolas" pitchFamily="49" charset="0"/>
+                <a:ea typeface="+mn-ea"/>
+                <a:cs typeface="Consolas" pitchFamily="49" charset="0"/>
+              </a:defRPr>
+            </a:lvl1pPr>
+            <a:lvl2pPr marL="557213" indent="-214313" algn="l" defTabSz="685800" rtl="0" eaLnBrk="1" latinLnBrk="0" hangingPunct="1">
+              <a:spcBef>
+                <a:spcPct val="20000"/>
+              </a:spcBef>
+              <a:buFont typeface="Arial" pitchFamily="34" charset="0"/>
+              <a:buChar char="–"/>
+              <a:defRPr sz="2100" kern="1200">
+                <a:solidFill>
+                  <a:schemeClr val="tx1"/>
+                </a:solidFill>
+                <a:latin typeface="+mn-lt"/>
+                <a:ea typeface="+mn-ea"/>
+                <a:cs typeface="+mn-cs"/>
+              </a:defRPr>
+            </a:lvl2pPr>
+            <a:lvl3pPr marL="857250" indent="-171450" algn="l" defTabSz="685800" rtl="0" eaLnBrk="1" latinLnBrk="0" hangingPunct="1">
+              <a:spcBef>
+                <a:spcPct val="20000"/>
+              </a:spcBef>
+              <a:buFont typeface="Arial" pitchFamily="34" charset="0"/>
+              <a:buChar char="•"/>
+              <a:defRPr sz="1800" kern="1200">
+                <a:solidFill>
+                  <a:schemeClr val="tx1"/>
+                </a:solidFill>
+                <a:latin typeface="+mn-lt"/>
+                <a:ea typeface="+mn-ea"/>
+                <a:cs typeface="+mn-cs"/>
+              </a:defRPr>
+            </a:lvl3pPr>
+            <a:lvl4pPr marL="1200150" indent="-171450" algn="l" defTabSz="685800" rtl="0" eaLnBrk="1" latinLnBrk="0" hangingPunct="1">
+              <a:spcBef>
+                <a:spcPct val="20000"/>
+              </a:spcBef>
+              <a:buFont typeface="Arial" pitchFamily="34" charset="0"/>
+              <a:buChar char="–"/>
+              <a:defRPr sz="1500" kern="1200">
+                <a:solidFill>
+                  <a:schemeClr val="tx1"/>
+                </a:solidFill>
+                <a:latin typeface="+mn-lt"/>
+                <a:ea typeface="+mn-ea"/>
+                <a:cs typeface="+mn-cs"/>
+              </a:defRPr>
+            </a:lvl4pPr>
+            <a:lvl5pPr marL="1543050" indent="-171450" algn="l" defTabSz="685800" rtl="0" eaLnBrk="1" latinLnBrk="0" hangingPunct="1">
+              <a:spcBef>
+                <a:spcPct val="20000"/>
+              </a:spcBef>
+              <a:buFont typeface="Arial" pitchFamily="34" charset="0"/>
+              <a:buChar char="»"/>
+              <a:defRPr sz="1500" kern="1200">
+                <a:solidFill>
+                  <a:schemeClr val="tx1"/>
+                </a:solidFill>
+                <a:latin typeface="+mn-lt"/>
+                <a:ea typeface="+mn-ea"/>
+                <a:cs typeface="+mn-cs"/>
+              </a:defRPr>
+            </a:lvl5pPr>
+            <a:lvl6pPr marL="1885950" indent="-171450" algn="l" defTabSz="685800" rtl="0" eaLnBrk="1" latinLnBrk="0" hangingPunct="1">
+              <a:spcBef>
+                <a:spcPct val="20000"/>
+              </a:spcBef>
+              <a:buFont typeface="Arial" pitchFamily="34" charset="0"/>
+              <a:buChar char="•"/>
+              <a:defRPr sz="1500" kern="1200">
+                <a:solidFill>
+                  <a:schemeClr val="tx1"/>
+                </a:solidFill>
+                <a:latin typeface="+mn-lt"/>
+                <a:ea typeface="+mn-ea"/>
+                <a:cs typeface="+mn-cs"/>
+              </a:defRPr>
+            </a:lvl6pPr>
+            <a:lvl7pPr marL="2228850" indent="-171450" algn="l" defTabSz="685800" rtl="0" eaLnBrk="1" latinLnBrk="0" hangingPunct="1">
+              <a:spcBef>
+                <a:spcPct val="20000"/>
+              </a:spcBef>
+              <a:buFont typeface="Arial" pitchFamily="34" charset="0"/>
+              <a:buChar char="•"/>
+              <a:defRPr sz="1500" kern="1200">
+                <a:solidFill>
+                  <a:schemeClr val="tx1"/>
+                </a:solidFill>
+                <a:latin typeface="+mn-lt"/>
+                <a:ea typeface="+mn-ea"/>
+                <a:cs typeface="+mn-cs"/>
+              </a:defRPr>
+            </a:lvl7pPr>
+            <a:lvl8pPr marL="2571750" indent="-171450" algn="l" defTabSz="685800" rtl="0" eaLnBrk="1" latinLnBrk="0" hangingPunct="1">
+              <a:spcBef>
+                <a:spcPct val="20000"/>
+              </a:spcBef>
+              <a:buFont typeface="Arial" pitchFamily="34" charset="0"/>
+              <a:buChar char="•"/>
+              <a:defRPr sz="1500" kern="1200">
+                <a:solidFill>
+                  <a:schemeClr val="tx1"/>
+                </a:solidFill>
+                <a:latin typeface="+mn-lt"/>
+                <a:ea typeface="+mn-ea"/>
+                <a:cs typeface="+mn-cs"/>
+              </a:defRPr>
+            </a:lvl8pPr>
+            <a:lvl9pPr marL="2914650" indent="-171450" algn="l" defTabSz="685800" rtl="0" eaLnBrk="1" latinLnBrk="0" hangingPunct="1">
+              <a:spcBef>
+                <a:spcPct val="20000"/>
+              </a:spcBef>
+              <a:buFont typeface="Arial" pitchFamily="34" charset="0"/>
+              <a:buChar char="•"/>
+              <a:defRPr sz="1500" kern="1200">
+                <a:solidFill>
+                  <a:schemeClr val="tx1"/>
+                </a:solidFill>
+                <a:latin typeface="+mn-lt"/>
+                <a:ea typeface="+mn-ea"/>
+                <a:cs typeface="+mn-cs"/>
+              </a:defRPr>
+            </a:lvl9pPr>
+          </a:lstStyle>
+          <a:p>
+            <a:pPr marR="0" lvl="0" algn="l" defTabSz="685800" rtl="0" eaLnBrk="1" fontAlgn="auto" latinLnBrk="0" hangingPunct="1">
+              <a:lnSpc>
+                <a:spcPct val="100000"/>
+              </a:lnSpc>
+              <a:spcBef>
+                <a:spcPts val="0"/>
+              </a:spcBef>
+              <a:spcAft>
+                <a:spcPts val="0"/>
+              </a:spcAft>
+              <a:buClrTx/>
+              <a:buSzTx/>
+              <a:tabLst/>
+              <a:defRPr/>
+            </a:pPr>
+            <a:r>
+              <a:rPr lang="en-US" sz="3200" b="1" i="1" dirty="0" smtClean="0">
+                <a:solidFill>
+                  <a:srgbClr val="11A7C5"/>
+                </a:solidFill>
+              </a:rPr>
+              <a:t>method(</a:t>
+            </a:r>
+            <a:r>
+              <a:rPr lang="en-US" sz="3200" b="1" i="1" dirty="0" err="1" smtClean="0">
+                <a:solidFill>
+                  <a:srgbClr val="11A7C5"/>
+                </a:solidFill>
+              </a:rPr>
+              <a:t>int</a:t>
+            </a:r>
+            <a:r>
+              <a:rPr lang="en-US" sz="3200" b="1" i="1" dirty="0" smtClean="0">
+                <a:solidFill>
+                  <a:srgbClr val="11A7C5"/>
+                </a:solidFill>
+              </a:rPr>
+              <a:t> p1, </a:t>
+            </a:r>
+            <a:r>
+              <a:rPr lang="en-US" sz="3200" b="1" i="1" dirty="0" smtClean="0">
+                <a:solidFill>
+                  <a:srgbClr val="11A7C5"/>
+                </a:solidFill>
+              </a:rPr>
+              <a:t>double p2)</a:t>
+            </a:r>
+            <a:endParaRPr lang="bg-BG" sz="3200" b="1" i="1" dirty="0" smtClean="0">
+              <a:solidFill>
+                <a:srgbClr val="11A7C5"/>
+              </a:solidFill>
+            </a:endParaRPr>
+          </a:p>
+          <a:p>
+            <a:pPr marR="0" lvl="0" algn="l" defTabSz="685800" rtl="0" eaLnBrk="1" fontAlgn="auto" latinLnBrk="0" hangingPunct="1">
+              <a:lnSpc>
+                <a:spcPct val="100000"/>
+              </a:lnSpc>
+              <a:spcBef>
+                <a:spcPts val="0"/>
+              </a:spcBef>
+              <a:spcAft>
+                <a:spcPts val="0"/>
+              </a:spcAft>
+              <a:buClrTx/>
+              <a:buSzTx/>
+              <a:tabLst/>
+              <a:defRPr/>
+            </a:pPr>
+            <a:r>
+              <a:rPr lang="en-US" sz="3200" b="1" i="1" dirty="0" smtClean="0">
+                <a:solidFill>
+                  <a:srgbClr val="11A7C5"/>
+                </a:solidFill>
+              </a:rPr>
+              <a:t>{</a:t>
+            </a:r>
+          </a:p>
+          <a:p>
+            <a:pPr marR="0" lvl="0" algn="l" defTabSz="685800" rtl="0" eaLnBrk="1" fontAlgn="auto" latinLnBrk="0" hangingPunct="1">
+              <a:lnSpc>
+                <a:spcPct val="100000"/>
+              </a:lnSpc>
+              <a:spcBef>
+                <a:spcPts val="0"/>
+              </a:spcBef>
+              <a:spcAft>
+                <a:spcPts val="0"/>
+              </a:spcAft>
+              <a:buClrTx/>
+              <a:buSzTx/>
+              <a:tabLst/>
+              <a:defRPr/>
+            </a:pPr>
+            <a:r>
+              <a:rPr lang="bg-BG" sz="3200" b="1" i="1" dirty="0" smtClean="0">
+                <a:solidFill>
+                  <a:srgbClr val="11A7C5"/>
+                </a:solidFill>
+              </a:rPr>
+              <a:t>	…</a:t>
+            </a:r>
+            <a:endParaRPr lang="en-US" sz="3200" b="1" i="1" dirty="0" smtClean="0">
+              <a:solidFill>
+                <a:srgbClr val="11A7C5"/>
+              </a:solidFill>
+            </a:endParaRPr>
+          </a:p>
+          <a:p>
+            <a:pPr marR="0" lvl="0" algn="l" defTabSz="685800" rtl="0" eaLnBrk="1" fontAlgn="auto" latinLnBrk="0" hangingPunct="1">
+              <a:lnSpc>
+                <a:spcPct val="100000"/>
+              </a:lnSpc>
+              <a:spcBef>
+                <a:spcPts val="0"/>
+              </a:spcBef>
+              <a:spcAft>
+                <a:spcPts val="0"/>
+              </a:spcAft>
+              <a:buClrTx/>
+              <a:buSzTx/>
+              <a:tabLst/>
+              <a:defRPr/>
+            </a:pPr>
+            <a:r>
+              <a:rPr lang="en-US" sz="3200" b="1" i="1" dirty="0">
+                <a:solidFill>
+                  <a:srgbClr val="11A7C5"/>
+                </a:solidFill>
+              </a:rPr>
+              <a:t>}</a:t>
+            </a:r>
+            <a:endParaRPr lang="en-US" sz="3200" b="1" i="1" dirty="0">
+              <a:solidFill>
+                <a:srgbClr val="11A7C5"/>
+              </a:solidFill>
+            </a:endParaRPr>
+          </a:p>
+        </p:txBody>
+      </p:sp>
+      <p:sp>
+        <p:nvSpPr>
+          <p:cNvPr id="7" name="Rectangle 3"/>
+          <p:cNvSpPr txBox="1">
+            <a:spLocks noChangeArrowheads="1"/>
+          </p:cNvSpPr>
+          <p:nvPr/>
+        </p:nvSpPr>
+        <p:spPr bwMode="auto">
+          <a:xfrm>
+            <a:off x="2123728" y="5373216"/>
+            <a:ext cx="6768752" cy="1080120"/>
+          </a:xfrm>
+          <a:prstGeom prst="rect">
+            <a:avLst/>
+          </a:prstGeom>
+          <a:noFill/>
+          <a:ln>
+            <a:noFill/>
+          </a:ln>
+          <a:effectLst/>
+          <a:extLst>
+            <a:ext uri="{909E8E84-426E-40DD-AFC4-6F175D3DCCD1}">
+              <a14:hiddenFill xmlns:a14="http://schemas.microsoft.com/office/drawing/2010/main">
+                <a:solidFill>
+                  <a:schemeClr val="accent1"/>
+                </a:solidFill>
+              </a14:hiddenFill>
+            </a:ext>
+            <a:ext uri="{91240B29-F687-4F45-9708-019B960494DF}">
+              <a14:hiddenLine xmlns:a14="http://schemas.microsoft.com/office/drawing/2010/main" w="9525">
+                <a:solidFill>
+                  <a:schemeClr val="tx1"/>
+                </a:solidFill>
+                <a:miter lim="800000"/>
+                <a:headEnd/>
+                <a:tailEnd/>
+              </a14:hiddenLine>
+            </a:ext>
+            <a:ext uri="{AF507438-7753-43E0-B8FC-AC1667EBCBE1}">
+              <a14:hiddenEffects xmlns:a14="http://schemas.microsoft.com/office/drawing/2010/main">
+                <a:effectLst>
+                  <a:outerShdw dist="35921" dir="2700000" algn="ctr" rotWithShape="0">
+                    <a:schemeClr val="bg2"/>
+                  </a:outerShdw>
+                </a:effectLst>
+              </a14:hiddenEffects>
+            </a:ext>
+          </a:extLst>
+        </p:spPr>
+        <p:txBody>
+          <a:bodyPr vert="horz" wrap="square" lIns="91440" tIns="45720" rIns="91440" bIns="45720" numCol="1" anchor="t" anchorCtr="0" compatLnSpc="1">
+            <a:prstTxWarp prst="textNoShape">
+              <a:avLst/>
+            </a:prstTxWarp>
+          </a:bodyPr>
+          <a:lstStyle>
+            <a:lvl1pPr marL="342900" indent="-342900" algn="l" rtl="0" fontAlgn="base">
+              <a:spcBef>
+                <a:spcPct val="20000"/>
+              </a:spcBef>
+              <a:spcAft>
+                <a:spcPct val="0"/>
+              </a:spcAft>
+              <a:buChar char="•"/>
+              <a:defRPr sz="3200">
+                <a:solidFill>
+                  <a:schemeClr val="tx1"/>
+                </a:solidFill>
+                <a:latin typeface="+mn-lt"/>
+                <a:ea typeface="+mn-ea"/>
+                <a:cs typeface="+mn-cs"/>
+              </a:defRPr>
+            </a:lvl1pPr>
+            <a:lvl2pPr marL="742950" indent="-285750" algn="l" rtl="0" fontAlgn="base">
+              <a:spcBef>
+                <a:spcPct val="20000"/>
+              </a:spcBef>
+              <a:spcAft>
+                <a:spcPct val="0"/>
+              </a:spcAft>
+              <a:buChar char="–"/>
+              <a:defRPr sz="2800">
+                <a:solidFill>
+                  <a:schemeClr val="tx1"/>
+                </a:solidFill>
+                <a:latin typeface="+mn-lt"/>
+                <a:cs typeface="+mn-cs"/>
+              </a:defRPr>
+            </a:lvl2pPr>
+            <a:lvl3pPr marL="1143000" indent="-228600" algn="l" rtl="0" fontAlgn="base">
+              <a:spcBef>
+                <a:spcPct val="20000"/>
+              </a:spcBef>
+              <a:spcAft>
+                <a:spcPct val="0"/>
+              </a:spcAft>
+              <a:buChar char="•"/>
+              <a:defRPr sz="2400">
+                <a:solidFill>
+                  <a:schemeClr val="tx1"/>
+                </a:solidFill>
+                <a:latin typeface="+mn-lt"/>
+                <a:cs typeface="+mn-cs"/>
+              </a:defRPr>
+            </a:lvl3pPr>
+            <a:lvl4pPr marL="1600200" indent="-228600" algn="l" rtl="0" fontAlgn="base">
+              <a:spcBef>
+                <a:spcPct val="20000"/>
+              </a:spcBef>
+              <a:spcAft>
+                <a:spcPct val="0"/>
+              </a:spcAft>
+              <a:buChar char="–"/>
+              <a:defRPr sz="2000">
+                <a:solidFill>
+                  <a:schemeClr val="tx1"/>
+                </a:solidFill>
+                <a:latin typeface="+mn-lt"/>
+                <a:cs typeface="+mn-cs"/>
+              </a:defRPr>
+            </a:lvl4pPr>
+            <a:lvl5pPr marL="2057400" indent="-228600" algn="l" rtl="0" fontAlgn="base">
+              <a:spcBef>
+                <a:spcPct val="20000"/>
+              </a:spcBef>
+              <a:spcAft>
+                <a:spcPct val="0"/>
+              </a:spcAft>
+              <a:buChar char="»"/>
+              <a:defRPr sz="2000">
+                <a:solidFill>
+                  <a:schemeClr val="tx1"/>
+                </a:solidFill>
+                <a:latin typeface="+mn-lt"/>
+                <a:cs typeface="+mn-cs"/>
+              </a:defRPr>
+            </a:lvl5pPr>
+            <a:lvl6pPr marL="2514600" indent="-228600" algn="l" rtl="0" fontAlgn="base">
+              <a:spcBef>
+                <a:spcPct val="20000"/>
+              </a:spcBef>
+              <a:spcAft>
+                <a:spcPct val="0"/>
+              </a:spcAft>
+              <a:buChar char="»"/>
+              <a:defRPr sz="2000">
+                <a:solidFill>
+                  <a:schemeClr val="tx1"/>
+                </a:solidFill>
+                <a:latin typeface="+mn-lt"/>
+                <a:cs typeface="+mn-cs"/>
+              </a:defRPr>
+            </a:lvl6pPr>
+            <a:lvl7pPr marL="2971800" indent="-228600" algn="l" rtl="0" fontAlgn="base">
+              <a:spcBef>
+                <a:spcPct val="20000"/>
+              </a:spcBef>
+              <a:spcAft>
+                <a:spcPct val="0"/>
+              </a:spcAft>
+              <a:buChar char="»"/>
+              <a:defRPr sz="2000">
+                <a:solidFill>
+                  <a:schemeClr val="tx1"/>
+                </a:solidFill>
+                <a:latin typeface="+mn-lt"/>
+                <a:cs typeface="+mn-cs"/>
+              </a:defRPr>
+            </a:lvl7pPr>
+            <a:lvl8pPr marL="3429000" indent="-228600" algn="l" rtl="0" fontAlgn="base">
+              <a:spcBef>
+                <a:spcPct val="20000"/>
+              </a:spcBef>
+              <a:spcAft>
+                <a:spcPct val="0"/>
+              </a:spcAft>
+              <a:buChar char="»"/>
+              <a:defRPr sz="2000">
+                <a:solidFill>
+                  <a:schemeClr val="tx1"/>
+                </a:solidFill>
+                <a:latin typeface="+mn-lt"/>
+                <a:cs typeface="+mn-cs"/>
+              </a:defRPr>
+            </a:lvl8pPr>
+            <a:lvl9pPr marL="3886200" indent="-228600" algn="l" rtl="0" fontAlgn="base">
+              <a:spcBef>
+                <a:spcPct val="20000"/>
+              </a:spcBef>
+              <a:spcAft>
+                <a:spcPct val="0"/>
+              </a:spcAft>
+              <a:buChar char="»"/>
+              <a:defRPr sz="2000">
+                <a:solidFill>
+                  <a:schemeClr val="tx1"/>
+                </a:solidFill>
+                <a:latin typeface="+mn-lt"/>
+                <a:cs typeface="+mn-cs"/>
+              </a:defRPr>
+            </a:lvl9pPr>
+          </a:lstStyle>
+          <a:p>
+            <a:pPr marL="0" indent="0">
+              <a:buNone/>
+            </a:pPr>
+            <a:r>
+              <a:rPr lang="en-US" altLang="bg-BG" kern="0" dirty="0" smtClean="0">
+                <a:solidFill>
+                  <a:schemeClr val="bg1"/>
+                </a:solidFill>
+              </a:rPr>
+              <a:t>23, 4.05 – </a:t>
+            </a:r>
+            <a:r>
+              <a:rPr lang="bg-BG" altLang="bg-BG" kern="0" dirty="0" smtClean="0">
+                <a:solidFill>
+                  <a:schemeClr val="bg1"/>
+                </a:solidFill>
+              </a:rPr>
+              <a:t>аргументи / фактически параметри</a:t>
+            </a:r>
+            <a:endParaRPr lang="bg-BG" altLang="bg-BG" kern="0" dirty="0">
+              <a:solidFill>
+                <a:schemeClr val="bg1"/>
+              </a:solidFill>
+            </a:endParaRPr>
+          </a:p>
+        </p:txBody>
+      </p:sp>
+      <p:sp>
+        <p:nvSpPr>
+          <p:cNvPr id="9" name="Rectangle 3"/>
+          <p:cNvSpPr txBox="1">
+            <a:spLocks noChangeArrowheads="1"/>
+          </p:cNvSpPr>
+          <p:nvPr/>
+        </p:nvSpPr>
+        <p:spPr bwMode="auto">
+          <a:xfrm>
+            <a:off x="2123728" y="3789040"/>
+            <a:ext cx="6768752" cy="648072"/>
+          </a:xfrm>
+          <a:prstGeom prst="rect">
+            <a:avLst/>
+          </a:prstGeom>
+          <a:noFill/>
+          <a:ln>
+            <a:noFill/>
+          </a:ln>
+          <a:effectLst/>
+          <a:extLst>
+            <a:ext uri="{909E8E84-426E-40DD-AFC4-6F175D3DCCD1}">
+              <a14:hiddenFill xmlns:a14="http://schemas.microsoft.com/office/drawing/2010/main">
+                <a:solidFill>
+                  <a:schemeClr val="accent1"/>
+                </a:solidFill>
+              </a14:hiddenFill>
+            </a:ext>
+            <a:ext uri="{91240B29-F687-4F45-9708-019B960494DF}">
+              <a14:hiddenLine xmlns:a14="http://schemas.microsoft.com/office/drawing/2010/main" w="9525">
+                <a:solidFill>
+                  <a:schemeClr val="tx1"/>
+                </a:solidFill>
+                <a:miter lim="800000"/>
+                <a:headEnd/>
+                <a:tailEnd/>
+              </a14:hiddenLine>
+            </a:ext>
+            <a:ext uri="{AF507438-7753-43E0-B8FC-AC1667EBCBE1}">
+              <a14:hiddenEffects xmlns:a14="http://schemas.microsoft.com/office/drawing/2010/main">
+                <a:effectLst>
+                  <a:outerShdw dist="35921" dir="2700000" algn="ctr" rotWithShape="0">
+                    <a:schemeClr val="bg2"/>
+                  </a:outerShdw>
+                </a:effectLst>
+              </a14:hiddenEffects>
+            </a:ext>
+          </a:extLst>
+        </p:spPr>
+        <p:txBody>
+          <a:bodyPr vert="horz" wrap="square" lIns="91440" tIns="45720" rIns="91440" bIns="45720" numCol="1" anchor="t" anchorCtr="0" compatLnSpc="1">
+            <a:prstTxWarp prst="textNoShape">
+              <a:avLst/>
+            </a:prstTxWarp>
+          </a:bodyPr>
+          <a:lstStyle>
+            <a:lvl1pPr marL="342900" indent="-342900" algn="l" rtl="0" fontAlgn="base">
+              <a:spcBef>
+                <a:spcPct val="20000"/>
+              </a:spcBef>
+              <a:spcAft>
+                <a:spcPct val="0"/>
+              </a:spcAft>
+              <a:buChar char="•"/>
+              <a:defRPr sz="3200">
+                <a:solidFill>
+                  <a:schemeClr val="tx1"/>
+                </a:solidFill>
+                <a:latin typeface="+mn-lt"/>
+                <a:ea typeface="+mn-ea"/>
+                <a:cs typeface="+mn-cs"/>
+              </a:defRPr>
+            </a:lvl1pPr>
+            <a:lvl2pPr marL="742950" indent="-285750" algn="l" rtl="0" fontAlgn="base">
+              <a:spcBef>
+                <a:spcPct val="20000"/>
+              </a:spcBef>
+              <a:spcAft>
+                <a:spcPct val="0"/>
+              </a:spcAft>
+              <a:buChar char="–"/>
+              <a:defRPr sz="2800">
+                <a:solidFill>
+                  <a:schemeClr val="tx1"/>
+                </a:solidFill>
+                <a:latin typeface="+mn-lt"/>
+                <a:cs typeface="+mn-cs"/>
+              </a:defRPr>
+            </a:lvl2pPr>
+            <a:lvl3pPr marL="1143000" indent="-228600" algn="l" rtl="0" fontAlgn="base">
+              <a:spcBef>
+                <a:spcPct val="20000"/>
+              </a:spcBef>
+              <a:spcAft>
+                <a:spcPct val="0"/>
+              </a:spcAft>
+              <a:buChar char="•"/>
+              <a:defRPr sz="2400">
+                <a:solidFill>
+                  <a:schemeClr val="tx1"/>
+                </a:solidFill>
+                <a:latin typeface="+mn-lt"/>
+                <a:cs typeface="+mn-cs"/>
+              </a:defRPr>
+            </a:lvl3pPr>
+            <a:lvl4pPr marL="1600200" indent="-228600" algn="l" rtl="0" fontAlgn="base">
+              <a:spcBef>
+                <a:spcPct val="20000"/>
+              </a:spcBef>
+              <a:spcAft>
+                <a:spcPct val="0"/>
+              </a:spcAft>
+              <a:buChar char="–"/>
+              <a:defRPr sz="2000">
+                <a:solidFill>
+                  <a:schemeClr val="tx1"/>
+                </a:solidFill>
+                <a:latin typeface="+mn-lt"/>
+                <a:cs typeface="+mn-cs"/>
+              </a:defRPr>
+            </a:lvl4pPr>
+            <a:lvl5pPr marL="2057400" indent="-228600" algn="l" rtl="0" fontAlgn="base">
+              <a:spcBef>
+                <a:spcPct val="20000"/>
+              </a:spcBef>
+              <a:spcAft>
+                <a:spcPct val="0"/>
+              </a:spcAft>
+              <a:buChar char="»"/>
+              <a:defRPr sz="2000">
+                <a:solidFill>
+                  <a:schemeClr val="tx1"/>
+                </a:solidFill>
+                <a:latin typeface="+mn-lt"/>
+                <a:cs typeface="+mn-cs"/>
+              </a:defRPr>
+            </a:lvl5pPr>
+            <a:lvl6pPr marL="2514600" indent="-228600" algn="l" rtl="0" fontAlgn="base">
+              <a:spcBef>
+                <a:spcPct val="20000"/>
+              </a:spcBef>
+              <a:spcAft>
+                <a:spcPct val="0"/>
+              </a:spcAft>
+              <a:buChar char="»"/>
+              <a:defRPr sz="2000">
+                <a:solidFill>
+                  <a:schemeClr val="tx1"/>
+                </a:solidFill>
+                <a:latin typeface="+mn-lt"/>
+                <a:cs typeface="+mn-cs"/>
+              </a:defRPr>
+            </a:lvl6pPr>
+            <a:lvl7pPr marL="2971800" indent="-228600" algn="l" rtl="0" fontAlgn="base">
+              <a:spcBef>
+                <a:spcPct val="20000"/>
+              </a:spcBef>
+              <a:spcAft>
+                <a:spcPct val="0"/>
+              </a:spcAft>
+              <a:buChar char="»"/>
+              <a:defRPr sz="2000">
+                <a:solidFill>
+                  <a:schemeClr val="tx1"/>
+                </a:solidFill>
+                <a:latin typeface="+mn-lt"/>
+                <a:cs typeface="+mn-cs"/>
+              </a:defRPr>
+            </a:lvl7pPr>
+            <a:lvl8pPr marL="3429000" indent="-228600" algn="l" rtl="0" fontAlgn="base">
+              <a:spcBef>
+                <a:spcPct val="20000"/>
+              </a:spcBef>
+              <a:spcAft>
+                <a:spcPct val="0"/>
+              </a:spcAft>
+              <a:buChar char="»"/>
+              <a:defRPr sz="2000">
+                <a:solidFill>
+                  <a:schemeClr val="tx1"/>
+                </a:solidFill>
+                <a:latin typeface="+mn-lt"/>
+                <a:cs typeface="+mn-cs"/>
+              </a:defRPr>
+            </a:lvl8pPr>
+            <a:lvl9pPr marL="3886200" indent="-228600" algn="l" rtl="0" fontAlgn="base">
+              <a:spcBef>
+                <a:spcPct val="20000"/>
+              </a:spcBef>
+              <a:spcAft>
+                <a:spcPct val="0"/>
+              </a:spcAft>
+              <a:buChar char="»"/>
+              <a:defRPr sz="2000">
+                <a:solidFill>
+                  <a:schemeClr val="tx1"/>
+                </a:solidFill>
+                <a:latin typeface="+mn-lt"/>
+                <a:cs typeface="+mn-cs"/>
+              </a:defRPr>
+            </a:lvl9pPr>
+          </a:lstStyle>
+          <a:p>
+            <a:pPr marL="0" indent="0">
+              <a:buNone/>
+            </a:pPr>
+            <a:r>
+              <a:rPr lang="bg-BG" altLang="bg-BG" kern="0" dirty="0" smtClean="0">
+                <a:solidFill>
+                  <a:schemeClr val="bg1"/>
+                </a:solidFill>
+              </a:rPr>
+              <a:t>р1, р2 – (формални) параметри</a:t>
+            </a:r>
+            <a:endParaRPr lang="bg-BG" altLang="bg-BG" kern="0" dirty="0">
+              <a:solidFill>
+                <a:schemeClr val="bg1"/>
+              </a:solidFill>
+            </a:endParaRPr>
+          </a:p>
+        </p:txBody>
+      </p:sp>
+      <p:sp>
+        <p:nvSpPr>
+          <p:cNvPr id="10" name="Text Placeholder 3"/>
+          <p:cNvSpPr txBox="1">
+            <a:spLocks/>
+          </p:cNvSpPr>
+          <p:nvPr/>
+        </p:nvSpPr>
+        <p:spPr>
+          <a:xfrm>
+            <a:off x="2123728" y="4644425"/>
+            <a:ext cx="5904656" cy="584775"/>
+          </a:xfrm>
+          <a:prstGeom prst="rect">
+            <a:avLst/>
+          </a:prstGeom>
+          <a:solidFill>
+            <a:srgbClr val="1F497D">
+              <a:lumMod val="60000"/>
+              <a:lumOff val="40000"/>
+              <a:alpha val="15000"/>
+            </a:srgbClr>
+          </a:solidFill>
+          <a:ln w="12700">
+            <a:noFill/>
+          </a:ln>
+        </p:spPr>
+        <p:txBody>
+          <a:bodyPr wrap="square">
+            <a:spAutoFit/>
+          </a:bodyPr>
+          <a:lstStyle>
+            <a:lvl1pPr marL="0" indent="0" algn="l" defTabSz="685800" rtl="0" eaLnBrk="1" latinLnBrk="0" hangingPunct="1">
+              <a:spcBef>
+                <a:spcPts val="0"/>
+              </a:spcBef>
+              <a:buFont typeface="Arial" pitchFamily="34" charset="0"/>
+              <a:buNone/>
+              <a:defRPr lang="en-US" sz="2400" kern="1200" smtClean="0">
+                <a:solidFill>
+                  <a:schemeClr val="bg2">
+                    <a:lumMod val="40000"/>
+                    <a:lumOff val="60000"/>
+                  </a:schemeClr>
+                </a:solidFill>
+                <a:latin typeface="Consolas" pitchFamily="49" charset="0"/>
+                <a:ea typeface="+mn-ea"/>
+                <a:cs typeface="Consolas" pitchFamily="49" charset="0"/>
+              </a:defRPr>
+            </a:lvl1pPr>
+            <a:lvl2pPr marL="557213" indent="-214313" algn="l" defTabSz="685800" rtl="0" eaLnBrk="1" latinLnBrk="0" hangingPunct="1">
+              <a:spcBef>
+                <a:spcPct val="20000"/>
+              </a:spcBef>
+              <a:buFont typeface="Arial" pitchFamily="34" charset="0"/>
+              <a:buChar char="–"/>
+              <a:defRPr sz="2100" kern="1200">
+                <a:solidFill>
+                  <a:schemeClr val="tx1"/>
+                </a:solidFill>
+                <a:latin typeface="+mn-lt"/>
+                <a:ea typeface="+mn-ea"/>
+                <a:cs typeface="+mn-cs"/>
+              </a:defRPr>
+            </a:lvl2pPr>
+            <a:lvl3pPr marL="857250" indent="-171450" algn="l" defTabSz="685800" rtl="0" eaLnBrk="1" latinLnBrk="0" hangingPunct="1">
+              <a:spcBef>
+                <a:spcPct val="20000"/>
+              </a:spcBef>
+              <a:buFont typeface="Arial" pitchFamily="34" charset="0"/>
+              <a:buChar char="•"/>
+              <a:defRPr sz="1800" kern="1200">
+                <a:solidFill>
+                  <a:schemeClr val="tx1"/>
+                </a:solidFill>
+                <a:latin typeface="+mn-lt"/>
+                <a:ea typeface="+mn-ea"/>
+                <a:cs typeface="+mn-cs"/>
+              </a:defRPr>
+            </a:lvl3pPr>
+            <a:lvl4pPr marL="1200150" indent="-171450" algn="l" defTabSz="685800" rtl="0" eaLnBrk="1" latinLnBrk="0" hangingPunct="1">
+              <a:spcBef>
+                <a:spcPct val="20000"/>
+              </a:spcBef>
+              <a:buFont typeface="Arial" pitchFamily="34" charset="0"/>
+              <a:buChar char="–"/>
+              <a:defRPr sz="1500" kern="1200">
+                <a:solidFill>
+                  <a:schemeClr val="tx1"/>
+                </a:solidFill>
+                <a:latin typeface="+mn-lt"/>
+                <a:ea typeface="+mn-ea"/>
+                <a:cs typeface="+mn-cs"/>
+              </a:defRPr>
+            </a:lvl4pPr>
+            <a:lvl5pPr marL="1543050" indent="-171450" algn="l" defTabSz="685800" rtl="0" eaLnBrk="1" latinLnBrk="0" hangingPunct="1">
+              <a:spcBef>
+                <a:spcPct val="20000"/>
+              </a:spcBef>
+              <a:buFont typeface="Arial" pitchFamily="34" charset="0"/>
+              <a:buChar char="»"/>
+              <a:defRPr sz="1500" kern="1200">
+                <a:solidFill>
+                  <a:schemeClr val="tx1"/>
+                </a:solidFill>
+                <a:latin typeface="+mn-lt"/>
+                <a:ea typeface="+mn-ea"/>
+                <a:cs typeface="+mn-cs"/>
+              </a:defRPr>
+            </a:lvl5pPr>
+            <a:lvl6pPr marL="1885950" indent="-171450" algn="l" defTabSz="685800" rtl="0" eaLnBrk="1" latinLnBrk="0" hangingPunct="1">
+              <a:spcBef>
+                <a:spcPct val="20000"/>
+              </a:spcBef>
+              <a:buFont typeface="Arial" pitchFamily="34" charset="0"/>
+              <a:buChar char="•"/>
+              <a:defRPr sz="1500" kern="1200">
+                <a:solidFill>
+                  <a:schemeClr val="tx1"/>
+                </a:solidFill>
+                <a:latin typeface="+mn-lt"/>
+                <a:ea typeface="+mn-ea"/>
+                <a:cs typeface="+mn-cs"/>
+              </a:defRPr>
+            </a:lvl6pPr>
+            <a:lvl7pPr marL="2228850" indent="-171450" algn="l" defTabSz="685800" rtl="0" eaLnBrk="1" latinLnBrk="0" hangingPunct="1">
+              <a:spcBef>
+                <a:spcPct val="20000"/>
+              </a:spcBef>
+              <a:buFont typeface="Arial" pitchFamily="34" charset="0"/>
+              <a:buChar char="•"/>
+              <a:defRPr sz="1500" kern="1200">
+                <a:solidFill>
+                  <a:schemeClr val="tx1"/>
+                </a:solidFill>
+                <a:latin typeface="+mn-lt"/>
+                <a:ea typeface="+mn-ea"/>
+                <a:cs typeface="+mn-cs"/>
+              </a:defRPr>
+            </a:lvl7pPr>
+            <a:lvl8pPr marL="2571750" indent="-171450" algn="l" defTabSz="685800" rtl="0" eaLnBrk="1" latinLnBrk="0" hangingPunct="1">
+              <a:spcBef>
+                <a:spcPct val="20000"/>
+              </a:spcBef>
+              <a:buFont typeface="Arial" pitchFamily="34" charset="0"/>
+              <a:buChar char="•"/>
+              <a:defRPr sz="1500" kern="1200">
+                <a:solidFill>
+                  <a:schemeClr val="tx1"/>
+                </a:solidFill>
+                <a:latin typeface="+mn-lt"/>
+                <a:ea typeface="+mn-ea"/>
+                <a:cs typeface="+mn-cs"/>
+              </a:defRPr>
+            </a:lvl8pPr>
+            <a:lvl9pPr marL="2914650" indent="-171450" algn="l" defTabSz="685800" rtl="0" eaLnBrk="1" latinLnBrk="0" hangingPunct="1">
+              <a:spcBef>
+                <a:spcPct val="20000"/>
+              </a:spcBef>
+              <a:buFont typeface="Arial" pitchFamily="34" charset="0"/>
+              <a:buChar char="•"/>
+              <a:defRPr sz="1500" kern="1200">
+                <a:solidFill>
+                  <a:schemeClr val="tx1"/>
+                </a:solidFill>
+                <a:latin typeface="+mn-lt"/>
+                <a:ea typeface="+mn-ea"/>
+                <a:cs typeface="+mn-cs"/>
+              </a:defRPr>
+            </a:lvl9pPr>
+          </a:lstStyle>
+          <a:p>
+            <a:pPr marR="0" lvl="0" algn="l" defTabSz="685800" rtl="0" eaLnBrk="1" fontAlgn="auto" latinLnBrk="0" hangingPunct="1">
+              <a:lnSpc>
+                <a:spcPct val="100000"/>
+              </a:lnSpc>
+              <a:spcBef>
+                <a:spcPts val="0"/>
+              </a:spcBef>
+              <a:spcAft>
+                <a:spcPts val="0"/>
+              </a:spcAft>
+              <a:buClrTx/>
+              <a:buSzTx/>
+              <a:tabLst/>
+              <a:defRPr/>
+            </a:pPr>
+            <a:r>
+              <a:rPr lang="en-US" sz="3200" b="1" i="1" dirty="0" smtClean="0">
+                <a:solidFill>
+                  <a:srgbClr val="11A7C5"/>
+                </a:solidFill>
+              </a:rPr>
+              <a:t>method1(23, 4.05);</a:t>
+            </a:r>
+            <a:endParaRPr lang="en-US" sz="3200" b="1" i="1" dirty="0">
+              <a:solidFill>
+                <a:srgbClr val="11A7C5"/>
+              </a:solidFill>
+            </a:endParaRPr>
+          </a:p>
+        </p:txBody>
+      </p:sp>
+    </p:spTree>
+    <p:extLst>
+      <p:ext uri="{BB962C8B-B14F-4D97-AF65-F5344CB8AC3E}">
+        <p14:creationId xmlns:p14="http://schemas.microsoft.com/office/powerpoint/2010/main" val="595004340"/>
+      </p:ext>
+    </p:extLst>
+  </p:cSld>
+  <p:clrMapOvr>
+    <a:masterClrMapping/>
+  </p:clrMapOvr>
+  <p:timing>
+    <p:tnLst>
+      <p:par>
+        <p:cTn id="1" dur="indefinite" restart="never" nodeType="tmRoot"/>
+      </p:par>
+    </p:tnLst>
+  </p:timing>
+</p:sld>
+</file>
+
+<file path=ppt/slides/slide18.xml><?xml version="1.0" encoding="utf-8"?>
+<p:sld xmlns:a="http://schemas.openxmlformats.org/drawingml/2006/main" xmlns:r="http://schemas.openxmlformats.org/officeDocument/2006/relationships" xmlns:p="http://schemas.openxmlformats.org/presentationml/2006/main">
+  <p:cSld>
+    <p:spTree>
+      <p:nvGrpSpPr>
+        <p:cNvPr id="1" name=""/>
+        <p:cNvGrpSpPr/>
+        <p:nvPr/>
+      </p:nvGrpSpPr>
+      <p:grpSpPr>
+        <a:xfrm>
+          <a:off x="0" y="0"/>
+          <a:ext cx="0" cy="0"/>
+          <a:chOff x="0" y="0"/>
+          <a:chExt cx="0" cy="0"/>
+        </a:xfrm>
+      </p:grpSpPr>
+      <p:sp>
+        <p:nvSpPr>
+          <p:cNvPr id="2" name="Title 1"/>
+          <p:cNvSpPr>
+            <a:spLocks noGrp="1"/>
+          </p:cNvSpPr>
+          <p:nvPr>
+            <p:ph type="title"/>
+          </p:nvPr>
+        </p:nvSpPr>
+        <p:spPr>
+          <a:xfrm>
+            <a:off x="457200" y="274638"/>
+            <a:ext cx="8229600" cy="1498178"/>
+          </a:xfrm>
+        </p:spPr>
+        <p:txBody>
+          <a:bodyPr/>
+          <a:lstStyle/>
+          <a:p>
+            <a:r>
+              <a:rPr lang="bg-BG" dirty="0" smtClean="0">
+                <a:solidFill>
+                  <a:schemeClr val="bg1"/>
+                </a:solidFill>
+              </a:rPr>
+              <a:t>Тяло на метод</a:t>
+            </a:r>
+            <a:endParaRPr lang="en-US" dirty="0">
+              <a:ln w="18415" cmpd="sng">
+                <a:solidFill>
+                  <a:srgbClr val="FFFFFF"/>
+                </a:solidFill>
+                <a:prstDash val="solid"/>
+              </a:ln>
+              <a:solidFill>
+                <a:srgbClr val="FFFFFF"/>
+              </a:solidFill>
+            </a:endParaRPr>
+          </a:p>
+        </p:txBody>
+      </p:sp>
+      <p:sp>
+        <p:nvSpPr>
+          <p:cNvPr id="3" name="Content Placeholder 2"/>
+          <p:cNvSpPr>
+            <a:spLocks noGrp="1"/>
+          </p:cNvSpPr>
+          <p:nvPr>
+            <p:ph idx="1"/>
+          </p:nvPr>
+        </p:nvSpPr>
+        <p:spPr>
+          <a:xfrm>
+            <a:off x="971600" y="1700808"/>
+            <a:ext cx="7992888" cy="4752528"/>
+          </a:xfrm>
+        </p:spPr>
+        <p:txBody>
+          <a:bodyPr/>
+          <a:lstStyle/>
+          <a:p>
+            <a:pPr marL="1444625"/>
+            <a:r>
+              <a:rPr lang="bg-BG" dirty="0" smtClean="0">
+                <a:ln w="18415" cmpd="sng">
+                  <a:noFill/>
+                  <a:prstDash val="solid"/>
+                </a:ln>
+                <a:solidFill>
+                  <a:srgbClr val="FFFFFF"/>
+                </a:solidFill>
+              </a:rPr>
+              <a:t>Тялото на метода представлява блок код, който решава определена задача</a:t>
+            </a:r>
+          </a:p>
+          <a:p>
+            <a:pPr marL="1444625"/>
+            <a:r>
+              <a:rPr lang="bg-BG" dirty="0" smtClean="0">
+                <a:ln w="18415" cmpd="sng">
+                  <a:noFill/>
+                  <a:prstDash val="solid"/>
+                </a:ln>
+                <a:solidFill>
+                  <a:srgbClr val="FFFFFF"/>
+                </a:solidFill>
+              </a:rPr>
+              <a:t>Тялото извършва операции (и връща стойност)</a:t>
+            </a:r>
+            <a:endParaRPr lang="bg-BG" dirty="0" smtClean="0">
+              <a:ln w="18415" cmpd="sng">
+                <a:noFill/>
+                <a:prstDash val="solid"/>
+              </a:ln>
+              <a:solidFill>
+                <a:srgbClr val="FFFFFF"/>
+              </a:solidFill>
+            </a:endParaRPr>
+          </a:p>
+          <a:p>
+            <a:pPr marL="1444625"/>
+            <a:r>
+              <a:rPr lang="bg-BG" dirty="0" smtClean="0">
+                <a:ln w="18415" cmpd="sng">
+                  <a:noFill/>
+                  <a:prstDash val="solid"/>
+                </a:ln>
+                <a:solidFill>
+                  <a:srgbClr val="FFFFFF"/>
+                </a:solidFill>
+              </a:rPr>
+              <a:t>Тялото е всичкият код, който е разположен между </a:t>
+            </a:r>
+            <a:r>
+              <a:rPr lang="en-US" dirty="0" smtClean="0">
+                <a:ln w="18415" cmpd="sng">
+                  <a:noFill/>
+                  <a:prstDash val="solid"/>
+                </a:ln>
+                <a:solidFill>
+                  <a:srgbClr val="FFFFFF"/>
+                </a:solidFill>
+              </a:rPr>
+              <a:t>{ }</a:t>
+            </a:r>
+            <a:r>
+              <a:rPr lang="bg-BG" dirty="0" smtClean="0">
+                <a:ln w="18415" cmpd="sng">
+                  <a:noFill/>
+                  <a:prstDash val="solid"/>
+                </a:ln>
+                <a:solidFill>
+                  <a:srgbClr val="FFFFFF"/>
+                </a:solidFill>
+              </a:rPr>
+              <a:t> на метода</a:t>
+            </a:r>
+          </a:p>
+          <a:p>
+            <a:pPr marL="1444625"/>
+            <a:r>
+              <a:rPr lang="bg-BG" dirty="0" smtClean="0">
+                <a:ln w="18415" cmpd="sng">
+                  <a:noFill/>
+                  <a:prstDash val="solid"/>
+                </a:ln>
+                <a:solidFill>
+                  <a:srgbClr val="FFFFFF"/>
+                </a:solidFill>
+              </a:rPr>
+              <a:t>При извикване на метода от друг код се изпълнява тялото му</a:t>
+            </a:r>
+            <a:endParaRPr lang="bg-BG" dirty="0" smtClean="0">
+              <a:ln w="18415" cmpd="sng">
+                <a:noFill/>
+                <a:prstDash val="solid"/>
+              </a:ln>
+              <a:solidFill>
+                <a:srgbClr val="FFFFFF"/>
+              </a:solidFill>
+            </a:endParaRPr>
+          </a:p>
+        </p:txBody>
+      </p:sp>
+    </p:spTree>
+    <p:extLst>
+      <p:ext uri="{BB962C8B-B14F-4D97-AF65-F5344CB8AC3E}">
+        <p14:creationId xmlns:p14="http://schemas.microsoft.com/office/powerpoint/2010/main" val="907439035"/>
+      </p:ext>
+    </p:extLst>
+  </p:cSld>
+  <p:clrMapOvr>
+    <a:masterClrMapping/>
+  </p:clrMapOvr>
+  <p:timing>
+    <p:tnLst>
+      <p:par>
+        <p:cTn id="1" dur="indefinite" restart="never" nodeType="tmRoot"/>
+      </p:par>
+    </p:tnLst>
+  </p:timing>
+</p:sld>
+</file>
+
+<file path=ppt/slides/slide19.xml><?xml version="1.0" encoding="utf-8"?>
+<p:sld xmlns:a="http://schemas.openxmlformats.org/drawingml/2006/main" xmlns:r="http://schemas.openxmlformats.org/officeDocument/2006/relationships" xmlns:p="http://schemas.openxmlformats.org/presentationml/2006/main">
+  <p:cSld>
+    <p:spTree>
+      <p:nvGrpSpPr>
+        <p:cNvPr id="1" name=""/>
+        <p:cNvGrpSpPr/>
+        <p:nvPr/>
+      </p:nvGrpSpPr>
+      <p:grpSpPr>
+        <a:xfrm>
+          <a:off x="0" y="0"/>
+          <a:ext cx="0" cy="0"/>
+          <a:chOff x="0" y="0"/>
+          <a:chExt cx="0" cy="0"/>
+        </a:xfrm>
+      </p:grpSpPr>
+      <p:sp>
+        <p:nvSpPr>
+          <p:cNvPr id="2" name="Title 1"/>
+          <p:cNvSpPr>
+            <a:spLocks noGrp="1"/>
+          </p:cNvSpPr>
+          <p:nvPr>
+            <p:ph type="title"/>
+          </p:nvPr>
+        </p:nvSpPr>
+        <p:spPr>
+          <a:xfrm>
+            <a:off x="457200" y="274638"/>
+            <a:ext cx="8229600" cy="1498178"/>
+          </a:xfrm>
+        </p:spPr>
+        <p:txBody>
+          <a:bodyPr/>
+          <a:lstStyle/>
+          <a:p>
+            <a:r>
+              <a:rPr lang="bg-BG" dirty="0" smtClean="0">
+                <a:solidFill>
+                  <a:schemeClr val="bg1"/>
+                </a:solidFill>
+              </a:rPr>
+              <a:t>Връщане на стойност</a:t>
+            </a:r>
+            <a:endParaRPr lang="en-US" dirty="0">
+              <a:ln w="18415" cmpd="sng">
+                <a:solidFill>
+                  <a:srgbClr val="FFFFFF"/>
+                </a:solidFill>
+                <a:prstDash val="solid"/>
+              </a:ln>
+              <a:solidFill>
+                <a:srgbClr val="FFFFFF"/>
+              </a:solidFill>
+            </a:endParaRPr>
+          </a:p>
+        </p:txBody>
+      </p:sp>
+      <p:sp>
+        <p:nvSpPr>
+          <p:cNvPr id="3" name="Content Placeholder 2"/>
+          <p:cNvSpPr>
+            <a:spLocks noGrp="1"/>
+          </p:cNvSpPr>
+          <p:nvPr>
+            <p:ph idx="1"/>
+          </p:nvPr>
+        </p:nvSpPr>
+        <p:spPr>
+          <a:xfrm>
+            <a:off x="971600" y="1988840"/>
+            <a:ext cx="7992888" cy="4320480"/>
+          </a:xfrm>
+        </p:spPr>
+        <p:txBody>
+          <a:bodyPr/>
+          <a:lstStyle/>
+          <a:p>
+            <a:pPr marL="1444625"/>
+            <a:r>
+              <a:rPr lang="bg-BG" dirty="0" smtClean="0">
+                <a:ln w="18415" cmpd="sng">
+                  <a:noFill/>
+                  <a:prstDash val="solid"/>
+                </a:ln>
+                <a:solidFill>
+                  <a:srgbClr val="FFFFFF"/>
+                </a:solidFill>
+              </a:rPr>
+              <a:t>Методът може да връща стойност, а може и само да извършва определени операции</a:t>
+            </a:r>
+          </a:p>
+          <a:p>
+            <a:pPr marL="1444625"/>
+            <a:r>
+              <a:rPr lang="bg-BG" dirty="0" smtClean="0">
+                <a:ln w="18415" cmpd="sng">
+                  <a:noFill/>
+                  <a:prstDash val="solid"/>
+                </a:ln>
+                <a:solidFill>
+                  <a:srgbClr val="FFFFFF"/>
+                </a:solidFill>
+              </a:rPr>
+              <a:t>Ако връщания тип е </a:t>
+            </a:r>
+            <a:r>
+              <a:rPr lang="en-US" dirty="0" smtClean="0">
+                <a:ln w="18415" cmpd="sng">
+                  <a:noFill/>
+                  <a:prstDash val="solid"/>
+                </a:ln>
+                <a:solidFill>
+                  <a:srgbClr val="FFFFFF"/>
+                </a:solidFill>
+              </a:rPr>
+              <a:t>void</a:t>
+            </a:r>
+            <a:r>
+              <a:rPr lang="bg-BG" dirty="0" smtClean="0">
+                <a:ln w="18415" cmpd="sng">
+                  <a:noFill/>
+                  <a:prstDash val="solid"/>
+                </a:ln>
+                <a:solidFill>
+                  <a:srgbClr val="FFFFFF"/>
+                </a:solidFill>
+              </a:rPr>
+              <a:t>, методът не връща нищо, иначе връща стойност от съответния посочен тип</a:t>
+            </a:r>
+            <a:endParaRPr lang="bg-BG" dirty="0" smtClean="0">
+              <a:ln w="18415" cmpd="sng">
+                <a:noFill/>
+                <a:prstDash val="solid"/>
+              </a:ln>
+              <a:solidFill>
+                <a:srgbClr val="FFFFFF"/>
+              </a:solidFill>
+            </a:endParaRPr>
+          </a:p>
+        </p:txBody>
+      </p:sp>
+    </p:spTree>
+    <p:extLst>
+      <p:ext uri="{BB962C8B-B14F-4D97-AF65-F5344CB8AC3E}">
+        <p14:creationId xmlns:p14="http://schemas.microsoft.com/office/powerpoint/2010/main" val="1065044729"/>
       </p:ext>
     </p:extLst>
   </p:cSld>
@@ -4516,15 +7296,7 @@
                   <a:schemeClr val="bg1"/>
                 </a:solidFill>
               </a:rPr>
-              <a:t>Какво е </a:t>
-            </a:r>
-            <a:r>
-              <a:rPr lang="bg-BG" altLang="bg-BG" dirty="0" smtClean="0">
-                <a:solidFill>
-                  <a:schemeClr val="bg1"/>
-                </a:solidFill>
-              </a:rPr>
-              <a:t>символен низ</a:t>
+              <a:t>Какво е символен низ</a:t>
             </a:r>
             <a:endParaRPr lang="en-US" dirty="0">
               <a:ln w="18415" cmpd="sng">
@@ -4805,6 +7577,1359 @@
     <p:extLst>
       <p:ext uri="{BB962C8B-B14F-4D97-AF65-F5344CB8AC3E}">
         <p14:creationId xmlns:p14="http://schemas.microsoft.com/office/powerpoint/2010/main" val="4190872719"/>
+      </p:ext>
+    </p:extLst>
+  </p:cSld>
+  <p:clrMapOvr>
+    <a:masterClrMapping/>
+  </p:clrMapOvr>
+  <p:timing>
+    <p:tnLst>
+      <p:par>
+        <p:cTn id="1" dur="indefinite" restart="never" nodeType="tmRoot"/>
+      </p:par>
+    </p:tnLst>
+  </p:timing>
+</p:sld>
+</file>
+
+<file path=ppt/slides/slide20.xml><?xml version="1.0" encoding="utf-8"?>
+<p:sld xmlns:a="http://schemas.openxmlformats.org/drawingml/2006/main" xmlns:r="http://schemas.openxmlformats.org/officeDocument/2006/relationships" xmlns:p="http://schemas.openxmlformats.org/presentationml/2006/main">
+  <p:cSld>
+    <p:spTree>
+      <p:nvGrpSpPr>
+        <p:cNvPr id="1" name=""/>
+        <p:cNvGrpSpPr/>
+        <p:nvPr/>
+      </p:nvGrpSpPr>
+      <p:grpSpPr>
+        <a:xfrm>
+          <a:off x="0" y="0"/>
+          <a:ext cx="0" cy="0"/>
+          <a:chOff x="0" y="0"/>
+          <a:chExt cx="0" cy="0"/>
+        </a:xfrm>
+      </p:grpSpPr>
+      <p:sp>
+        <p:nvSpPr>
+          <p:cNvPr id="106498" name="Rectangle 2"/>
+          <p:cNvSpPr>
+            <a:spLocks noGrp="1" noChangeArrowheads="1"/>
+          </p:cNvSpPr>
+          <p:nvPr>
+            <p:ph type="title"/>
+          </p:nvPr>
+        </p:nvSpPr>
+        <p:spPr>
+          <a:xfrm>
+            <a:off x="395288" y="188913"/>
+            <a:ext cx="8229600" cy="1511895"/>
+          </a:xfrm>
+        </p:spPr>
+        <p:txBody>
+          <a:bodyPr/>
+          <a:lstStyle/>
+          <a:p>
+            <a:r>
+              <a:rPr lang="bg-BG" altLang="bg-BG" dirty="0" smtClean="0">
+                <a:solidFill>
+                  <a:schemeClr val="bg1"/>
+                </a:solidFill>
+              </a:rPr>
+              <a:t>Методи - примери</a:t>
+            </a:r>
+            <a:endParaRPr lang="bg-BG" altLang="bg-BG" dirty="0">
+              <a:solidFill>
+                <a:schemeClr val="bg1"/>
+              </a:solidFill>
+            </a:endParaRPr>
+          </a:p>
+        </p:txBody>
+      </p:sp>
+      <p:sp>
+        <p:nvSpPr>
+          <p:cNvPr id="2" name="Правоъгълник 1"/>
+          <p:cNvSpPr/>
+          <p:nvPr/>
+        </p:nvSpPr>
+        <p:spPr>
+          <a:xfrm>
+            <a:off x="3680304" y="3140968"/>
+            <a:ext cx="2188741" cy="1015663"/>
+          </a:xfrm>
+          <a:prstGeom prst="rect">
+            <a:avLst/>
+          </a:prstGeom>
+          <a:noFill/>
+        </p:spPr>
+        <p:txBody>
+          <a:bodyPr wrap="none" lIns="91440" tIns="45720" rIns="91440" bIns="45720">
+            <a:spAutoFit/>
+          </a:bodyPr>
+          <a:lstStyle/>
+          <a:p>
+            <a:pPr algn="ctr"/>
+            <a:r>
+              <a:rPr lang="bg-BG" sz="6000" b="1" cap="none" spc="0" dirty="0" err="1" smtClean="0">
+                <a:ln w="900" cmpd="sng">
+                  <a:solidFill>
+                    <a:schemeClr val="accent1">
+                      <a:satMod val="190000"/>
+                      <a:alpha val="55000"/>
+                    </a:schemeClr>
+                  </a:solidFill>
+                  <a:prstDash val="solid"/>
+                </a:ln>
+                <a:solidFill>
+                  <a:schemeClr val="accent1">
+                    <a:satMod val="200000"/>
+                    <a:tint val="3000"/>
+                  </a:schemeClr>
+                </a:solidFill>
+                <a:effectLst>
+                  <a:innerShdw blurRad="101600" dist="76200" dir="5400000">
+                    <a:schemeClr val="accent1">
+                      <a:satMod val="190000"/>
+                      <a:tint val="100000"/>
+                      <a:alpha val="74000"/>
+                    </a:schemeClr>
+                  </a:innerShdw>
+                </a:effectLst>
+              </a:rPr>
+              <a:t>Демо</a:t>
+            </a:r>
+            <a:endParaRPr lang="bg-BG" sz="6000" b="1" cap="none" spc="0" dirty="0">
+              <a:ln w="900" cmpd="sng">
+                <a:solidFill>
+                  <a:schemeClr val="accent1">
+                    <a:satMod val="190000"/>
+                    <a:alpha val="55000"/>
+                  </a:schemeClr>
+                </a:solidFill>
+                <a:prstDash val="solid"/>
+              </a:ln>
+              <a:solidFill>
+                <a:schemeClr val="accent1">
+                  <a:satMod val="200000"/>
+                  <a:tint val="3000"/>
+                </a:schemeClr>
+              </a:solidFill>
+              <a:effectLst>
+                <a:innerShdw blurRad="101600" dist="76200" dir="5400000">
+                  <a:schemeClr val="accent1">
+                    <a:satMod val="190000"/>
+                    <a:tint val="100000"/>
+                    <a:alpha val="74000"/>
+                  </a:schemeClr>
+                </a:innerShdw>
+              </a:effectLst>
+            </a:endParaRPr>
+          </a:p>
+        </p:txBody>
+      </p:sp>
+    </p:spTree>
+    <p:extLst>
+      <p:ext uri="{BB962C8B-B14F-4D97-AF65-F5344CB8AC3E}">
+        <p14:creationId xmlns:p14="http://schemas.microsoft.com/office/powerpoint/2010/main" val="4234916730"/>
+      </p:ext>
+    </p:extLst>
+  </p:cSld>
+  <p:clrMapOvr>
+    <a:masterClrMapping/>
+  </p:clrMapOvr>
+  <p:timing>
+    <p:tnLst>
+      <p:par>
+        <p:cTn id="1" dur="indefinite" restart="never" nodeType="tmRoot"/>
+      </p:par>
+    </p:tnLst>
+  </p:timing>
+</p:sld>
+</file>
+
+<file path=ppt/slides/slide21.xml><?xml version="1.0" encoding="utf-8"?>
+<p:sld xmlns:a="http://schemas.openxmlformats.org/drawingml/2006/main" xmlns:r="http://schemas.openxmlformats.org/officeDocument/2006/relationships" xmlns:p="http://schemas.openxmlformats.org/presentationml/2006/main">
+  <p:cSld>
+    <p:spTree>
+      <p:nvGrpSpPr>
+        <p:cNvPr id="1" name=""/>
+        <p:cNvGrpSpPr/>
+        <p:nvPr/>
+      </p:nvGrpSpPr>
+      <p:grpSpPr>
+        <a:xfrm>
+          <a:off x="0" y="0"/>
+          <a:ext cx="0" cy="0"/>
+          <a:chOff x="0" y="0"/>
+          <a:chExt cx="0" cy="0"/>
+        </a:xfrm>
+      </p:grpSpPr>
+      <p:sp>
+        <p:nvSpPr>
+          <p:cNvPr id="2" name="Title 1"/>
+          <p:cNvSpPr>
+            <a:spLocks noGrp="1"/>
+          </p:cNvSpPr>
+          <p:nvPr>
+            <p:ph type="title"/>
+          </p:nvPr>
+        </p:nvSpPr>
+        <p:spPr>
+          <a:xfrm>
+            <a:off x="457200" y="274638"/>
+            <a:ext cx="8229600" cy="1498178"/>
+          </a:xfrm>
+        </p:spPr>
+        <p:txBody>
+          <a:bodyPr/>
+          <a:lstStyle/>
+          <a:p>
+            <a:r>
+              <a:rPr lang="bg-BG" dirty="0" smtClean="0">
+                <a:solidFill>
+                  <a:schemeClr val="bg1"/>
+                </a:solidFill>
+              </a:rPr>
+              <a:t>Предефиниране на методи</a:t>
+            </a:r>
+            <a:endParaRPr lang="en-US" dirty="0">
+              <a:ln w="18415" cmpd="sng">
+                <a:solidFill>
+                  <a:srgbClr val="FFFFFF"/>
+                </a:solidFill>
+                <a:prstDash val="solid"/>
+              </a:ln>
+              <a:solidFill>
+                <a:srgbClr val="FFFFFF"/>
+              </a:solidFill>
+            </a:endParaRPr>
+          </a:p>
+        </p:txBody>
+      </p:sp>
+      <p:sp>
+        <p:nvSpPr>
+          <p:cNvPr id="3" name="Content Placeholder 2"/>
+          <p:cNvSpPr>
+            <a:spLocks noGrp="1"/>
+          </p:cNvSpPr>
+          <p:nvPr>
+            <p:ph idx="1"/>
+          </p:nvPr>
+        </p:nvSpPr>
+        <p:spPr>
+          <a:xfrm>
+            <a:off x="971600" y="1988840"/>
+            <a:ext cx="7992888" cy="4680520"/>
+          </a:xfrm>
+        </p:spPr>
+        <p:txBody>
+          <a:bodyPr/>
+          <a:lstStyle/>
+          <a:p>
+            <a:pPr marL="1444625"/>
+            <a:r>
+              <a:rPr lang="bg-BG" dirty="0" smtClean="0">
+                <a:ln w="18415" cmpd="sng">
+                  <a:noFill/>
+                  <a:prstDash val="solid"/>
+                </a:ln>
+                <a:solidFill>
+                  <a:srgbClr val="FFFFFF"/>
+                </a:solidFill>
+              </a:rPr>
+              <a:t>Два или повече метода са </a:t>
+            </a:r>
+            <a:r>
+              <a:rPr lang="bg-BG" dirty="0" err="1" smtClean="0">
+                <a:ln w="18415" cmpd="sng">
+                  <a:noFill/>
+                  <a:prstDash val="solid"/>
+                </a:ln>
+                <a:solidFill>
+                  <a:srgbClr val="FFFFFF"/>
+                </a:solidFill>
+              </a:rPr>
+              <a:t>предефинирани</a:t>
+            </a:r>
+            <a:r>
+              <a:rPr lang="bg-BG" dirty="0" smtClean="0">
+                <a:ln w="18415" cmpd="sng">
+                  <a:noFill/>
+                  <a:prstDash val="solid"/>
+                </a:ln>
+                <a:solidFill>
+                  <a:srgbClr val="FFFFFF"/>
+                </a:solidFill>
+              </a:rPr>
+              <a:t>, ако имат едни и същи имена, но се различават по списъка с параметрите си (</a:t>
+            </a:r>
+            <a:r>
+              <a:rPr lang="bg-BG" b="1" u="sng" dirty="0" smtClean="0">
+                <a:ln w="18415" cmpd="sng">
+                  <a:noFill/>
+                  <a:prstDash val="solid"/>
+                </a:ln>
+                <a:solidFill>
+                  <a:srgbClr val="FFFFFF"/>
+                </a:solidFill>
+              </a:rPr>
+              <a:t>не</a:t>
+            </a:r>
+            <a:r>
+              <a:rPr lang="bg-BG" b="1" dirty="0" smtClean="0">
+                <a:ln w="18415" cmpd="sng">
+                  <a:noFill/>
+                  <a:prstDash val="solid"/>
+                </a:ln>
+                <a:solidFill>
+                  <a:srgbClr val="FFFFFF"/>
+                </a:solidFill>
+              </a:rPr>
+              <a:t> по типа на връщаната стойност</a:t>
+            </a:r>
+            <a:r>
+              <a:rPr lang="bg-BG" dirty="0" smtClean="0">
+                <a:ln w="18415" cmpd="sng">
+                  <a:noFill/>
+                  <a:prstDash val="solid"/>
+                </a:ln>
+                <a:solidFill>
+                  <a:srgbClr val="FFFFFF"/>
+                </a:solidFill>
+              </a:rPr>
+              <a:t>)</a:t>
+            </a:r>
+          </a:p>
+          <a:p>
+            <a:pPr marL="1444625"/>
+            <a:r>
+              <a:rPr lang="bg-BG" dirty="0" smtClean="0">
+                <a:ln w="18415" cmpd="sng">
+                  <a:noFill/>
+                  <a:prstDash val="solid"/>
+                </a:ln>
+                <a:solidFill>
+                  <a:srgbClr val="FFFFFF"/>
+                </a:solidFill>
+              </a:rPr>
+              <a:t>Когато </a:t>
+            </a:r>
+            <a:r>
+              <a:rPr lang="bg-BG" dirty="0" err="1" smtClean="0">
+                <a:ln w="18415" cmpd="sng">
+                  <a:noFill/>
+                  <a:prstDash val="solid"/>
+                </a:ln>
+                <a:solidFill>
+                  <a:srgbClr val="FFFFFF"/>
+                </a:solidFill>
+              </a:rPr>
+              <a:t>предефиниран</a:t>
+            </a:r>
+            <a:r>
+              <a:rPr lang="bg-BG" dirty="0" smtClean="0">
+                <a:ln w="18415" cmpd="sng">
+                  <a:noFill/>
+                  <a:prstDash val="solid"/>
+                </a:ln>
+                <a:solidFill>
+                  <a:srgbClr val="FFFFFF"/>
+                </a:solidFill>
+              </a:rPr>
+              <a:t> метод бъде извикан, се решава кой от всичките варианти да се изпълнява</a:t>
+            </a:r>
+            <a:endParaRPr lang="bg-BG" dirty="0" smtClean="0">
+              <a:ln w="18415" cmpd="sng">
+                <a:noFill/>
+                <a:prstDash val="solid"/>
+              </a:ln>
+              <a:solidFill>
+                <a:srgbClr val="FFFFFF"/>
+              </a:solidFill>
+            </a:endParaRPr>
+          </a:p>
+        </p:txBody>
+      </p:sp>
+    </p:spTree>
+    <p:extLst>
+      <p:ext uri="{BB962C8B-B14F-4D97-AF65-F5344CB8AC3E}">
+        <p14:creationId xmlns:p14="http://schemas.microsoft.com/office/powerpoint/2010/main" val="246800562"/>
+      </p:ext>
+    </p:extLst>
+  </p:cSld>
+  <p:clrMapOvr>
+    <a:masterClrMapping/>
+  </p:clrMapOvr>
+  <p:timing>
+    <p:tnLst>
+      <p:par>
+        <p:cTn id="1" dur="indefinite" restart="never" nodeType="tmRoot"/>
+      </p:par>
+    </p:tnLst>
+  </p:timing>
+</p:sld>
+</file>
+
+<file path=ppt/slides/slide22.xml><?xml version="1.0" encoding="utf-8"?>
+<p:sld xmlns:a="http://schemas.openxmlformats.org/drawingml/2006/main" xmlns:r="http://schemas.openxmlformats.org/officeDocument/2006/relationships" xmlns:p="http://schemas.openxmlformats.org/presentationml/2006/main">
+  <p:cSld>
+    <p:spTree>
+      <p:nvGrpSpPr>
+        <p:cNvPr id="1" name=""/>
+        <p:cNvGrpSpPr/>
+        <p:nvPr/>
+      </p:nvGrpSpPr>
+      <p:grpSpPr>
+        <a:xfrm>
+          <a:off x="0" y="0"/>
+          <a:ext cx="0" cy="0"/>
+          <a:chOff x="0" y="0"/>
+          <a:chExt cx="0" cy="0"/>
+        </a:xfrm>
+      </p:grpSpPr>
+      <p:sp>
+        <p:nvSpPr>
+          <p:cNvPr id="106498" name="Rectangle 2"/>
+          <p:cNvSpPr>
+            <a:spLocks noGrp="1" noChangeArrowheads="1"/>
+          </p:cNvSpPr>
+          <p:nvPr>
+            <p:ph type="title"/>
+          </p:nvPr>
+        </p:nvSpPr>
+        <p:spPr>
+          <a:xfrm>
+            <a:off x="395288" y="188913"/>
+            <a:ext cx="8229600" cy="1511895"/>
+          </a:xfrm>
+        </p:spPr>
+        <p:txBody>
+          <a:bodyPr/>
+          <a:lstStyle/>
+          <a:p>
+            <a:r>
+              <a:rPr lang="bg-BG" altLang="bg-BG" dirty="0" err="1" smtClean="0">
+                <a:solidFill>
+                  <a:schemeClr val="bg1"/>
+                </a:solidFill>
+              </a:rPr>
+              <a:t>Предефинирани</a:t>
+            </a:r>
+            <a:r>
+              <a:rPr lang="bg-BG" altLang="bg-BG" dirty="0" smtClean="0">
+                <a:solidFill>
+                  <a:schemeClr val="bg1"/>
+                </a:solidFill>
+              </a:rPr>
+              <a:t> методи</a:t>
+            </a:r>
+            <a:endParaRPr lang="bg-BG" altLang="bg-BG" dirty="0">
+              <a:solidFill>
+                <a:schemeClr val="bg1"/>
+              </a:solidFill>
+            </a:endParaRPr>
+          </a:p>
+        </p:txBody>
+      </p:sp>
+      <p:sp>
+        <p:nvSpPr>
+          <p:cNvPr id="2" name="Правоъгълник 1"/>
+          <p:cNvSpPr/>
+          <p:nvPr/>
+        </p:nvSpPr>
+        <p:spPr>
+          <a:xfrm>
+            <a:off x="3680304" y="3140968"/>
+            <a:ext cx="2188741" cy="1015663"/>
+          </a:xfrm>
+          <a:prstGeom prst="rect">
+            <a:avLst/>
+          </a:prstGeom>
+          <a:noFill/>
+        </p:spPr>
+        <p:txBody>
+          <a:bodyPr wrap="none" lIns="91440" tIns="45720" rIns="91440" bIns="45720">
+            <a:spAutoFit/>
+          </a:bodyPr>
+          <a:lstStyle/>
+          <a:p>
+            <a:pPr algn="ctr"/>
+            <a:r>
+              <a:rPr lang="bg-BG" sz="6000" b="1" cap="none" spc="0" dirty="0" err="1" smtClean="0">
+                <a:ln w="900" cmpd="sng">
+                  <a:solidFill>
+                    <a:schemeClr val="accent1">
+                      <a:satMod val="190000"/>
+                      <a:alpha val="55000"/>
+                    </a:schemeClr>
+                  </a:solidFill>
+                  <a:prstDash val="solid"/>
+                </a:ln>
+                <a:solidFill>
+                  <a:schemeClr val="accent1">
+                    <a:satMod val="200000"/>
+                    <a:tint val="3000"/>
+                  </a:schemeClr>
+                </a:solidFill>
+                <a:effectLst>
+                  <a:innerShdw blurRad="101600" dist="76200" dir="5400000">
+                    <a:schemeClr val="accent1">
+                      <a:satMod val="190000"/>
+                      <a:tint val="100000"/>
+                      <a:alpha val="74000"/>
+                    </a:schemeClr>
+                  </a:innerShdw>
+                </a:effectLst>
+              </a:rPr>
+              <a:t>Демо</a:t>
+            </a:r>
+            <a:endParaRPr lang="bg-BG" sz="6000" b="1" cap="none" spc="0" dirty="0">
+              <a:ln w="900" cmpd="sng">
+                <a:solidFill>
+                  <a:schemeClr val="accent1">
+                    <a:satMod val="190000"/>
+                    <a:alpha val="55000"/>
+                  </a:schemeClr>
+                </a:solidFill>
+                <a:prstDash val="solid"/>
+              </a:ln>
+              <a:solidFill>
+                <a:schemeClr val="accent1">
+                  <a:satMod val="200000"/>
+                  <a:tint val="3000"/>
+                </a:schemeClr>
+              </a:solidFill>
+              <a:effectLst>
+                <a:innerShdw blurRad="101600" dist="76200" dir="5400000">
+                  <a:schemeClr val="accent1">
+                    <a:satMod val="190000"/>
+                    <a:tint val="100000"/>
+                    <a:alpha val="74000"/>
+                  </a:schemeClr>
+                </a:innerShdw>
+              </a:effectLst>
+            </a:endParaRPr>
+          </a:p>
+        </p:txBody>
+      </p:sp>
+    </p:spTree>
+    <p:extLst>
+      <p:ext uri="{BB962C8B-B14F-4D97-AF65-F5344CB8AC3E}">
+        <p14:creationId xmlns:p14="http://schemas.microsoft.com/office/powerpoint/2010/main" val="2043309573"/>
+      </p:ext>
+    </p:extLst>
+  </p:cSld>
+  <p:clrMapOvr>
+    <a:masterClrMapping/>
+  </p:clrMapOvr>
+  <p:timing>
+    <p:tnLst>
+      <p:par>
+        <p:cTn id="1" dur="indefinite" restart="never" nodeType="tmRoot"/>
+      </p:par>
+    </p:tnLst>
+  </p:timing>
+</p:sld>
+</file>
+
+<file path=ppt/slides/slide23.xml><?xml version="1.0" encoding="utf-8"?>
+<p:sld xmlns:a="http://schemas.openxmlformats.org/drawingml/2006/main" xmlns:r="http://schemas.openxmlformats.org/officeDocument/2006/relationships" xmlns:p="http://schemas.openxmlformats.org/presentationml/2006/main">
+  <p:cSld>
+    <p:spTree>
+      <p:nvGrpSpPr>
+        <p:cNvPr id="1" name=""/>
+        <p:cNvGrpSpPr/>
+        <p:nvPr/>
+      </p:nvGrpSpPr>
+      <p:grpSpPr>
+        <a:xfrm>
+          <a:off x="0" y="0"/>
+          <a:ext cx="0" cy="0"/>
+          <a:chOff x="0" y="0"/>
+          <a:chExt cx="0" cy="0"/>
+        </a:xfrm>
+      </p:grpSpPr>
+      <p:sp>
+        <p:nvSpPr>
+          <p:cNvPr id="2" name="Title 1"/>
+          <p:cNvSpPr>
+            <a:spLocks noGrp="1"/>
+          </p:cNvSpPr>
+          <p:nvPr>
+            <p:ph type="title"/>
+          </p:nvPr>
+        </p:nvSpPr>
+        <p:spPr/>
+        <p:txBody>
+          <a:bodyPr/>
+          <a:lstStyle/>
+          <a:p>
+            <a:r>
+              <a:rPr lang="bg-BG" altLang="bg-BG" dirty="0" smtClean="0">
+                <a:solidFill>
+                  <a:schemeClr val="bg1"/>
+                </a:solidFill>
+              </a:rPr>
+              <a:t>Добри практики</a:t>
+            </a:r>
+            <a:endParaRPr lang="en-US" dirty="0">
+              <a:ln w="18415" cmpd="sng">
+                <a:solidFill>
+                  <a:srgbClr val="FFFFFF"/>
+                </a:solidFill>
+                <a:prstDash val="solid"/>
+              </a:ln>
+              <a:solidFill>
+                <a:srgbClr val="FFFFFF"/>
+              </a:solidFill>
+            </a:endParaRPr>
+          </a:p>
+        </p:txBody>
+      </p:sp>
+      <p:sp>
+        <p:nvSpPr>
+          <p:cNvPr id="3" name="Content Placeholder 2"/>
+          <p:cNvSpPr>
+            <a:spLocks noGrp="1"/>
+          </p:cNvSpPr>
+          <p:nvPr>
+            <p:ph idx="1"/>
+          </p:nvPr>
+        </p:nvSpPr>
+        <p:spPr>
+          <a:xfrm>
+            <a:off x="971600" y="1556792"/>
+            <a:ext cx="7848872" cy="4525963"/>
+          </a:xfrm>
+        </p:spPr>
+        <p:txBody>
+          <a:bodyPr/>
+          <a:lstStyle/>
+          <a:p>
+            <a:pPr marL="1444625"/>
+            <a:r>
+              <a:rPr lang="bg-BG" dirty="0" smtClean="0">
+                <a:ln w="18415" cmpd="sng">
+                  <a:noFill/>
+                  <a:prstDash val="solid"/>
+                </a:ln>
+                <a:solidFill>
+                  <a:srgbClr val="FFFFFF"/>
+                </a:solidFill>
+              </a:rPr>
+              <a:t>Методите трябва да решават точно определена и ясно дефинирана задача</a:t>
+            </a:r>
+          </a:p>
+          <a:p>
+            <a:pPr marL="1444625"/>
+            <a:r>
+              <a:rPr lang="bg-BG" dirty="0" smtClean="0">
+                <a:ln w="18415" cmpd="sng">
+                  <a:noFill/>
+                  <a:prstDash val="solid"/>
+                </a:ln>
+                <a:solidFill>
+                  <a:srgbClr val="FFFFFF"/>
+                </a:solidFill>
+              </a:rPr>
+              <a:t>Името на метода трябва да е описателно (</a:t>
+            </a:r>
+            <a:r>
+              <a:rPr lang="bg-BG" dirty="0" err="1" smtClean="0">
+                <a:ln w="18415" cmpd="sng">
+                  <a:noFill/>
+                  <a:prstDash val="solid"/>
+                </a:ln>
+                <a:solidFill>
+                  <a:srgbClr val="FFFFFF"/>
+                </a:solidFill>
+              </a:rPr>
+              <a:t>вж</a:t>
+            </a:r>
+            <a:r>
+              <a:rPr lang="bg-BG" dirty="0" smtClean="0">
+                <a:ln w="18415" cmpd="sng">
+                  <a:noFill/>
+                  <a:prstDash val="solid"/>
+                </a:ln>
+                <a:solidFill>
+                  <a:srgbClr val="FFFFFF"/>
+                </a:solidFill>
+              </a:rPr>
+              <a:t> </a:t>
+            </a:r>
+            <a:r>
+              <a:rPr lang="bg-BG" dirty="0" smtClean="0">
+                <a:ln w="18415" cmpd="sng">
+                  <a:noFill/>
+                  <a:prstDash val="solid"/>
+                </a:ln>
+                <a:solidFill>
+                  <a:srgbClr val="FFFFFF"/>
+                </a:solidFill>
+                <a:hlinkClick r:id="rId2" action="ppaction://hlinksldjump"/>
+              </a:rPr>
+              <a:t>тук</a:t>
+            </a:r>
+            <a:r>
+              <a:rPr lang="bg-BG" dirty="0" smtClean="0">
+                <a:ln w="18415" cmpd="sng">
+                  <a:noFill/>
+                  <a:prstDash val="solid"/>
+                </a:ln>
+                <a:solidFill>
+                  <a:srgbClr val="FFFFFF"/>
+                </a:solidFill>
+              </a:rPr>
+              <a:t>)</a:t>
+            </a:r>
+          </a:p>
+          <a:p>
+            <a:pPr marL="1444625"/>
+            <a:r>
+              <a:rPr lang="bg-BG" dirty="0" smtClean="0">
+                <a:ln w="18415" cmpd="sng">
+                  <a:noFill/>
+                  <a:prstDash val="solid"/>
+                </a:ln>
+                <a:solidFill>
+                  <a:srgbClr val="FFFFFF"/>
+                </a:solidFill>
+              </a:rPr>
+              <a:t>Методът трябва или да се справи успешно със задачата си, или да върне грешка</a:t>
+            </a:r>
+            <a:endParaRPr lang="bg-BG" dirty="0" smtClean="0">
+              <a:ln w="18415" cmpd="sng">
+                <a:noFill/>
+                <a:prstDash val="solid"/>
+              </a:ln>
+              <a:solidFill>
+                <a:srgbClr val="FFFFFF"/>
+              </a:solidFill>
+            </a:endParaRPr>
+          </a:p>
+        </p:txBody>
+      </p:sp>
+    </p:spTree>
+    <p:extLst>
+      <p:ext uri="{BB962C8B-B14F-4D97-AF65-F5344CB8AC3E}">
+        <p14:creationId xmlns:p14="http://schemas.microsoft.com/office/powerpoint/2010/main" val="2478400003"/>
+      </p:ext>
+    </p:extLst>
+  </p:cSld>
+  <p:clrMapOvr>
+    <a:masterClrMapping/>
+  </p:clrMapOvr>
+  <p:timing>
+    <p:tnLst>
+      <p:par>
+        <p:cTn id="1" dur="indefinite" restart="never" nodeType="tmRoot"/>
+      </p:par>
+    </p:tnLst>
+  </p:timing>
+</p:sld>
+</file>
+
+<file path=ppt/slides/slide24.xml><?xml version="1.0" encoding="utf-8"?>
+<p:sld xmlns:a="http://schemas.openxmlformats.org/drawingml/2006/main" xmlns:r="http://schemas.openxmlformats.org/officeDocument/2006/relationships" xmlns:p="http://schemas.openxmlformats.org/presentationml/2006/main">
+  <p:cSld>
+    <p:spTree>
+      <p:nvGrpSpPr>
+        <p:cNvPr id="1" name=""/>
+        <p:cNvGrpSpPr/>
+        <p:nvPr/>
+      </p:nvGrpSpPr>
+      <p:grpSpPr>
+        <a:xfrm>
+          <a:off x="0" y="0"/>
+          <a:ext cx="0" cy="0"/>
+          <a:chOff x="0" y="0"/>
+          <a:chExt cx="0" cy="0"/>
+        </a:xfrm>
+      </p:grpSpPr>
+      <p:sp>
+        <p:nvSpPr>
+          <p:cNvPr id="2198" name="Rectangle 150"/>
+          <p:cNvSpPr>
+            <a:spLocks noGrp="1" noChangeArrowheads="1"/>
+          </p:cNvSpPr>
+          <p:nvPr>
+            <p:ph type="ctrTitle"/>
+          </p:nvPr>
+        </p:nvSpPr>
+        <p:spPr>
+          <a:xfrm>
+            <a:off x="1979712" y="1196752"/>
+            <a:ext cx="6984776" cy="2375322"/>
+          </a:xfrm>
+        </p:spPr>
+        <p:txBody>
+          <a:bodyPr/>
+          <a:lstStyle/>
+          <a:p>
+            <a:r>
+              <a:rPr lang="bg-BG" altLang="bg-BG" sz="5400" b="1" smtClean="0">
+                <a:solidFill>
+                  <a:schemeClr val="bg1"/>
+                </a:solidFill>
+              </a:rPr>
+              <a:t>Рекурсия</a:t>
+            </a:r>
+            <a:endParaRPr lang="es-ES" altLang="bg-BG" sz="5400" b="1" dirty="0">
+              <a:solidFill>
+                <a:schemeClr val="bg1"/>
+              </a:solidFill>
+            </a:endParaRPr>
+          </a:p>
+        </p:txBody>
+      </p:sp>
+      <p:sp>
+        <p:nvSpPr>
+          <p:cNvPr id="2209" name="Rectangle 161"/>
+          <p:cNvSpPr>
+            <a:spLocks noChangeArrowheads="1"/>
+          </p:cNvSpPr>
+          <p:nvPr/>
+        </p:nvSpPr>
+        <p:spPr bwMode="auto">
+          <a:xfrm>
+            <a:off x="2592288" y="4076700"/>
+            <a:ext cx="6732240" cy="1152525"/>
+          </a:xfrm>
+          <a:prstGeom prst="rect">
+            <a:avLst/>
+          </a:prstGeom>
+          <a:noFill/>
+          <a:ln>
+            <a:noFill/>
+          </a:ln>
+          <a:effectLst/>
+          <a:extLst>
+            <a:ext uri="{909E8E84-426E-40DD-AFC4-6F175D3DCCD1}">
+              <a14:hiddenFill xmlns:a14="http://schemas.microsoft.com/office/drawing/2010/main">
+                <a:solidFill>
+                  <a:schemeClr val="accent1"/>
+                </a:solidFill>
+              </a14:hiddenFill>
+            </a:ext>
+            <a:ext uri="{91240B29-F687-4F45-9708-019B960494DF}">
+              <a14:hiddenLine xmlns:a14="http://schemas.microsoft.com/office/drawing/2010/main" w="9525">
+                <a:solidFill>
+                  <a:schemeClr val="tx1"/>
+                </a:solidFill>
+                <a:miter lim="800000"/>
+                <a:headEnd/>
+                <a:tailEnd/>
+              </a14:hiddenLine>
+            </a:ext>
+            <a:ext uri="{AF507438-7753-43E0-B8FC-AC1667EBCBE1}">
+              <a14:hiddenEffects xmlns:a14="http://schemas.microsoft.com/office/drawing/2010/main">
+                <a:effectLst>
+                  <a:outerShdw dist="35921" dir="2700000" algn="ctr" rotWithShape="0">
+                    <a:schemeClr val="bg2"/>
+                  </a:outerShdw>
+                </a:effectLst>
+              </a14:hiddenEffects>
+            </a:ext>
+          </a:extLst>
+        </p:spPr>
+        <p:txBody>
+          <a:bodyPr anchor="ctr"/>
+          <a:lstStyle>
+            <a:lvl1pPr algn="ctr">
+              <a:defRPr sz="4400">
+                <a:solidFill>
+                  <a:schemeClr val="tx2"/>
+                </a:solidFill>
+                <a:latin typeface="Arial" charset="0"/>
+                <a:cs typeface="Arial" charset="0"/>
+              </a:defRPr>
+            </a:lvl1pPr>
+            <a:lvl2pPr algn="ctr">
+              <a:defRPr sz="4400">
+                <a:solidFill>
+                  <a:schemeClr val="tx2"/>
+                </a:solidFill>
+                <a:latin typeface="Arial" charset="0"/>
+                <a:cs typeface="Arial" charset="0"/>
+              </a:defRPr>
+            </a:lvl2pPr>
+            <a:lvl3pPr algn="ctr">
+              <a:defRPr sz="4400">
+                <a:solidFill>
+                  <a:schemeClr val="tx2"/>
+                </a:solidFill>
+                <a:latin typeface="Arial" charset="0"/>
+                <a:cs typeface="Arial" charset="0"/>
+              </a:defRPr>
+            </a:lvl3pPr>
+            <a:lvl4pPr algn="ctr">
+              <a:defRPr sz="4400">
+                <a:solidFill>
+                  <a:schemeClr val="tx2"/>
+                </a:solidFill>
+                <a:latin typeface="Arial" charset="0"/>
+                <a:cs typeface="Arial" charset="0"/>
+              </a:defRPr>
+            </a:lvl4pPr>
+            <a:lvl5pPr algn="ctr">
+              <a:defRPr sz="4400">
+                <a:solidFill>
+                  <a:schemeClr val="tx2"/>
+                </a:solidFill>
+                <a:latin typeface="Arial" charset="0"/>
+                <a:cs typeface="Arial" charset="0"/>
+              </a:defRPr>
+            </a:lvl5pPr>
+            <a:lvl6pPr marL="457200" algn="ctr" fontAlgn="base">
+              <a:spcBef>
+                <a:spcPct val="0"/>
+              </a:spcBef>
+              <a:spcAft>
+                <a:spcPct val="0"/>
+              </a:spcAft>
+              <a:defRPr sz="4400">
+                <a:solidFill>
+                  <a:schemeClr val="tx2"/>
+                </a:solidFill>
+                <a:latin typeface="Arial" charset="0"/>
+                <a:cs typeface="Arial" charset="0"/>
+              </a:defRPr>
+            </a:lvl6pPr>
+            <a:lvl7pPr marL="914400" algn="ctr" fontAlgn="base">
+              <a:spcBef>
+                <a:spcPct val="0"/>
+              </a:spcBef>
+              <a:spcAft>
+                <a:spcPct val="0"/>
+              </a:spcAft>
+              <a:defRPr sz="4400">
+                <a:solidFill>
+                  <a:schemeClr val="tx2"/>
+                </a:solidFill>
+                <a:latin typeface="Arial" charset="0"/>
+                <a:cs typeface="Arial" charset="0"/>
+              </a:defRPr>
+            </a:lvl7pPr>
+            <a:lvl8pPr marL="1371600" algn="ctr" fontAlgn="base">
+              <a:spcBef>
+                <a:spcPct val="0"/>
+              </a:spcBef>
+              <a:spcAft>
+                <a:spcPct val="0"/>
+              </a:spcAft>
+              <a:defRPr sz="4400">
+                <a:solidFill>
+                  <a:schemeClr val="tx2"/>
+                </a:solidFill>
+                <a:latin typeface="Arial" charset="0"/>
+                <a:cs typeface="Arial" charset="0"/>
+              </a:defRPr>
+            </a:lvl8pPr>
+            <a:lvl9pPr marL="1828800" algn="ctr" fontAlgn="base">
+              <a:spcBef>
+                <a:spcPct val="0"/>
+              </a:spcBef>
+              <a:spcAft>
+                <a:spcPct val="0"/>
+              </a:spcAft>
+              <a:defRPr sz="4400">
+                <a:solidFill>
+                  <a:schemeClr val="tx2"/>
+                </a:solidFill>
+                <a:latin typeface="Arial" charset="0"/>
+                <a:cs typeface="Arial" charset="0"/>
+              </a:defRPr>
+            </a:lvl9pPr>
+          </a:lstStyle>
+          <a:p>
+            <a:pPr algn="l"/>
+            <a:r>
+              <a:rPr lang="bg-BG" altLang="bg-BG" sz="2800" b="1" dirty="0" smtClean="0">
+                <a:solidFill>
+                  <a:schemeClr val="bg1"/>
+                </a:solidFill>
+              </a:rPr>
+              <a:t>Гошо – </a:t>
+            </a:r>
+            <a:r>
+              <a:rPr lang="en-GB" altLang="bg-BG" sz="2800" b="1" dirty="0" smtClean="0">
+                <a:solidFill>
+                  <a:schemeClr val="bg1"/>
+                </a:solidFill>
+              </a:rPr>
+              <a:t>themikuma@gmail.com </a:t>
+            </a:r>
+            <a:endParaRPr lang="bg-BG" altLang="bg-BG" sz="2800" b="1" dirty="0" smtClean="0">
+              <a:solidFill>
+                <a:schemeClr val="bg1"/>
+              </a:solidFill>
+            </a:endParaRPr>
+          </a:p>
+          <a:p>
+            <a:pPr algn="l"/>
+            <a:r>
+              <a:rPr lang="bg-BG" altLang="bg-BG" sz="2800" b="1" dirty="0" smtClean="0">
+                <a:solidFill>
+                  <a:schemeClr val="bg1"/>
+                </a:solidFill>
+              </a:rPr>
+              <a:t>Слави – </a:t>
+            </a:r>
+            <a:r>
+              <a:rPr lang="en-US" altLang="bg-BG" sz="2800" b="1" dirty="0" smtClean="0">
+                <a:solidFill>
+                  <a:schemeClr val="bg1"/>
+                </a:solidFill>
+              </a:rPr>
+              <a:t>georgiev.slavi.94@gmail.com</a:t>
+            </a:r>
+            <a:endParaRPr lang="es-ES" altLang="bg-BG" sz="2800" b="1" dirty="0">
+              <a:solidFill>
+                <a:schemeClr val="bg1"/>
+              </a:solidFill>
+            </a:endParaRPr>
+          </a:p>
+        </p:txBody>
+      </p:sp>
+    </p:spTree>
+    <p:extLst>
+      <p:ext uri="{BB962C8B-B14F-4D97-AF65-F5344CB8AC3E}">
+        <p14:creationId xmlns:p14="http://schemas.microsoft.com/office/powerpoint/2010/main" val="1373722909"/>
+      </p:ext>
+    </p:extLst>
+  </p:cSld>
+  <p:clrMapOvr>
+    <a:masterClrMapping/>
+  </p:clrMapOvr>
+  <p:timing>
+    <p:tnLst>
+      <p:par>
+        <p:cTn id="1" dur="indefinite" restart="never" nodeType="tmRoot"/>
+      </p:par>
+    </p:tnLst>
+  </p:timing>
+</p:sld>
+</file>
+
+<file path=ppt/slides/slide25.xml><?xml version="1.0" encoding="utf-8"?>
+<p:sld xmlns:a="http://schemas.openxmlformats.org/drawingml/2006/main" xmlns:r="http://schemas.openxmlformats.org/officeDocument/2006/relationships" xmlns:p="http://schemas.openxmlformats.org/presentationml/2006/main">
+  <p:cSld>
+    <p:spTree>
+      <p:nvGrpSpPr>
+        <p:cNvPr id="1" name=""/>
+        <p:cNvGrpSpPr/>
+        <p:nvPr/>
+      </p:nvGrpSpPr>
+      <p:grpSpPr>
+        <a:xfrm>
+          <a:off x="0" y="0"/>
+          <a:ext cx="0" cy="0"/>
+          <a:chOff x="0" y="0"/>
+          <a:chExt cx="0" cy="0"/>
+        </a:xfrm>
+      </p:grpSpPr>
+      <p:sp>
+        <p:nvSpPr>
+          <p:cNvPr id="106498" name="Rectangle 2"/>
+          <p:cNvSpPr>
+            <a:spLocks noGrp="1" noChangeArrowheads="1"/>
+          </p:cNvSpPr>
+          <p:nvPr>
+            <p:ph type="title"/>
+          </p:nvPr>
+        </p:nvSpPr>
+        <p:spPr>
+          <a:xfrm>
+            <a:off x="395288" y="188913"/>
+            <a:ext cx="8229600" cy="981075"/>
+          </a:xfrm>
+        </p:spPr>
+        <p:txBody>
+          <a:bodyPr/>
+          <a:lstStyle/>
+          <a:p>
+            <a:r>
+              <a:rPr lang="bg-BG" altLang="bg-BG" dirty="0" smtClean="0">
+                <a:solidFill>
+                  <a:schemeClr val="bg1"/>
+                </a:solidFill>
+              </a:rPr>
+              <a:t>Въпроси?</a:t>
+            </a:r>
+            <a:endParaRPr lang="bg-BG" altLang="bg-BG" dirty="0">
+              <a:solidFill>
+                <a:schemeClr val="bg1"/>
+              </a:solidFill>
+            </a:endParaRPr>
+          </a:p>
+        </p:txBody>
+      </p:sp>
+      <p:sp>
+        <p:nvSpPr>
+          <p:cNvPr id="2" name="Правоъгълник 1"/>
+          <p:cNvSpPr/>
+          <p:nvPr/>
+        </p:nvSpPr>
+        <p:spPr>
+          <a:xfrm>
+            <a:off x="3558639" y="1700808"/>
+            <a:ext cx="2432077" cy="4508927"/>
+          </a:xfrm>
+          <a:prstGeom prst="rect">
+            <a:avLst/>
+          </a:prstGeom>
+          <a:noFill/>
+        </p:spPr>
+        <p:txBody>
+          <a:bodyPr wrap="none" lIns="91440" tIns="45720" rIns="91440" bIns="45720">
+            <a:spAutoFit/>
+          </a:bodyPr>
+          <a:lstStyle/>
+          <a:p>
+            <a:pPr algn="ctr"/>
+            <a:r>
+              <a:rPr lang="bg-BG" sz="28700" b="1" cap="none" spc="0" dirty="0" smtClean="0">
+                <a:ln w="900" cmpd="sng">
+                  <a:solidFill>
+                    <a:schemeClr val="accent1">
+                      <a:satMod val="190000"/>
+                      <a:alpha val="55000"/>
+                    </a:schemeClr>
+                  </a:solidFill>
+                  <a:prstDash val="solid"/>
+                </a:ln>
+                <a:solidFill>
+                  <a:schemeClr val="accent1">
+                    <a:satMod val="200000"/>
+                    <a:tint val="3000"/>
+                  </a:schemeClr>
+                </a:solidFill>
+                <a:effectLst>
+                  <a:innerShdw blurRad="101600" dist="76200" dir="5400000">
+                    <a:schemeClr val="accent1">
+                      <a:satMod val="190000"/>
+                      <a:tint val="100000"/>
+                      <a:alpha val="74000"/>
+                    </a:schemeClr>
+                  </a:innerShdw>
+                </a:effectLst>
+              </a:rPr>
+              <a:t>?</a:t>
+            </a:r>
+            <a:endParaRPr lang="bg-BG" sz="6000" b="1" cap="none" spc="0" dirty="0">
+              <a:ln w="900" cmpd="sng">
+                <a:solidFill>
+                  <a:schemeClr val="accent1">
+                    <a:satMod val="190000"/>
+                    <a:alpha val="55000"/>
+                  </a:schemeClr>
+                </a:solidFill>
+                <a:prstDash val="solid"/>
+              </a:ln>
+              <a:solidFill>
+                <a:schemeClr val="accent1">
+                  <a:satMod val="200000"/>
+                  <a:tint val="3000"/>
+                </a:schemeClr>
+              </a:solidFill>
+              <a:effectLst>
+                <a:innerShdw blurRad="101600" dist="76200" dir="5400000">
+                  <a:schemeClr val="accent1">
+                    <a:satMod val="190000"/>
+                    <a:tint val="100000"/>
+                    <a:alpha val="74000"/>
+                  </a:schemeClr>
+                </a:innerShdw>
+              </a:effectLst>
+            </a:endParaRPr>
+          </a:p>
+        </p:txBody>
+      </p:sp>
+    </p:spTree>
+    <p:extLst>
+      <p:ext uri="{BB962C8B-B14F-4D97-AF65-F5344CB8AC3E}">
+        <p14:creationId xmlns:p14="http://schemas.microsoft.com/office/powerpoint/2010/main" val="1054652420"/>
+      </p:ext>
+    </p:extLst>
+  </p:cSld>
+  <p:clrMapOvr>
+    <a:masterClrMapping/>
+  </p:clrMapOvr>
+  <p:timing>
+    <p:tnLst>
+      <p:par>
+        <p:cTn id="1" dur="indefinite" restart="never" nodeType="tmRoot"/>
+      </p:par>
+    </p:tnLst>
+  </p:timing>
+</p:sld>
+</file>
+
+<file path=ppt/slides/slide26.xml><?xml version="1.0" encoding="utf-8"?>
+<p:sld xmlns:a="http://schemas.openxmlformats.org/drawingml/2006/main" xmlns:r="http://schemas.openxmlformats.org/officeDocument/2006/relationships" xmlns:p="http://schemas.openxmlformats.org/presentationml/2006/main">
+  <p:cSld>
+    <p:spTree>
+      <p:nvGrpSpPr>
+        <p:cNvPr id="1" name=""/>
+        <p:cNvGrpSpPr/>
+        <p:nvPr/>
+      </p:nvGrpSpPr>
+      <p:grpSpPr>
+        <a:xfrm>
+          <a:off x="0" y="0"/>
+          <a:ext cx="0" cy="0"/>
+          <a:chOff x="0" y="0"/>
+          <a:chExt cx="0" cy="0"/>
+        </a:xfrm>
+      </p:grpSpPr>
+      <p:sp>
+        <p:nvSpPr>
+          <p:cNvPr id="2" name="Правоъгълник 1"/>
+          <p:cNvSpPr/>
+          <p:nvPr/>
+        </p:nvSpPr>
+        <p:spPr>
+          <a:xfrm>
+            <a:off x="2377033" y="2564904"/>
+            <a:ext cx="5867375" cy="1938992"/>
+          </a:xfrm>
+          <a:prstGeom prst="rect">
+            <a:avLst/>
+          </a:prstGeom>
+          <a:noFill/>
+        </p:spPr>
+        <p:txBody>
+          <a:bodyPr wrap="none" lIns="91440" tIns="45720" rIns="91440" bIns="45720">
+            <a:spAutoFit/>
+          </a:bodyPr>
+          <a:lstStyle/>
+          <a:p>
+            <a:pPr algn="ctr"/>
+            <a:r>
+              <a:rPr lang="bg-BG" sz="6000" b="1" dirty="0" smtClean="0">
+                <a:ln w="900" cmpd="sng">
+                  <a:solidFill>
+                    <a:schemeClr val="accent1">
+                      <a:satMod val="190000"/>
+                      <a:alpha val="55000"/>
+                    </a:schemeClr>
+                  </a:solidFill>
+                  <a:prstDash val="solid"/>
+                </a:ln>
+                <a:solidFill>
+                  <a:schemeClr val="accent1">
+                    <a:satMod val="200000"/>
+                    <a:tint val="3000"/>
+                  </a:schemeClr>
+                </a:solidFill>
+                <a:effectLst>
+                  <a:innerShdw blurRad="101600" dist="76200" dir="5400000">
+                    <a:schemeClr val="accent1">
+                      <a:satMod val="190000"/>
+                      <a:tint val="100000"/>
+                      <a:alpha val="74000"/>
+                    </a:schemeClr>
+                  </a:innerShdw>
+                </a:effectLst>
+              </a:rPr>
+              <a:t>Благодарим за</a:t>
+            </a:r>
+          </a:p>
+          <a:p>
+            <a:pPr algn="ctr"/>
+            <a:r>
+              <a:rPr lang="bg-BG" sz="6000" b="1" dirty="0" smtClean="0">
+                <a:ln w="900" cmpd="sng">
+                  <a:solidFill>
+                    <a:schemeClr val="accent1">
+                      <a:satMod val="190000"/>
+                      <a:alpha val="55000"/>
+                    </a:schemeClr>
+                  </a:solidFill>
+                  <a:prstDash val="solid"/>
+                </a:ln>
+                <a:solidFill>
+                  <a:schemeClr val="accent1">
+                    <a:satMod val="200000"/>
+                    <a:tint val="3000"/>
+                  </a:schemeClr>
+                </a:solidFill>
+                <a:effectLst>
+                  <a:innerShdw blurRad="101600" dist="76200" dir="5400000">
+                    <a:schemeClr val="accent1">
+                      <a:satMod val="190000"/>
+                      <a:tint val="100000"/>
+                      <a:alpha val="74000"/>
+                    </a:schemeClr>
+                  </a:innerShdw>
+                </a:effectLst>
+              </a:rPr>
+              <a:t>вниманието </a:t>
+            </a:r>
+            <a:r>
+              <a:rPr lang="bg-BG" sz="6000" b="1" dirty="0" smtClean="0">
+                <a:ln w="900" cmpd="sng">
+                  <a:solidFill>
+                    <a:schemeClr val="accent1">
+                      <a:satMod val="190000"/>
+                      <a:alpha val="55000"/>
+                    </a:schemeClr>
+                  </a:solidFill>
+                  <a:prstDash val="solid"/>
+                </a:ln>
+                <a:solidFill>
+                  <a:schemeClr val="accent1">
+                    <a:satMod val="200000"/>
+                    <a:tint val="3000"/>
+                  </a:schemeClr>
+                </a:solidFill>
+                <a:effectLst>
+                  <a:innerShdw blurRad="101600" dist="76200" dir="5400000">
+                    <a:schemeClr val="accent1">
+                      <a:satMod val="190000"/>
+                      <a:tint val="100000"/>
+                      <a:alpha val="74000"/>
+                    </a:schemeClr>
+                  </a:innerShdw>
+                </a:effectLst>
+                <a:sym typeface="Wingdings"/>
+              </a:rPr>
+              <a:t></a:t>
+            </a:r>
+            <a:endParaRPr lang="bg-BG" sz="6000" b="1" dirty="0" smtClean="0">
+              <a:ln w="900" cmpd="sng">
+                <a:solidFill>
+                  <a:schemeClr val="accent1">
+                    <a:satMod val="190000"/>
+                    <a:alpha val="55000"/>
+                  </a:schemeClr>
+                </a:solidFill>
+                <a:prstDash val="solid"/>
+              </a:ln>
+              <a:solidFill>
+                <a:schemeClr val="accent1">
+                  <a:satMod val="200000"/>
+                  <a:tint val="3000"/>
+                </a:schemeClr>
+              </a:solidFill>
+              <a:effectLst>
+                <a:innerShdw blurRad="101600" dist="76200" dir="5400000">
+                  <a:schemeClr val="accent1">
+                    <a:satMod val="190000"/>
+                    <a:tint val="100000"/>
+                    <a:alpha val="74000"/>
+                  </a:schemeClr>
+                </a:innerShdw>
+              </a:effectLst>
+            </a:endParaRPr>
+          </a:p>
+        </p:txBody>
+      </p:sp>
+    </p:spTree>
+    <p:extLst>
+      <p:ext uri="{BB962C8B-B14F-4D97-AF65-F5344CB8AC3E}">
+        <p14:creationId xmlns:p14="http://schemas.microsoft.com/office/powerpoint/2010/main" val="1991681588"/>
       </p:ext>
     </p:extLst>
   </p:cSld>
@@ -4991,15 +9116,6 @@
               </a:rPr>
               <a:t>...</a:t>
             </a:r>
-            <a:endParaRPr lang="bg-BG" dirty="0" smtClean="0">
-              <a:ln w="18415" cmpd="sng">
-                <a:noFill/>
-                <a:prstDash val="solid"/>
-              </a:ln>
-              <a:solidFill>
-                <a:srgbClr val="FFFFFF"/>
-              </a:solidFill>
-            </a:endParaRPr>
           </a:p>
         </p:txBody>
       </p:sp>
@@ -5426,15 +9542,6 @@
               </a:rPr>
               <a:t>…</a:t>
             </a:r>
-            <a:endParaRPr lang="bg-BG" dirty="0" smtClean="0">
-              <a:ln w="18415" cmpd="sng">
-                <a:noFill/>
-                <a:prstDash val="solid"/>
-              </a:ln>
-              <a:solidFill>
-                <a:srgbClr val="FFFFFF"/>
-              </a:solidFill>
-            </a:endParaRPr>
           </a:p>
         </p:txBody>
       </p:sp>
@@ -5948,15 +10055,7 @@
                   <a:schemeClr val="bg1"/>
                 </a:solidFill>
               </a:rPr>
-              <a:t>Какво </a:t>
-            </a:r>
-            <a:r>
-              <a:rPr lang="bg-BG" altLang="bg-BG" dirty="0" smtClean="0">
-                <a:solidFill>
-                  <a:schemeClr val="bg1"/>
-                </a:solidFill>
-              </a:rPr>
-              <a:t>е поток</a:t>
+              <a:t>Какво е поток</a:t>
             </a:r>
             <a:endParaRPr lang="en-US" dirty="0">
               <a:ln w="18415" cmpd="sng">
@@ -6065,15 +10164,6 @@
               </a:rPr>
               <a:t>Потоците са абстракция на комуникационен канал за данни</a:t>
             </a:r>
-            <a:endParaRPr lang="bg-BG" dirty="0" smtClean="0">
-              <a:ln w="18415" cmpd="sng">
-                <a:noFill/>
-                <a:prstDash val="solid"/>
-              </a:ln>
-              <a:solidFill>
-                <a:srgbClr val="FFFFFF"/>
-              </a:solidFill>
-            </a:endParaRPr>
           </a:p>
         </p:txBody>
       </p:sp>
@@ -6310,15 +10400,6 @@
               </a:rPr>
               <a:t> след края на работа</a:t>
             </a:r>
-            <a:endParaRPr lang="bg-BG" dirty="0" smtClean="0">
-              <a:ln w="18415" cmpd="sng">
-                <a:noFill/>
-                <a:prstDash val="solid"/>
-              </a:ln>
-              <a:solidFill>
-                <a:srgbClr val="FFFFFF"/>
-              </a:solidFill>
-            </a:endParaRPr>
           </a:p>
         </p:txBody>
       </p:sp>

</xml_diff>

<commit_message>
presentation lecture 5 ready
</commit_message>
<xml_diff>
--- a/Lecture5/Lecture5.pptx
+++ b/Lecture5/Lecture5.pptx
@@ -29,8 +29,13 @@
     <p:sldId id="332" r:id="rId23"/>
     <p:sldId id="333" r:id="rId24"/>
     <p:sldId id="334" r:id="rId25"/>
-    <p:sldId id="291" r:id="rId26"/>
-    <p:sldId id="292" r:id="rId27"/>
+    <p:sldId id="335" r:id="rId26"/>
+    <p:sldId id="336" r:id="rId27"/>
+    <p:sldId id="337" r:id="rId28"/>
+    <p:sldId id="338" r:id="rId29"/>
+    <p:sldId id="339" r:id="rId30"/>
+    <p:sldId id="291" r:id="rId31"/>
+    <p:sldId id="292" r:id="rId32"/>
   </p:sldIdLst>
   <p:sldSz cx="9144000" cy="6858000" type="screen4x3"/>
   <p:notesSz cx="6858000" cy="9144000"/>
@@ -8368,7 +8373,7 @@
           <a:lstStyle/>
           <a:p>
             <a:r>
-              <a:rPr lang="bg-BG" altLang="bg-BG" sz="5400" b="1" smtClean="0">
+              <a:rPr lang="bg-BG" altLang="bg-BG" sz="5400" b="1" dirty="0" smtClean="0">
                 <a:solidFill>
                   <a:schemeClr val="bg1"/>
                 </a:solidFill>
@@ -8631,9 +8636,9 @@
       </p:grpSpPr>
       <p:sp>
         <p:nvSpPr>
-          <p:cNvPr id="106498" name="Rectangle 2"/>
+          <p:cNvPr id="2" name="Title 1"/>
           <p:cNvSpPr>
-            <a:spLocks noGrp="1" noChangeArrowheads="1"/>
+            <a:spLocks noGrp="1"/>
           </p:cNvSpPr>
           <p:nvPr>
             <p:ph type="title"/>
@@ -8641,8 +8646,8 @@
         </p:nvSpPr>
         <p:spPr>
           <a:xfrm>
-            <a:off x="395288" y="188913"/>
-            <a:ext cx="8229600" cy="981075"/>
+            <a:off x="457200" y="274638"/>
+            <a:ext cx="8229600" cy="1498178"/>
           </a:xfrm>
         </p:spPr>
         <p:txBody>
@@ -8650,98 +8655,98 @@
           <a:lstStyle/>
           <a:p>
             <a:r>
-              <a:rPr lang="bg-BG" altLang="bg-BG" dirty="0" smtClean="0">
+              <a:rPr lang="bg-BG" dirty="0" smtClean="0">
                 <a:solidFill>
                   <a:schemeClr val="bg1"/>
                 </a:solidFill>
               </a:rPr>
-              <a:t>Въпроси?</a:t>
-            </a:r>
-            <a:endParaRPr lang="bg-BG" altLang="bg-BG" dirty="0">
-              <a:solidFill>
-                <a:schemeClr val="bg1"/>
-              </a:solidFill>
-            </a:endParaRPr>
-          </a:p>
-        </p:txBody>
-      </p:sp>
-      <p:sp>
-        <p:nvSpPr>
-          <p:cNvPr id="2" name="Правоъгълник 1"/>
-          <p:cNvSpPr/>
-          <p:nvPr/>
-        </p:nvSpPr>
-        <p:spPr>
-          <a:xfrm>
-            <a:off x="3558639" y="1700808"/>
-            <a:ext cx="2432077" cy="4508927"/>
-          </a:xfrm>
-          <a:prstGeom prst="rect">
-            <a:avLst/>
-          </a:prstGeom>
-          <a:noFill/>
-        </p:spPr>
-        <p:txBody>
-          <a:bodyPr wrap="none" lIns="91440" tIns="45720" rIns="91440" bIns="45720">
-            <a:spAutoFit/>
-          </a:bodyPr>
-          <a:lstStyle/>
-          <a:p>
-            <a:pPr algn="ctr"/>
-            <a:r>
-              <a:rPr lang="bg-BG" sz="28700" b="1" cap="none" spc="0" dirty="0" smtClean="0">
-                <a:ln w="900" cmpd="sng">
-                  <a:solidFill>
-                    <a:schemeClr val="accent1">
-                      <a:satMod val="190000"/>
-                      <a:alpha val="55000"/>
-                    </a:schemeClr>
-                  </a:solidFill>
-                  <a:prstDash val="solid"/>
-                </a:ln>
-                <a:solidFill>
-                  <a:schemeClr val="accent1">
-                    <a:satMod val="200000"/>
-                    <a:tint val="3000"/>
-                  </a:schemeClr>
-                </a:solidFill>
-                <a:effectLst>
-                  <a:innerShdw blurRad="101600" dist="76200" dir="5400000">
-                    <a:schemeClr val="accent1">
-                      <a:satMod val="190000"/>
-                      <a:tint val="100000"/>
-                      <a:alpha val="74000"/>
-                    </a:schemeClr>
-                  </a:innerShdw>
-                </a:effectLst>
-              </a:rPr>
-              <a:t>?</a:t>
-            </a:r>
-            <a:endParaRPr lang="bg-BG" sz="6000" b="1" cap="none" spc="0" dirty="0">
-              <a:ln w="900" cmpd="sng">
-                <a:solidFill>
-                  <a:schemeClr val="accent1">
-                    <a:satMod val="190000"/>
-                    <a:alpha val="55000"/>
-                  </a:schemeClr>
+              <a:t>Какво е рекурсия?</a:t>
+            </a:r>
+            <a:endParaRPr lang="en-US" dirty="0">
+              <a:ln w="18415" cmpd="sng">
+                <a:solidFill>
+                  <a:srgbClr val="FFFFFF"/>
                 </a:solidFill>
                 <a:prstDash val="solid"/>
               </a:ln>
               <a:solidFill>
-                <a:schemeClr val="accent1">
-                  <a:satMod val="200000"/>
-                  <a:tint val="3000"/>
-                </a:schemeClr>
+                <a:srgbClr val="FFFFFF"/>
               </a:solidFill>
-              <a:effectLst>
-                <a:innerShdw blurRad="101600" dist="76200" dir="5400000">
-                  <a:schemeClr val="accent1">
-                    <a:satMod val="190000"/>
-                    <a:tint val="100000"/>
-                    <a:alpha val="74000"/>
-                  </a:schemeClr>
-                </a:innerShdw>
-              </a:effectLst>
+            </a:endParaRPr>
+          </a:p>
+        </p:txBody>
+      </p:sp>
+      <p:sp>
+        <p:nvSpPr>
+          <p:cNvPr id="3" name="Content Placeholder 2"/>
+          <p:cNvSpPr>
+            <a:spLocks noGrp="1"/>
+          </p:cNvSpPr>
+          <p:nvPr>
+            <p:ph idx="1"/>
+          </p:nvPr>
+        </p:nvSpPr>
+        <p:spPr>
+          <a:xfrm>
+            <a:off x="971600" y="1988840"/>
+            <a:ext cx="7992888" cy="4680520"/>
+          </a:xfrm>
+        </p:spPr>
+        <p:txBody>
+          <a:bodyPr/>
+          <a:lstStyle/>
+          <a:p>
+            <a:pPr marL="1444625"/>
+            <a:r>
+              <a:rPr lang="bg-BG" dirty="0" smtClean="0">
+                <a:ln w="18415" cmpd="sng">
+                  <a:noFill/>
+                  <a:prstDash val="solid"/>
+                </a:ln>
+                <a:solidFill>
+                  <a:srgbClr val="FFFFFF"/>
+                </a:solidFill>
+              </a:rPr>
+              <a:t>Рекурсията се дефинира чрез рекурсия</a:t>
+            </a:r>
+          </a:p>
+          <a:p>
+            <a:pPr marL="1444625"/>
+            <a:r>
+              <a:rPr lang="bg-BG" dirty="0" smtClean="0">
+                <a:ln w="18415" cmpd="sng">
+                  <a:noFill/>
+                  <a:prstDash val="solid"/>
+                </a:ln>
+                <a:solidFill>
+                  <a:srgbClr val="FFFFFF"/>
+                </a:solidFill>
+              </a:rPr>
+              <a:t>Рекурсията е програмна техника, при която даден метод (в тялото си) извива сам себе си</a:t>
+            </a:r>
+          </a:p>
+          <a:p>
+            <a:pPr marL="1444625"/>
+            <a:r>
+              <a:rPr lang="bg-BG" dirty="0" smtClean="0">
+                <a:ln w="18415" cmpd="sng">
+                  <a:noFill/>
+                  <a:prstDash val="solid"/>
+                </a:ln>
+                <a:solidFill>
+                  <a:srgbClr val="FFFFFF"/>
+                </a:solidFill>
+              </a:rPr>
+              <a:t>Рекурсията е мощен похват, но трябва да се използва внимателно</a:t>
+            </a:r>
+            <a:endParaRPr lang="bg-BG" dirty="0" smtClean="0">
+              <a:ln w="18415" cmpd="sng">
+                <a:noFill/>
+                <a:prstDash val="solid"/>
+              </a:ln>
+              <a:solidFill>
+                <a:srgbClr val="FFFFFF"/>
+              </a:solidFill>
             </a:endParaRPr>
           </a:p>
         </p:txBody>
@@ -8749,7 +8754,7 @@
     </p:spTree>
     <p:extLst>
       <p:ext uri="{BB962C8B-B14F-4D97-AF65-F5344CB8AC3E}">
-        <p14:creationId xmlns:p14="http://schemas.microsoft.com/office/powerpoint/2010/main" val="1054652420"/>
+        <p14:creationId xmlns:p14="http://schemas.microsoft.com/office/powerpoint/2010/main" val="789514931"/>
       </p:ext>
     </p:extLst>
   </p:cSld>
@@ -8785,14 +8790,268 @@
       </p:grpSpPr>
       <p:sp>
         <p:nvSpPr>
+          <p:cNvPr id="2" name="Title 1"/>
+          <p:cNvSpPr>
+            <a:spLocks noGrp="1"/>
+          </p:cNvSpPr>
+          <p:nvPr>
+            <p:ph type="title"/>
+          </p:nvPr>
+        </p:nvSpPr>
+        <p:spPr/>
+        <p:txBody>
+          <a:bodyPr/>
+          <a:lstStyle/>
+          <a:p>
+            <a:r>
+              <a:rPr lang="bg-BG" altLang="bg-BG" dirty="0" smtClean="0">
+                <a:solidFill>
+                  <a:schemeClr val="bg1"/>
+                </a:solidFill>
+              </a:rPr>
+              <a:t>Рекурсия</a:t>
+            </a:r>
+            <a:endParaRPr lang="en-US" dirty="0">
+              <a:ln w="18415" cmpd="sng">
+                <a:solidFill>
+                  <a:srgbClr val="FFFFFF"/>
+                </a:solidFill>
+                <a:prstDash val="solid"/>
+              </a:ln>
+              <a:solidFill>
+                <a:srgbClr val="FFFFFF"/>
+              </a:solidFill>
+            </a:endParaRPr>
+          </a:p>
+        </p:txBody>
+      </p:sp>
+      <p:sp>
+        <p:nvSpPr>
+          <p:cNvPr id="3" name="Content Placeholder 2"/>
+          <p:cNvSpPr>
+            <a:spLocks noGrp="1"/>
+          </p:cNvSpPr>
+          <p:nvPr>
+            <p:ph idx="1"/>
+          </p:nvPr>
+        </p:nvSpPr>
+        <p:spPr>
+          <a:xfrm>
+            <a:off x="971600" y="1340768"/>
+            <a:ext cx="7920880" cy="5184576"/>
+          </a:xfrm>
+        </p:spPr>
+        <p:txBody>
+          <a:bodyPr/>
+          <a:lstStyle/>
+          <a:p>
+            <a:pPr marL="1069975"/>
+            <a:r>
+              <a:rPr lang="bg-BG" dirty="0" smtClean="0">
+                <a:ln w="18415" cmpd="sng">
+                  <a:noFill/>
+                  <a:prstDash val="solid"/>
+                </a:ln>
+                <a:solidFill>
+                  <a:srgbClr val="FFFFFF"/>
+                </a:solidFill>
+              </a:rPr>
+              <a:t>Видове рекурсия:</a:t>
+            </a:r>
+          </a:p>
+          <a:p>
+            <a:pPr marL="1619250" lvl="1" indent="-342900">
+              <a:buFont typeface="Arial" panose="020B0604020202020204" pitchFamily="34" charset="0"/>
+              <a:buChar char="•"/>
+            </a:pPr>
+            <a:r>
+              <a:rPr lang="bg-BG" i="1" dirty="0" smtClean="0">
+                <a:ln w="18415" cmpd="sng">
+                  <a:noFill/>
+                  <a:prstDash val="solid"/>
+                </a:ln>
+                <a:solidFill>
+                  <a:srgbClr val="FFFFFF"/>
+                </a:solidFill>
+              </a:rPr>
+              <a:t>пряка</a:t>
+            </a:r>
+            <a:r>
+              <a:rPr lang="bg-BG" dirty="0" smtClean="0">
+                <a:ln w="18415" cmpd="sng">
+                  <a:noFill/>
+                  <a:prstDash val="solid"/>
+                </a:ln>
+                <a:solidFill>
+                  <a:srgbClr val="FFFFFF"/>
+                </a:solidFill>
+              </a:rPr>
+              <a:t> – когато методът се обръща към себе си</a:t>
+            </a:r>
+          </a:p>
+          <a:p>
+            <a:pPr marL="1619250" lvl="1" indent="-342900">
+              <a:buFont typeface="Arial" panose="020B0604020202020204" pitchFamily="34" charset="0"/>
+              <a:buChar char="•"/>
+            </a:pPr>
+            <a:r>
+              <a:rPr lang="bg-BG" i="1" dirty="0" smtClean="0">
+                <a:ln w="18415" cmpd="sng">
+                  <a:noFill/>
+                  <a:prstDash val="solid"/>
+                </a:ln>
+                <a:solidFill>
+                  <a:srgbClr val="FFFFFF"/>
+                </a:solidFill>
+              </a:rPr>
+              <a:t>непряка</a:t>
+            </a:r>
+            <a:r>
+              <a:rPr lang="bg-BG" dirty="0" smtClean="0">
+                <a:ln w="18415" cmpd="sng">
+                  <a:noFill/>
+                  <a:prstDash val="solid"/>
+                </a:ln>
+                <a:solidFill>
+                  <a:srgbClr val="FFFFFF"/>
+                </a:solidFill>
+              </a:rPr>
+              <a:t> </a:t>
+            </a:r>
+            <a:r>
+              <a:rPr lang="bg-BG" i="1" dirty="0" smtClean="0">
+                <a:ln w="18415" cmpd="sng">
+                  <a:noFill/>
+                  <a:prstDash val="solid"/>
+                </a:ln>
+                <a:solidFill>
+                  <a:srgbClr val="FFFFFF"/>
+                </a:solidFill>
+              </a:rPr>
+              <a:t>(косвена)</a:t>
+            </a:r>
+            <a:r>
+              <a:rPr lang="bg-BG" dirty="0" smtClean="0">
+                <a:ln w="18415" cmpd="sng">
+                  <a:noFill/>
+                  <a:prstDash val="solid"/>
+                </a:ln>
+                <a:solidFill>
+                  <a:srgbClr val="FFFFFF"/>
+                </a:solidFill>
+              </a:rPr>
+              <a:t> – когато методът се обръща към други методи, а те от своя страна се обръщат към него </a:t>
+            </a:r>
+          </a:p>
+          <a:p>
+            <a:pPr marL="1069975"/>
+            <a:r>
+              <a:rPr lang="bg-BG" dirty="0" smtClean="0">
+                <a:ln w="18415" cmpd="sng">
+                  <a:noFill/>
+                  <a:prstDash val="solid"/>
+                </a:ln>
+                <a:solidFill>
+                  <a:srgbClr val="FFFFFF"/>
+                </a:solidFill>
+              </a:rPr>
+              <a:t>Дъно на рекурсията – достига се, когато след краен брой рекурсивни извиквания, методът не се извика вече</a:t>
+            </a:r>
+            <a:endParaRPr lang="bg-BG" dirty="0" smtClean="0">
+              <a:ln w="18415" cmpd="sng">
+                <a:noFill/>
+                <a:prstDash val="solid"/>
+              </a:ln>
+              <a:solidFill>
+                <a:srgbClr val="FFFFFF"/>
+              </a:solidFill>
+            </a:endParaRPr>
+          </a:p>
+        </p:txBody>
+      </p:sp>
+    </p:spTree>
+    <p:extLst>
+      <p:ext uri="{BB962C8B-B14F-4D97-AF65-F5344CB8AC3E}">
+        <p14:creationId xmlns:p14="http://schemas.microsoft.com/office/powerpoint/2010/main" val="1359589969"/>
+      </p:ext>
+    </p:extLst>
+  </p:cSld>
+  <p:clrMapOvr>
+    <a:masterClrMapping/>
+  </p:clrMapOvr>
+  <p:timing>
+    <p:tnLst>
+      <p:par>
+        <p:cTn id="1" dur="indefinite" restart="never" nodeType="tmRoot"/>
+      </p:par>
+    </p:tnLst>
+  </p:timing>
+</p:sld>
+</file>
+
+<file path=ppt/slides/slide27.xml><?xml version="1.0" encoding="utf-8"?>
+<p:sld xmlns:a="http://schemas.openxmlformats.org/drawingml/2006/main" xmlns:r="http://schemas.openxmlformats.org/officeDocument/2006/relationships" xmlns:p="http://schemas.openxmlformats.org/presentationml/2006/main">
+  <p:cSld>
+    <p:spTree>
+      <p:nvGrpSpPr>
+        <p:cNvPr id="1" name=""/>
+        <p:cNvGrpSpPr/>
+        <p:nvPr/>
+      </p:nvGrpSpPr>
+      <p:grpSpPr>
+        <a:xfrm>
+          <a:off x="0" y="0"/>
+          <a:ext cx="0" cy="0"/>
+          <a:chOff x="0" y="0"/>
+          <a:chExt cx="0" cy="0"/>
+        </a:xfrm>
+      </p:grpSpPr>
+      <p:sp>
+        <p:nvSpPr>
+          <p:cNvPr id="106498" name="Rectangle 2"/>
+          <p:cNvSpPr>
+            <a:spLocks noGrp="1" noChangeArrowheads="1"/>
+          </p:cNvSpPr>
+          <p:nvPr>
+            <p:ph type="title"/>
+          </p:nvPr>
+        </p:nvSpPr>
+        <p:spPr>
+          <a:xfrm>
+            <a:off x="395288" y="188913"/>
+            <a:ext cx="8229600" cy="1511895"/>
+          </a:xfrm>
+        </p:spPr>
+        <p:txBody>
+          <a:bodyPr/>
+          <a:lstStyle/>
+          <a:p>
+            <a:r>
+              <a:rPr lang="bg-BG" altLang="bg-BG" dirty="0" smtClean="0">
+                <a:solidFill>
+                  <a:schemeClr val="bg1"/>
+                </a:solidFill>
+              </a:rPr>
+              <a:t>Рекурсия - примери</a:t>
+            </a:r>
+            <a:endParaRPr lang="bg-BG" altLang="bg-BG" dirty="0">
+              <a:solidFill>
+                <a:schemeClr val="bg1"/>
+              </a:solidFill>
+            </a:endParaRPr>
+          </a:p>
+        </p:txBody>
+      </p:sp>
+      <p:sp>
+        <p:nvSpPr>
           <p:cNvPr id="2" name="Правоъгълник 1"/>
           <p:cNvSpPr/>
           <p:nvPr/>
         </p:nvSpPr>
         <p:spPr>
           <a:xfrm>
-            <a:off x="2377033" y="2564904"/>
-            <a:ext cx="5867375" cy="1938992"/>
+            <a:off x="3680304" y="3140968"/>
+            <a:ext cx="2188741" cy="1015663"/>
           </a:xfrm>
           <a:prstGeom prst="rect">
             <a:avLst/>
@@ -8807,7 +9066,7 @@
           <a:p>
             <a:pPr algn="ctr"/>
             <a:r>
-              <a:rPr lang="bg-BG" sz="6000" b="1" dirty="0" smtClean="0">
+              <a:rPr lang="bg-BG" sz="6000" b="1" cap="none" spc="0" dirty="0" err="1" smtClean="0">
                 <a:ln w="900" cmpd="sng">
                   <a:solidFill>
                     <a:schemeClr val="accent1">
@@ -8833,71 +9092,9 @@
                   </a:innerShdw>
                 </a:effectLst>
               </a:rPr>
-              <a:t>Благодарим за</a:t>
-            </a:r>
-          </a:p>
-          <a:p>
-            <a:pPr algn="ctr"/>
-            <a:r>
-              <a:rPr lang="bg-BG" sz="6000" b="1" dirty="0" smtClean="0">
-                <a:ln w="900" cmpd="sng">
-                  <a:solidFill>
-                    <a:schemeClr val="accent1">
-                      <a:satMod val="190000"/>
-                      <a:alpha val="55000"/>
-                    </a:schemeClr>
-                  </a:solidFill>
-                  <a:prstDash val="solid"/>
-                </a:ln>
-                <a:solidFill>
-                  <a:schemeClr val="accent1">
-                    <a:satMod val="200000"/>
-                    <a:tint val="3000"/>
-                  </a:schemeClr>
-                </a:solidFill>
-                <a:effectLst>
-                  <a:innerShdw blurRad="101600" dist="76200" dir="5400000">
-                    <a:schemeClr val="accent1">
-                      <a:satMod val="190000"/>
-                      <a:tint val="100000"/>
-                      <a:alpha val="74000"/>
-                    </a:schemeClr>
-                  </a:innerShdw>
-                </a:effectLst>
-              </a:rPr>
-              <a:t>вниманието </a:t>
-            </a:r>
-            <a:r>
-              <a:rPr lang="bg-BG" sz="6000" b="1" dirty="0" smtClean="0">
-                <a:ln w="900" cmpd="sng">
-                  <a:solidFill>
-                    <a:schemeClr val="accent1">
-                      <a:satMod val="190000"/>
-                      <a:alpha val="55000"/>
-                    </a:schemeClr>
-                  </a:solidFill>
-                  <a:prstDash val="solid"/>
-                </a:ln>
-                <a:solidFill>
-                  <a:schemeClr val="accent1">
-                    <a:satMod val="200000"/>
-                    <a:tint val="3000"/>
-                  </a:schemeClr>
-                </a:solidFill>
-                <a:effectLst>
-                  <a:innerShdw blurRad="101600" dist="76200" dir="5400000">
-                    <a:schemeClr val="accent1">
-                      <a:satMod val="190000"/>
-                      <a:tint val="100000"/>
-                      <a:alpha val="74000"/>
-                    </a:schemeClr>
-                  </a:innerShdw>
-                </a:effectLst>
-                <a:sym typeface="Wingdings"/>
-              </a:rPr>
-              <a:t></a:t>
-            </a:r>
-            <a:endParaRPr lang="bg-BG" sz="6000" b="1" dirty="0" smtClean="0">
+              <a:t>Демо</a:t>
+            </a:r>
+            <a:endParaRPr lang="bg-BG" sz="6000" b="1" cap="none" spc="0" dirty="0">
               <a:ln w="900" cmpd="sng">
                 <a:solidFill>
                   <a:schemeClr val="accent1">
@@ -8929,7 +9126,411 @@
     </p:spTree>
     <p:extLst>
       <p:ext uri="{BB962C8B-B14F-4D97-AF65-F5344CB8AC3E}">
-        <p14:creationId xmlns:p14="http://schemas.microsoft.com/office/powerpoint/2010/main" val="1991681588"/>
+        <p14:creationId xmlns:p14="http://schemas.microsoft.com/office/powerpoint/2010/main" val="1945697751"/>
+      </p:ext>
+    </p:extLst>
+  </p:cSld>
+  <p:clrMapOvr>
+    <a:masterClrMapping/>
+  </p:clrMapOvr>
+  <p:timing>
+    <p:tnLst>
+      <p:par>
+        <p:cTn id="1" dur="indefinite" restart="never" nodeType="tmRoot"/>
+      </p:par>
+    </p:tnLst>
+  </p:timing>
+</p:sld>
+</file>
+
+<file path=ppt/slides/slide28.xml><?xml version="1.0" encoding="utf-8"?>
+<p:sld xmlns:a="http://schemas.openxmlformats.org/drawingml/2006/main" xmlns:r="http://schemas.openxmlformats.org/officeDocument/2006/relationships" xmlns:p="http://schemas.openxmlformats.org/presentationml/2006/main">
+  <p:cSld>
+    <p:spTree>
+      <p:nvGrpSpPr>
+        <p:cNvPr id="1" name=""/>
+        <p:cNvGrpSpPr/>
+        <p:nvPr/>
+      </p:nvGrpSpPr>
+      <p:grpSpPr>
+        <a:xfrm>
+          <a:off x="0" y="0"/>
+          <a:ext cx="0" cy="0"/>
+          <a:chOff x="0" y="0"/>
+          <a:chExt cx="0" cy="0"/>
+        </a:xfrm>
+      </p:grpSpPr>
+      <p:sp>
+        <p:nvSpPr>
+          <p:cNvPr id="2" name="Title 1"/>
+          <p:cNvSpPr>
+            <a:spLocks noGrp="1"/>
+          </p:cNvSpPr>
+          <p:nvPr>
+            <p:ph type="title"/>
+          </p:nvPr>
+        </p:nvSpPr>
+        <p:spPr>
+          <a:xfrm>
+            <a:off x="457200" y="274638"/>
+            <a:ext cx="8229600" cy="1498178"/>
+          </a:xfrm>
+        </p:spPr>
+        <p:txBody>
+          <a:bodyPr/>
+          <a:lstStyle/>
+          <a:p>
+            <a:r>
+              <a:rPr lang="bg-BG" dirty="0" smtClean="0">
+                <a:solidFill>
+                  <a:schemeClr val="bg1"/>
+                </a:solidFill>
+              </a:rPr>
+              <a:t>Кога да използваме рекурсия и кога – итерация?</a:t>
+            </a:r>
+            <a:endParaRPr lang="en-US" dirty="0">
+              <a:ln w="18415" cmpd="sng">
+                <a:solidFill>
+                  <a:srgbClr val="FFFFFF"/>
+                </a:solidFill>
+                <a:prstDash val="solid"/>
+              </a:ln>
+              <a:solidFill>
+                <a:srgbClr val="FFFFFF"/>
+              </a:solidFill>
+            </a:endParaRPr>
+          </a:p>
+        </p:txBody>
+      </p:sp>
+      <p:sp>
+        <p:nvSpPr>
+          <p:cNvPr id="3" name="Content Placeholder 2"/>
+          <p:cNvSpPr>
+            <a:spLocks noGrp="1"/>
+          </p:cNvSpPr>
+          <p:nvPr>
+            <p:ph idx="1"/>
+          </p:nvPr>
+        </p:nvSpPr>
+        <p:spPr>
+          <a:xfrm>
+            <a:off x="971600" y="1988840"/>
+            <a:ext cx="7992888" cy="4680520"/>
+          </a:xfrm>
+        </p:spPr>
+        <p:txBody>
+          <a:bodyPr/>
+          <a:lstStyle/>
+          <a:p>
+            <a:pPr marL="1069975"/>
+            <a:r>
+              <a:rPr lang="bg-BG" dirty="0" smtClean="0">
+                <a:ln w="18415" cmpd="sng">
+                  <a:noFill/>
+                  <a:prstDash val="solid"/>
+                </a:ln>
+                <a:solidFill>
+                  <a:srgbClr val="FFFFFF"/>
+                </a:solidFill>
+              </a:rPr>
+              <a:t>Когато имаме </a:t>
+            </a:r>
+            <a:r>
+              <a:rPr lang="bg-BG" i="1" dirty="0" smtClean="0">
+                <a:ln w="18415" cmpd="sng">
+                  <a:noFill/>
+                  <a:prstDash val="solid"/>
+                </a:ln>
+                <a:solidFill>
+                  <a:srgbClr val="FFFFFF"/>
+                </a:solidFill>
+              </a:rPr>
+              <a:t>линеен</a:t>
+            </a:r>
+            <a:r>
+              <a:rPr lang="bg-BG" dirty="0" smtClean="0">
+                <a:ln w="18415" cmpd="sng">
+                  <a:noFill/>
+                  <a:prstDash val="solid"/>
+                </a:ln>
+                <a:solidFill>
+                  <a:srgbClr val="FFFFFF"/>
+                </a:solidFill>
+              </a:rPr>
+              <a:t> изчислителен процес, </a:t>
+            </a:r>
+            <a:r>
+              <a:rPr lang="bg-BG" dirty="0" err="1" smtClean="0">
+                <a:ln w="18415" cmpd="sng">
+                  <a:noFill/>
+                  <a:prstDash val="solid"/>
+                </a:ln>
+                <a:solidFill>
+                  <a:srgbClr val="FFFFFF"/>
+                </a:solidFill>
+              </a:rPr>
+              <a:t>обекновено</a:t>
+            </a:r>
+            <a:r>
+              <a:rPr lang="bg-BG" dirty="0" smtClean="0">
+                <a:ln w="18415" cmpd="sng">
+                  <a:noFill/>
+                  <a:prstDash val="solid"/>
+                </a:ln>
+                <a:solidFill>
+                  <a:srgbClr val="FFFFFF"/>
+                </a:solidFill>
+              </a:rPr>
+              <a:t> итеративното решение е лесно забележимо</a:t>
+            </a:r>
+          </a:p>
+          <a:p>
+            <a:pPr marL="1069975"/>
+            <a:r>
+              <a:rPr lang="bg-BG" dirty="0" smtClean="0">
+                <a:ln w="18415" cmpd="sng">
+                  <a:noFill/>
+                  <a:prstDash val="solid"/>
+                </a:ln>
+                <a:solidFill>
+                  <a:srgbClr val="FFFFFF"/>
+                </a:solidFill>
+              </a:rPr>
+              <a:t>Когато се наблюдава </a:t>
+            </a:r>
+            <a:r>
+              <a:rPr lang="bg-BG" i="1" dirty="0" smtClean="0">
+                <a:ln w="18415" cmpd="sng">
+                  <a:noFill/>
+                  <a:prstDash val="solid"/>
+                </a:ln>
+                <a:solidFill>
+                  <a:srgbClr val="FFFFFF"/>
+                </a:solidFill>
+              </a:rPr>
+              <a:t>дървовиден</a:t>
+            </a:r>
+            <a:r>
+              <a:rPr lang="bg-BG" dirty="0" smtClean="0">
+                <a:ln w="18415" cmpd="sng">
+                  <a:noFill/>
+                  <a:prstDash val="solid"/>
+                </a:ln>
+                <a:solidFill>
+                  <a:srgbClr val="FFFFFF"/>
+                </a:solidFill>
+              </a:rPr>
+              <a:t> изчислителен процес, рекурсията предлага елегантни решения</a:t>
+            </a:r>
+          </a:p>
+          <a:p>
+            <a:pPr marL="1069975"/>
+            <a:r>
+              <a:rPr lang="bg-BG" dirty="0" smtClean="0">
+                <a:ln w="18415" cmpd="sng">
+                  <a:noFill/>
+                  <a:prstDash val="solid"/>
+                </a:ln>
+                <a:solidFill>
+                  <a:srgbClr val="FFFFFF"/>
+                </a:solidFill>
+              </a:rPr>
+              <a:t>Ако не сме сигурни какво прави рекурсията, </a:t>
+            </a:r>
+            <a:r>
+              <a:rPr lang="bg-BG" b="1" dirty="0" smtClean="0">
+                <a:ln w="18415" cmpd="sng">
+                  <a:noFill/>
+                  <a:prstDash val="solid"/>
+                </a:ln>
+                <a:solidFill>
+                  <a:srgbClr val="FFFFFF"/>
+                </a:solidFill>
+              </a:rPr>
+              <a:t>не</a:t>
+            </a:r>
+            <a:r>
+              <a:rPr lang="bg-BG" dirty="0" smtClean="0">
+                <a:ln w="18415" cmpd="sng">
+                  <a:noFill/>
+                  <a:prstDash val="solid"/>
+                </a:ln>
+                <a:solidFill>
+                  <a:srgbClr val="FFFFFF"/>
+                </a:solidFill>
+              </a:rPr>
+              <a:t> я използваме!</a:t>
+            </a:r>
+            <a:endParaRPr lang="bg-BG" dirty="0" smtClean="0">
+              <a:ln w="18415" cmpd="sng">
+                <a:noFill/>
+                <a:prstDash val="solid"/>
+              </a:ln>
+              <a:solidFill>
+                <a:srgbClr val="FFFFFF"/>
+              </a:solidFill>
+            </a:endParaRPr>
+          </a:p>
+        </p:txBody>
+      </p:sp>
+    </p:spTree>
+    <p:extLst>
+      <p:ext uri="{BB962C8B-B14F-4D97-AF65-F5344CB8AC3E}">
+        <p14:creationId xmlns:p14="http://schemas.microsoft.com/office/powerpoint/2010/main" val="3972989294"/>
+      </p:ext>
+    </p:extLst>
+  </p:cSld>
+  <p:clrMapOvr>
+    <a:masterClrMapping/>
+  </p:clrMapOvr>
+  <p:timing>
+    <p:tnLst>
+      <p:par>
+        <p:cTn id="1" dur="indefinite" restart="never" nodeType="tmRoot"/>
+      </p:par>
+    </p:tnLst>
+  </p:timing>
+</p:sld>
+</file>
+
+<file path=ppt/slides/slide29.xml><?xml version="1.0" encoding="utf-8"?>
+<p:sld xmlns:a="http://schemas.openxmlformats.org/drawingml/2006/main" xmlns:r="http://schemas.openxmlformats.org/officeDocument/2006/relationships" xmlns:p="http://schemas.openxmlformats.org/presentationml/2006/main">
+  <p:cSld>
+    <p:spTree>
+      <p:nvGrpSpPr>
+        <p:cNvPr id="1" name=""/>
+        <p:cNvGrpSpPr/>
+        <p:nvPr/>
+      </p:nvGrpSpPr>
+      <p:grpSpPr>
+        <a:xfrm>
+          <a:off x="0" y="0"/>
+          <a:ext cx="0" cy="0"/>
+          <a:chOff x="0" y="0"/>
+          <a:chExt cx="0" cy="0"/>
+        </a:xfrm>
+      </p:grpSpPr>
+      <p:sp>
+        <p:nvSpPr>
+          <p:cNvPr id="106498" name="Rectangle 2"/>
+          <p:cNvSpPr>
+            <a:spLocks noGrp="1" noChangeArrowheads="1"/>
+          </p:cNvSpPr>
+          <p:nvPr>
+            <p:ph type="title"/>
+          </p:nvPr>
+        </p:nvSpPr>
+        <p:spPr>
+          <a:xfrm>
+            <a:off x="395288" y="188913"/>
+            <a:ext cx="8229600" cy="1511895"/>
+          </a:xfrm>
+        </p:spPr>
+        <p:txBody>
+          <a:bodyPr/>
+          <a:lstStyle/>
+          <a:p>
+            <a:r>
+              <a:rPr lang="bg-BG" altLang="bg-BG" dirty="0" smtClean="0">
+                <a:solidFill>
+                  <a:schemeClr val="bg1"/>
+                </a:solidFill>
+              </a:rPr>
+              <a:t>Рекурсия / итерация</a:t>
+            </a:r>
+            <a:endParaRPr lang="bg-BG" altLang="bg-BG" dirty="0">
+              <a:solidFill>
+                <a:schemeClr val="bg1"/>
+              </a:solidFill>
+            </a:endParaRPr>
+          </a:p>
+        </p:txBody>
+      </p:sp>
+      <p:sp>
+        <p:nvSpPr>
+          <p:cNvPr id="2" name="Правоъгълник 1"/>
+          <p:cNvSpPr/>
+          <p:nvPr/>
+        </p:nvSpPr>
+        <p:spPr>
+          <a:xfrm>
+            <a:off x="3680304" y="3140968"/>
+            <a:ext cx="2188741" cy="1015663"/>
+          </a:xfrm>
+          <a:prstGeom prst="rect">
+            <a:avLst/>
+          </a:prstGeom>
+          <a:noFill/>
+        </p:spPr>
+        <p:txBody>
+          <a:bodyPr wrap="none" lIns="91440" tIns="45720" rIns="91440" bIns="45720">
+            <a:spAutoFit/>
+          </a:bodyPr>
+          <a:lstStyle/>
+          <a:p>
+            <a:pPr algn="ctr"/>
+            <a:r>
+              <a:rPr lang="bg-BG" sz="6000" b="1" cap="none" spc="0" dirty="0" err="1" smtClean="0">
+                <a:ln w="900" cmpd="sng">
+                  <a:solidFill>
+                    <a:schemeClr val="accent1">
+                      <a:satMod val="190000"/>
+                      <a:alpha val="55000"/>
+                    </a:schemeClr>
+                  </a:solidFill>
+                  <a:prstDash val="solid"/>
+                </a:ln>
+                <a:solidFill>
+                  <a:schemeClr val="accent1">
+                    <a:satMod val="200000"/>
+                    <a:tint val="3000"/>
+                  </a:schemeClr>
+                </a:solidFill>
+                <a:effectLst>
+                  <a:innerShdw blurRad="101600" dist="76200" dir="5400000">
+                    <a:schemeClr val="accent1">
+                      <a:satMod val="190000"/>
+                      <a:tint val="100000"/>
+                      <a:alpha val="74000"/>
+                    </a:schemeClr>
+                  </a:innerShdw>
+                </a:effectLst>
+              </a:rPr>
+              <a:t>Демо</a:t>
+            </a:r>
+            <a:endParaRPr lang="bg-BG" sz="6000" b="1" cap="none" spc="0" dirty="0">
+              <a:ln w="900" cmpd="sng">
+                <a:solidFill>
+                  <a:schemeClr val="accent1">
+                    <a:satMod val="190000"/>
+                    <a:alpha val="55000"/>
+                  </a:schemeClr>
+                </a:solidFill>
+                <a:prstDash val="solid"/>
+              </a:ln>
+              <a:solidFill>
+                <a:schemeClr val="accent1">
+                  <a:satMod val="200000"/>
+                  <a:tint val="3000"/>
+                </a:schemeClr>
+              </a:solidFill>
+              <a:effectLst>
+                <a:innerShdw blurRad="101600" dist="76200" dir="5400000">
+                  <a:schemeClr val="accent1">
+                    <a:satMod val="190000"/>
+                    <a:tint val="100000"/>
+                    <a:alpha val="74000"/>
+                  </a:schemeClr>
+                </a:innerShdw>
+              </a:effectLst>
+            </a:endParaRPr>
+          </a:p>
+        </p:txBody>
+      </p:sp>
+    </p:spTree>
+    <p:extLst>
+      <p:ext uri="{BB962C8B-B14F-4D97-AF65-F5344CB8AC3E}">
+        <p14:creationId xmlns:p14="http://schemas.microsoft.com/office/powerpoint/2010/main" val="1666896750"/>
       </p:ext>
     </p:extLst>
   </p:cSld>
@@ -9123,6 +9724,340 @@
     <p:extLst>
       <p:ext uri="{BB962C8B-B14F-4D97-AF65-F5344CB8AC3E}">
         <p14:creationId xmlns:p14="http://schemas.microsoft.com/office/powerpoint/2010/main" val="3284361445"/>
+      </p:ext>
+    </p:extLst>
+  </p:cSld>
+  <p:clrMapOvr>
+    <a:masterClrMapping/>
+  </p:clrMapOvr>
+  <p:timing>
+    <p:tnLst>
+      <p:par>
+        <p:cTn id="1" dur="indefinite" restart="never" nodeType="tmRoot"/>
+      </p:par>
+    </p:tnLst>
+  </p:timing>
+</p:sld>
+</file>
+
+<file path=ppt/slides/slide30.xml><?xml version="1.0" encoding="utf-8"?>
+<p:sld xmlns:a="http://schemas.openxmlformats.org/drawingml/2006/main" xmlns:r="http://schemas.openxmlformats.org/officeDocument/2006/relationships" xmlns:p="http://schemas.openxmlformats.org/presentationml/2006/main">
+  <p:cSld>
+    <p:spTree>
+      <p:nvGrpSpPr>
+        <p:cNvPr id="1" name=""/>
+        <p:cNvGrpSpPr/>
+        <p:nvPr/>
+      </p:nvGrpSpPr>
+      <p:grpSpPr>
+        <a:xfrm>
+          <a:off x="0" y="0"/>
+          <a:ext cx="0" cy="0"/>
+          <a:chOff x="0" y="0"/>
+          <a:chExt cx="0" cy="0"/>
+        </a:xfrm>
+      </p:grpSpPr>
+      <p:sp>
+        <p:nvSpPr>
+          <p:cNvPr id="106498" name="Rectangle 2"/>
+          <p:cNvSpPr>
+            <a:spLocks noGrp="1" noChangeArrowheads="1"/>
+          </p:cNvSpPr>
+          <p:nvPr>
+            <p:ph type="title"/>
+          </p:nvPr>
+        </p:nvSpPr>
+        <p:spPr>
+          <a:xfrm>
+            <a:off x="395288" y="188913"/>
+            <a:ext cx="8229600" cy="981075"/>
+          </a:xfrm>
+        </p:spPr>
+        <p:txBody>
+          <a:bodyPr/>
+          <a:lstStyle/>
+          <a:p>
+            <a:r>
+              <a:rPr lang="bg-BG" altLang="bg-BG" dirty="0" smtClean="0">
+                <a:solidFill>
+                  <a:schemeClr val="bg1"/>
+                </a:solidFill>
+              </a:rPr>
+              <a:t>Въпроси?</a:t>
+            </a:r>
+            <a:endParaRPr lang="bg-BG" altLang="bg-BG" dirty="0">
+              <a:solidFill>
+                <a:schemeClr val="bg1"/>
+              </a:solidFill>
+            </a:endParaRPr>
+          </a:p>
+        </p:txBody>
+      </p:sp>
+      <p:sp>
+        <p:nvSpPr>
+          <p:cNvPr id="2" name="Правоъгълник 1"/>
+          <p:cNvSpPr/>
+          <p:nvPr/>
+        </p:nvSpPr>
+        <p:spPr>
+          <a:xfrm>
+            <a:off x="3558639" y="1700808"/>
+            <a:ext cx="2432077" cy="4508927"/>
+          </a:xfrm>
+          <a:prstGeom prst="rect">
+            <a:avLst/>
+          </a:prstGeom>
+          <a:noFill/>
+        </p:spPr>
+        <p:txBody>
+          <a:bodyPr wrap="none" lIns="91440" tIns="45720" rIns="91440" bIns="45720">
+            <a:spAutoFit/>
+          </a:bodyPr>
+          <a:lstStyle/>
+          <a:p>
+            <a:pPr algn="ctr"/>
+            <a:r>
+              <a:rPr lang="bg-BG" sz="28700" b="1" cap="none" spc="0" dirty="0" smtClean="0">
+                <a:ln w="900" cmpd="sng">
+                  <a:solidFill>
+                    <a:schemeClr val="accent1">
+                      <a:satMod val="190000"/>
+                      <a:alpha val="55000"/>
+                    </a:schemeClr>
+                  </a:solidFill>
+                  <a:prstDash val="solid"/>
+                </a:ln>
+                <a:solidFill>
+                  <a:schemeClr val="accent1">
+                    <a:satMod val="200000"/>
+                    <a:tint val="3000"/>
+                  </a:schemeClr>
+                </a:solidFill>
+                <a:effectLst>
+                  <a:innerShdw blurRad="101600" dist="76200" dir="5400000">
+                    <a:schemeClr val="accent1">
+                      <a:satMod val="190000"/>
+                      <a:tint val="100000"/>
+                      <a:alpha val="74000"/>
+                    </a:schemeClr>
+                  </a:innerShdw>
+                </a:effectLst>
+              </a:rPr>
+              <a:t>?</a:t>
+            </a:r>
+            <a:endParaRPr lang="bg-BG" sz="6000" b="1" cap="none" spc="0" dirty="0">
+              <a:ln w="900" cmpd="sng">
+                <a:solidFill>
+                  <a:schemeClr val="accent1">
+                    <a:satMod val="190000"/>
+                    <a:alpha val="55000"/>
+                  </a:schemeClr>
+                </a:solidFill>
+                <a:prstDash val="solid"/>
+              </a:ln>
+              <a:solidFill>
+                <a:schemeClr val="accent1">
+                  <a:satMod val="200000"/>
+                  <a:tint val="3000"/>
+                </a:schemeClr>
+              </a:solidFill>
+              <a:effectLst>
+                <a:innerShdw blurRad="101600" dist="76200" dir="5400000">
+                  <a:schemeClr val="accent1">
+                    <a:satMod val="190000"/>
+                    <a:tint val="100000"/>
+                    <a:alpha val="74000"/>
+                  </a:schemeClr>
+                </a:innerShdw>
+              </a:effectLst>
+            </a:endParaRPr>
+          </a:p>
+        </p:txBody>
+      </p:sp>
+    </p:spTree>
+    <p:extLst>
+      <p:ext uri="{BB962C8B-B14F-4D97-AF65-F5344CB8AC3E}">
+        <p14:creationId xmlns:p14="http://schemas.microsoft.com/office/powerpoint/2010/main" val="1054652420"/>
+      </p:ext>
+    </p:extLst>
+  </p:cSld>
+  <p:clrMapOvr>
+    <a:masterClrMapping/>
+  </p:clrMapOvr>
+  <p:timing>
+    <p:tnLst>
+      <p:par>
+        <p:cTn id="1" dur="indefinite" restart="never" nodeType="tmRoot"/>
+      </p:par>
+    </p:tnLst>
+  </p:timing>
+</p:sld>
+</file>
+
+<file path=ppt/slides/slide31.xml><?xml version="1.0" encoding="utf-8"?>
+<p:sld xmlns:a="http://schemas.openxmlformats.org/drawingml/2006/main" xmlns:r="http://schemas.openxmlformats.org/officeDocument/2006/relationships" xmlns:p="http://schemas.openxmlformats.org/presentationml/2006/main">
+  <p:cSld>
+    <p:spTree>
+      <p:nvGrpSpPr>
+        <p:cNvPr id="1" name=""/>
+        <p:cNvGrpSpPr/>
+        <p:nvPr/>
+      </p:nvGrpSpPr>
+      <p:grpSpPr>
+        <a:xfrm>
+          <a:off x="0" y="0"/>
+          <a:ext cx="0" cy="0"/>
+          <a:chOff x="0" y="0"/>
+          <a:chExt cx="0" cy="0"/>
+        </a:xfrm>
+      </p:grpSpPr>
+      <p:sp>
+        <p:nvSpPr>
+          <p:cNvPr id="2" name="Правоъгълник 1"/>
+          <p:cNvSpPr/>
+          <p:nvPr/>
+        </p:nvSpPr>
+        <p:spPr>
+          <a:xfrm>
+            <a:off x="2377033" y="2564904"/>
+            <a:ext cx="5867375" cy="1938992"/>
+          </a:xfrm>
+          <a:prstGeom prst="rect">
+            <a:avLst/>
+          </a:prstGeom>
+          <a:noFill/>
+        </p:spPr>
+        <p:txBody>
+          <a:bodyPr wrap="none" lIns="91440" tIns="45720" rIns="91440" bIns="45720">
+            <a:spAutoFit/>
+          </a:bodyPr>
+          <a:lstStyle/>
+          <a:p>
+            <a:pPr algn="ctr"/>
+            <a:r>
+              <a:rPr lang="bg-BG" sz="6000" b="1" dirty="0" smtClean="0">
+                <a:ln w="900" cmpd="sng">
+                  <a:solidFill>
+                    <a:schemeClr val="accent1">
+                      <a:satMod val="190000"/>
+                      <a:alpha val="55000"/>
+                    </a:schemeClr>
+                  </a:solidFill>
+                  <a:prstDash val="solid"/>
+                </a:ln>
+                <a:solidFill>
+                  <a:schemeClr val="accent1">
+                    <a:satMod val="200000"/>
+                    <a:tint val="3000"/>
+                  </a:schemeClr>
+                </a:solidFill>
+                <a:effectLst>
+                  <a:innerShdw blurRad="101600" dist="76200" dir="5400000">
+                    <a:schemeClr val="accent1">
+                      <a:satMod val="190000"/>
+                      <a:tint val="100000"/>
+                      <a:alpha val="74000"/>
+                    </a:schemeClr>
+                  </a:innerShdw>
+                </a:effectLst>
+              </a:rPr>
+              <a:t>Благодарим за</a:t>
+            </a:r>
+          </a:p>
+          <a:p>
+            <a:pPr algn="ctr"/>
+            <a:r>
+              <a:rPr lang="bg-BG" sz="6000" b="1" dirty="0" smtClean="0">
+                <a:ln w="900" cmpd="sng">
+                  <a:solidFill>
+                    <a:schemeClr val="accent1">
+                      <a:satMod val="190000"/>
+                      <a:alpha val="55000"/>
+                    </a:schemeClr>
+                  </a:solidFill>
+                  <a:prstDash val="solid"/>
+                </a:ln>
+                <a:solidFill>
+                  <a:schemeClr val="accent1">
+                    <a:satMod val="200000"/>
+                    <a:tint val="3000"/>
+                  </a:schemeClr>
+                </a:solidFill>
+                <a:effectLst>
+                  <a:innerShdw blurRad="101600" dist="76200" dir="5400000">
+                    <a:schemeClr val="accent1">
+                      <a:satMod val="190000"/>
+                      <a:tint val="100000"/>
+                      <a:alpha val="74000"/>
+                    </a:schemeClr>
+                  </a:innerShdw>
+                </a:effectLst>
+              </a:rPr>
+              <a:t>вниманието </a:t>
+            </a:r>
+            <a:r>
+              <a:rPr lang="bg-BG" sz="6000" b="1" dirty="0" smtClean="0">
+                <a:ln w="900" cmpd="sng">
+                  <a:solidFill>
+                    <a:schemeClr val="accent1">
+                      <a:satMod val="190000"/>
+                      <a:alpha val="55000"/>
+                    </a:schemeClr>
+                  </a:solidFill>
+                  <a:prstDash val="solid"/>
+                </a:ln>
+                <a:solidFill>
+                  <a:schemeClr val="accent1">
+                    <a:satMod val="200000"/>
+                    <a:tint val="3000"/>
+                  </a:schemeClr>
+                </a:solidFill>
+                <a:effectLst>
+                  <a:innerShdw blurRad="101600" dist="76200" dir="5400000">
+                    <a:schemeClr val="accent1">
+                      <a:satMod val="190000"/>
+                      <a:tint val="100000"/>
+                      <a:alpha val="74000"/>
+                    </a:schemeClr>
+                  </a:innerShdw>
+                </a:effectLst>
+                <a:sym typeface="Wingdings"/>
+              </a:rPr>
+              <a:t></a:t>
+            </a:r>
+            <a:endParaRPr lang="bg-BG" sz="6000" b="1" dirty="0" smtClean="0">
+              <a:ln w="900" cmpd="sng">
+                <a:solidFill>
+                  <a:schemeClr val="accent1">
+                    <a:satMod val="190000"/>
+                    <a:alpha val="55000"/>
+                  </a:schemeClr>
+                </a:solidFill>
+                <a:prstDash val="solid"/>
+              </a:ln>
+              <a:solidFill>
+                <a:schemeClr val="accent1">
+                  <a:satMod val="200000"/>
+                  <a:tint val="3000"/>
+                </a:schemeClr>
+              </a:solidFill>
+              <a:effectLst>
+                <a:innerShdw blurRad="101600" dist="76200" dir="5400000">
+                  <a:schemeClr val="accent1">
+                    <a:satMod val="190000"/>
+                    <a:tint val="100000"/>
+                    <a:alpha val="74000"/>
+                  </a:schemeClr>
+                </a:innerShdw>
+              </a:effectLst>
+            </a:endParaRPr>
+          </a:p>
+        </p:txBody>
+      </p:sp>
+    </p:spTree>
+    <p:extLst>
+      <p:ext uri="{BB962C8B-B14F-4D97-AF65-F5344CB8AC3E}">
+        <p14:creationId xmlns:p14="http://schemas.microsoft.com/office/powerpoint/2010/main" val="1991681588"/>
       </p:ext>
     </p:extLst>
   </p:cSld>

</xml_diff>

<commit_message>
lecture 5 video link and demos uploaded
</commit_message>
<xml_diff>
--- a/Lecture5/Lecture5.pptx
+++ b/Lecture5/Lecture5.pptx
@@ -3944,8 +3944,8 @@
         </p:nvSpPr>
         <p:spPr>
           <a:xfrm>
-            <a:off x="3680304" y="2348880"/>
-            <a:ext cx="2188741" cy="2862322"/>
+            <a:off x="3680304" y="3205425"/>
+            <a:ext cx="2188741" cy="1015663"/>
           </a:xfrm>
           <a:prstGeom prst="rect">
             <a:avLst/>
@@ -3989,122 +3989,6 @@
               <a:t>Демо</a:t>
             </a:r>
             <a:endParaRPr lang="bg-BG" sz="6000" b="1" cap="none" spc="0" dirty="0" smtClean="0">
-              <a:ln w="900" cmpd="sng">
-                <a:solidFill>
-                  <a:schemeClr val="accent1">
-                    <a:satMod val="190000"/>
-                    <a:alpha val="55000"/>
-                  </a:schemeClr>
-                </a:solidFill>
-                <a:prstDash val="solid"/>
-              </a:ln>
-              <a:solidFill>
-                <a:schemeClr val="accent1">
-                  <a:satMod val="200000"/>
-                  <a:tint val="3000"/>
-                </a:schemeClr>
-              </a:solidFill>
-              <a:effectLst>
-                <a:innerShdw blurRad="101600" dist="76200" dir="5400000">
-                  <a:schemeClr val="accent1">
-                    <a:satMod val="190000"/>
-                    <a:tint val="100000"/>
-                    <a:alpha val="74000"/>
-                  </a:schemeClr>
-                </a:innerShdw>
-              </a:effectLst>
-            </a:endParaRPr>
-          </a:p>
-          <a:p>
-            <a:pPr algn="ctr"/>
-            <a:r>
-              <a:rPr lang="bg-BG" sz="6000" b="1" dirty="0" err="1" smtClean="0">
-                <a:ln w="900" cmpd="sng">
-                  <a:solidFill>
-                    <a:schemeClr val="accent1">
-                      <a:satMod val="190000"/>
-                      <a:alpha val="55000"/>
-                    </a:schemeClr>
-                  </a:solidFill>
-                  <a:prstDash val="solid"/>
-                </a:ln>
-                <a:solidFill>
-                  <a:schemeClr val="accent1">
-                    <a:satMod val="200000"/>
-                    <a:tint val="3000"/>
-                  </a:schemeClr>
-                </a:solidFill>
-                <a:effectLst>
-                  <a:innerShdw blurRad="101600" dist="76200" dir="5400000">
-                    <a:schemeClr val="accent1">
-                      <a:satMod val="190000"/>
-                      <a:tint val="100000"/>
-                      <a:alpha val="74000"/>
-                    </a:schemeClr>
-                  </a:innerShdw>
-                </a:effectLst>
-              </a:rPr>
-              <a:t>Демо</a:t>
-            </a:r>
-            <a:endParaRPr lang="bg-BG" sz="6000" b="1" dirty="0" smtClean="0">
-              <a:ln w="900" cmpd="sng">
-                <a:solidFill>
-                  <a:schemeClr val="accent1">
-                    <a:satMod val="190000"/>
-                    <a:alpha val="55000"/>
-                  </a:schemeClr>
-                </a:solidFill>
-                <a:prstDash val="solid"/>
-              </a:ln>
-              <a:solidFill>
-                <a:schemeClr val="accent1">
-                  <a:satMod val="200000"/>
-                  <a:tint val="3000"/>
-                </a:schemeClr>
-              </a:solidFill>
-              <a:effectLst>
-                <a:innerShdw blurRad="101600" dist="76200" dir="5400000">
-                  <a:schemeClr val="accent1">
-                    <a:satMod val="190000"/>
-                    <a:tint val="100000"/>
-                    <a:alpha val="74000"/>
-                  </a:schemeClr>
-                </a:innerShdw>
-              </a:effectLst>
-            </a:endParaRPr>
-          </a:p>
-          <a:p>
-            <a:pPr algn="ctr"/>
-            <a:r>
-              <a:rPr lang="bg-BG" sz="6000" b="1" cap="none" spc="0" dirty="0" err="1" smtClean="0">
-                <a:ln w="900" cmpd="sng">
-                  <a:solidFill>
-                    <a:schemeClr val="accent1">
-                      <a:satMod val="190000"/>
-                      <a:alpha val="55000"/>
-                    </a:schemeClr>
-                  </a:solidFill>
-                  <a:prstDash val="solid"/>
-                </a:ln>
-                <a:solidFill>
-                  <a:schemeClr val="accent1">
-                    <a:satMod val="200000"/>
-                    <a:tint val="3000"/>
-                  </a:schemeClr>
-                </a:solidFill>
-                <a:effectLst>
-                  <a:innerShdw blurRad="101600" dist="76200" dir="5400000">
-                    <a:schemeClr val="accent1">
-                      <a:satMod val="190000"/>
-                      <a:tint val="100000"/>
-                      <a:alpha val="74000"/>
-                    </a:schemeClr>
-                  </a:innerShdw>
-                </a:effectLst>
-              </a:rPr>
-              <a:t>Демо</a:t>
-            </a:r>
-            <a:endParaRPr lang="bg-BG" sz="6000" b="1" cap="none" spc="0" dirty="0">
               <a:ln w="900" cmpd="sng">
                 <a:solidFill>
                   <a:schemeClr val="accent1">
@@ -5070,39 +4954,15 @@
                   <a:srgbClr val="11A7C5"/>
                 </a:solidFill>
               </a:rPr>
-              <a:t>public|private|protected|</a:t>
-            </a:r>
-            <a:r>
-              <a:rPr lang="en-US" sz="3200" i="1" dirty="0" err="1" smtClean="0">
+              <a:t>public|private|protected|internal</a:t>
+            </a:r>
+            <a:r>
+              <a:rPr lang="en-US" sz="3200" i="1" dirty="0" smtClean="0">
                 <a:solidFill>
                   <a:srgbClr val="11A7C5"/>
                 </a:solidFill>
               </a:rPr>
-              <a:t>internal</a:t>
-            </a:r>
-            <a:r>
-              <a:rPr lang="en-US" sz="3200" i="1" dirty="0" smtClean="0">
-                <a:solidFill>
-                  <a:srgbClr val="11A7C5"/>
-                </a:solidFill>
-              </a:rPr>
-              <a:t>] </a:t>
-            </a:r>
-            <a:r>
-              <a:rPr lang="en-US" sz="3200" i="1" dirty="0" smtClean="0">
-                <a:solidFill>
-                  <a:srgbClr val="11A7C5"/>
-                </a:solidFill>
-              </a:rPr>
-              <a:t>[static] </a:t>
-            </a:r>
-            <a:r>
-              <a:rPr lang="en-US" sz="3200" i="1" dirty="0" smtClean="0">
-                <a:solidFill>
-                  <a:srgbClr val="11A7C5"/>
-                </a:solidFill>
-              </a:rPr>
-              <a:t>[…] &lt;</a:t>
+              <a:t>] [static] […] &lt;</a:t>
             </a:r>
             <a:r>
               <a:rPr lang="bg-BG" sz="3200" i="1" dirty="0" smtClean="0">
@@ -5824,15 +5684,6 @@
               </a:rPr>
               <a:t> – да става ясно за какво служи метода</a:t>
             </a:r>
-            <a:endParaRPr lang="bg-BG" b="1" dirty="0" smtClean="0">
-              <a:ln w="18415" cmpd="sng">
-                <a:noFill/>
-                <a:prstDash val="solid"/>
-              </a:ln>
-              <a:solidFill>
-                <a:srgbClr val="FFFFFF"/>
-              </a:solidFill>
-            </a:endParaRPr>
           </a:p>
         </p:txBody>
       </p:sp>
@@ -6118,15 +5969,7 @@
                   <a:srgbClr val="11A7C5"/>
                 </a:solidFill>
               </a:rPr>
-              <a:t> p1, </a:t>
-            </a:r>
-            <a:r>
-              <a:rPr lang="en-US" sz="3200" b="1" i="1" dirty="0" smtClean="0">
-                <a:solidFill>
-                  <a:srgbClr val="11A7C5"/>
-                </a:solidFill>
-              </a:rPr>
-              <a:t>double p2)</a:t>
+              <a:t> p1, double p2)</a:t>
             </a:r>
             <a:endParaRPr lang="bg-BG" sz="3200" b="1" i="1" dirty="0" smtClean="0">
               <a:solidFill>
@@ -6213,11 +6056,6 @@
               </a:rPr>
               <a:t>}</a:t>
             </a:r>
-            <a:endParaRPr lang="en-US" sz="3200" b="1" i="1" dirty="0">
-              <a:solidFill>
-                <a:srgbClr val="11A7C5"/>
-              </a:solidFill>
-            </a:endParaRPr>
           </a:p>
         </p:txBody>
       </p:sp>
@@ -7005,15 +6843,6 @@
               </a:rPr>
               <a:t>Тялото извършва операции (и връща стойност)</a:t>
             </a:r>
-            <a:endParaRPr lang="bg-BG" dirty="0" smtClean="0">
-              <a:ln w="18415" cmpd="sng">
-                <a:noFill/>
-                <a:prstDash val="solid"/>
-              </a:ln>
-              <a:solidFill>
-                <a:srgbClr val="FFFFFF"/>
-              </a:solidFill>
-            </a:endParaRPr>
           </a:p>
           <a:p>
             <a:pPr marL="1444625"/>
@@ -7068,15 +6897,6 @@
               </a:rPr>
               <a:t>При извикване на метода от друг код се изпълнява тялото му</a:t>
             </a:r>
-            <a:endParaRPr lang="bg-BG" dirty="0" smtClean="0">
-              <a:ln w="18415" cmpd="sng">
-                <a:noFill/>
-                <a:prstDash val="solid"/>
-              </a:ln>
-              <a:solidFill>
-                <a:srgbClr val="FFFFFF"/>
-              </a:solidFill>
-            </a:endParaRPr>
           </a:p>
         </p:txBody>
       </p:sp>
@@ -7231,15 +7051,6 @@
               </a:rPr>
               <a:t>, методът не връща нищо, иначе връща стойност от съответния посочен тип</a:t>
             </a:r>
-            <a:endParaRPr lang="bg-BG" dirty="0" smtClean="0">
-              <a:ln w="18415" cmpd="sng">
-                <a:noFill/>
-                <a:prstDash val="solid"/>
-              </a:ln>
-              <a:solidFill>
-                <a:srgbClr val="FFFFFF"/>
-              </a:solidFill>
-            </a:endParaRPr>
           </a:p>
         </p:txBody>
       </p:sp>
@@ -7943,15 +7754,6 @@
               </a:rPr>
               <a:t> метод бъде извикан, се решава кой от всичките варианти да се изпълнява</a:t>
             </a:r>
-            <a:endParaRPr lang="bg-BG" dirty="0" smtClean="0">
-              <a:ln w="18415" cmpd="sng">
-                <a:noFill/>
-                <a:prstDash val="solid"/>
-              </a:ln>
-              <a:solidFill>
-                <a:srgbClr val="FFFFFF"/>
-              </a:solidFill>
-            </a:endParaRPr>
           </a:p>
         </p:txBody>
       </p:sp>
@@ -8303,15 +8105,6 @@
               </a:rPr>
               <a:t>Методът трябва или да се справи успешно със задачата си, или да върне грешка</a:t>
             </a:r>
-            <a:endParaRPr lang="bg-BG" dirty="0" smtClean="0">
-              <a:ln w="18415" cmpd="sng">
-                <a:noFill/>
-                <a:prstDash val="solid"/>
-              </a:ln>
-              <a:solidFill>
-                <a:srgbClr val="FFFFFF"/>
-              </a:solidFill>
-            </a:endParaRPr>
           </a:p>
         </p:txBody>
       </p:sp>
@@ -8739,15 +8532,6 @@
               </a:rPr>
               <a:t>Рекурсията е мощен похват, но трябва да се използва внимателно</a:t>
             </a:r>
-            <a:endParaRPr lang="bg-BG" dirty="0" smtClean="0">
-              <a:ln w="18415" cmpd="sng">
-                <a:noFill/>
-                <a:prstDash val="solid"/>
-              </a:ln>
-              <a:solidFill>
-                <a:srgbClr val="FFFFFF"/>
-              </a:solidFill>
-            </a:endParaRPr>
           </a:p>
         </p:txBody>
       </p:sp>
@@ -8798,7 +8582,12 @@
             <p:ph type="title"/>
           </p:nvPr>
         </p:nvSpPr>
-        <p:spPr/>
+        <p:spPr>
+          <a:xfrm>
+            <a:off x="457200" y="188640"/>
+            <a:ext cx="8229600" cy="1143000"/>
+          </a:xfrm>
+        </p:spPr>
         <p:txBody>
           <a:bodyPr/>
           <a:lstStyle/>
@@ -8837,8 +8626,8 @@
         </p:nvSpPr>
         <p:spPr>
           <a:xfrm>
-            <a:off x="971600" y="1340768"/>
-            <a:ext cx="7920880" cy="5184576"/>
+            <a:off x="971600" y="1196752"/>
+            <a:ext cx="7920880" cy="5661248"/>
           </a:xfrm>
         </p:spPr>
         <p:txBody>
@@ -8955,7 +8744,43 @@
                   <a:srgbClr val="FFFFFF"/>
                 </a:solidFill>
               </a:rPr>
-              <a:t>Дъно на рекурсията – достига се, когато след краен брой рекурсивни извиквания, методът не се извика вече</a:t>
+              <a:t>Дъно на рекурсията – достига се, когато след краен брой рекурсивни извиквания, методът не се извика </a:t>
+            </a:r>
+            <a:r>
+              <a:rPr lang="bg-BG" dirty="0" smtClean="0">
+                <a:ln w="18415" cmpd="sng">
+                  <a:noFill/>
+                  <a:prstDash val="solid"/>
+                </a:ln>
+                <a:solidFill>
+                  <a:srgbClr val="FFFFFF"/>
+                </a:solidFill>
+              </a:rPr>
+              <a:t>вече</a:t>
+            </a:r>
+            <a:endParaRPr lang="en-US" dirty="0" smtClean="0">
+              <a:ln w="18415" cmpd="sng">
+                <a:noFill/>
+                <a:prstDash val="solid"/>
+              </a:ln>
+              <a:solidFill>
+                <a:srgbClr val="FFFFFF"/>
+              </a:solidFill>
+            </a:endParaRPr>
+          </a:p>
+          <a:p>
+            <a:pPr marL="1069975"/>
+            <a:r>
+              <a:rPr lang="bg-BG" dirty="0" smtClean="0">
+                <a:ln w="18415" cmpd="sng">
+                  <a:noFill/>
+                  <a:prstDash val="solid"/>
+                </a:ln>
+                <a:solidFill>
+                  <a:srgbClr val="FFFFFF"/>
+                </a:solidFill>
+              </a:rPr>
+              <a:t>Прав и обратен ход на рекурсия</a:t>
             </a:r>
             <a:endParaRPr lang="bg-BG" dirty="0" smtClean="0">
               <a:ln w="18415" cmpd="sng">
@@ -9257,19 +9082,43 @@
                   <a:srgbClr val="FFFFFF"/>
                 </a:solidFill>
               </a:rPr>
-              <a:t> изчислителен процес, </a:t>
-            </a:r>
-            <a:r>
-              <a:rPr lang="bg-BG" dirty="0" err="1" smtClean="0">
-                <a:ln w="18415" cmpd="sng">
-                  <a:noFill/>
-                  <a:prstDash val="solid"/>
-                </a:ln>
-                <a:solidFill>
-                  <a:srgbClr val="FFFFFF"/>
-                </a:solidFill>
-              </a:rPr>
-              <a:t>обекновено</a:t>
+              <a:t> изчислителен процес</a:t>
+            </a:r>
+            <a:r>
+              <a:rPr lang="bg-BG" smtClean="0">
+                <a:ln w="18415" cmpd="sng">
+                  <a:noFill/>
+                  <a:prstDash val="solid"/>
+                </a:ln>
+                <a:solidFill>
+                  <a:srgbClr val="FFFFFF"/>
+                </a:solidFill>
+              </a:rPr>
+              <a:t>, об</a:t>
+            </a:r>
+            <a:r>
+              <a:rPr lang="bg-BG">
+                <a:ln w="18415" cmpd="sng">
+                  <a:noFill/>
+                  <a:prstDash val="solid"/>
+                </a:ln>
+                <a:solidFill>
+                  <a:srgbClr val="FFFFFF"/>
+                </a:solidFill>
+              </a:rPr>
+              <a:t>и</a:t>
+            </a:r>
+            <a:r>
+              <a:rPr lang="bg-BG" smtClean="0">
+                <a:ln w="18415" cmpd="sng">
+                  <a:noFill/>
+                  <a:prstDash val="solid"/>
+                </a:ln>
+                <a:solidFill>
+                  <a:srgbClr val="FFFFFF"/>
+                </a:solidFill>
+              </a:rPr>
+              <a:t>кновено </a:t>
             </a:r>
             <a:r>
               <a:rPr lang="bg-BG" dirty="0" smtClean="0">
@@ -9281,7 +9130,7 @@
                   <a:srgbClr val="FFFFFF"/>
                 </a:solidFill>
               </a:rPr>
-              <a:t> итеративното решение е лесно забележимо</a:t>
+              <a:t>итеративното решение е лесно забележимо</a:t>
             </a:r>
           </a:p>
           <a:p>
@@ -9361,15 +9210,6 @@
               </a:rPr>
               <a:t> я използваме!</a:t>
             </a:r>
-            <a:endParaRPr lang="bg-BG" dirty="0" smtClean="0">
-              <a:ln w="18415" cmpd="sng">
-                <a:noFill/>
-                <a:prstDash val="solid"/>
-              </a:ln>
-              <a:solidFill>
-                <a:srgbClr val="FFFFFF"/>
-              </a:solidFill>
-            </a:endParaRPr>
           </a:p>
         </p:txBody>
       </p:sp>

</xml_diff>